<commit_message>
Split up resources Think I got all topics to cover listed. Added to list of topics not covered
</commit_message>
<xml_diff>
--- a/Presentation.pptx
+++ b/Presentation.pptx
@@ -4,18 +4,23 @@
   <p:sldMasterIdLst>
     <p:sldMasterId id="2147483648" r:id="rId1"/>
   </p:sldMasterIdLst>
+  <p:notesMasterIdLst>
+    <p:notesMasterId r:id="rId15"/>
+  </p:notesMasterIdLst>
   <p:sldIdLst>
     <p:sldId id="256" r:id="rId2"/>
     <p:sldId id="258" r:id="rId3"/>
     <p:sldId id="262" r:id="rId4"/>
     <p:sldId id="259" r:id="rId5"/>
-    <p:sldId id="260" r:id="rId6"/>
-    <p:sldId id="266" r:id="rId7"/>
-    <p:sldId id="263" r:id="rId8"/>
-    <p:sldId id="268" r:id="rId9"/>
-    <p:sldId id="267" r:id="rId10"/>
-    <p:sldId id="269" r:id="rId11"/>
-    <p:sldId id="265" r:id="rId12"/>
+    <p:sldId id="272" r:id="rId6"/>
+    <p:sldId id="273" r:id="rId7"/>
+    <p:sldId id="266" r:id="rId8"/>
+    <p:sldId id="263" r:id="rId9"/>
+    <p:sldId id="268" r:id="rId10"/>
+    <p:sldId id="267" r:id="rId11"/>
+    <p:sldId id="269" r:id="rId12"/>
+    <p:sldId id="265" r:id="rId13"/>
+    <p:sldId id="270" r:id="rId14"/>
   </p:sldIdLst>
   <p:sldSz cx="9144000" cy="6858000" type="screen4x3"/>
   <p:notesSz cx="6858000" cy="9144000"/>
@@ -116,7 +121,7 @@
   </p:defaultTextStyle>
   <p:extLst>
     <p:ext uri="{EFAFB233-063F-42B5-8137-9DF3F51BA10A}">
-      <p15:sldGuideLst xmlns:p15="http://schemas.microsoft.com/office/powerpoint/2012/main">
+      <p15:sldGuideLst xmlns:p15="http://schemas.microsoft.com/office/powerpoint/2012/main" xmlns="">
         <p15:guide id="1" orient="horz" pos="2160">
           <p15:clr>
             <a:srgbClr val="A4A3A4"/>
@@ -131,6 +136,440 @@
     </p:ext>
   </p:extLst>
 </p:presentation>
+</file>
+
+<file path=ppt/notesMasters/notesMaster1.xml><?xml version="1.0" encoding="utf-8"?>
+<p:notesMaster xmlns:a="http://schemas.openxmlformats.org/drawingml/2006/main" xmlns:r="http://schemas.openxmlformats.org/officeDocument/2006/relationships" xmlns:p="http://schemas.openxmlformats.org/presentationml/2006/main">
+  <p:cSld>
+    <p:bg>
+      <p:bgRef idx="1001">
+        <a:schemeClr val="bg1"/>
+      </p:bgRef>
+    </p:bg>
+    <p:spTree>
+      <p:nvGrpSpPr>
+        <p:cNvPr id="1" name=""/>
+        <p:cNvGrpSpPr/>
+        <p:nvPr/>
+      </p:nvGrpSpPr>
+      <p:grpSpPr>
+        <a:xfrm>
+          <a:off x="0" y="0"/>
+          <a:ext cx="0" cy="0"/>
+          <a:chOff x="0" y="0"/>
+          <a:chExt cx="0" cy="0"/>
+        </a:xfrm>
+      </p:grpSpPr>
+      <p:sp>
+        <p:nvSpPr>
+          <p:cNvPr id="2" name="Header Placeholder 1"/>
+          <p:cNvSpPr>
+            <a:spLocks noGrp="1"/>
+          </p:cNvSpPr>
+          <p:nvPr>
+            <p:ph type="hdr" sz="quarter"/>
+          </p:nvPr>
+        </p:nvSpPr>
+        <p:spPr>
+          <a:xfrm>
+            <a:off x="0" y="0"/>
+            <a:ext cx="2971800" cy="457200"/>
+          </a:xfrm>
+          <a:prstGeom prst="rect">
+            <a:avLst/>
+          </a:prstGeom>
+        </p:spPr>
+        <p:txBody>
+          <a:bodyPr vert="horz" lIns="91440" tIns="45720" rIns="91440" bIns="45720" rtlCol="0"/>
+          <a:lstStyle>
+            <a:lvl1pPr algn="l">
+              <a:defRPr sz="1200"/>
+            </a:lvl1pPr>
+          </a:lstStyle>
+          <a:p>
+            <a:endParaRPr lang="en-US"/>
+          </a:p>
+        </p:txBody>
+      </p:sp>
+      <p:sp>
+        <p:nvSpPr>
+          <p:cNvPr id="3" name="Date Placeholder 2"/>
+          <p:cNvSpPr>
+            <a:spLocks noGrp="1"/>
+          </p:cNvSpPr>
+          <p:nvPr>
+            <p:ph type="dt" idx="1"/>
+          </p:nvPr>
+        </p:nvSpPr>
+        <p:spPr>
+          <a:xfrm>
+            <a:off x="3884613" y="0"/>
+            <a:ext cx="2971800" cy="457200"/>
+          </a:xfrm>
+          <a:prstGeom prst="rect">
+            <a:avLst/>
+          </a:prstGeom>
+        </p:spPr>
+        <p:txBody>
+          <a:bodyPr vert="horz" lIns="91440" tIns="45720" rIns="91440" bIns="45720" rtlCol="0"/>
+          <a:lstStyle>
+            <a:lvl1pPr algn="r">
+              <a:defRPr sz="1200"/>
+            </a:lvl1pPr>
+          </a:lstStyle>
+          <a:p>
+            <a:fld id="{50C997D9-49C9-4558-8AB1-F20238619037}" type="datetimeFigureOut">
+              <a:rPr lang="en-US" smtClean="0"/>
+              <a:t>11/9/2015</a:t>
+            </a:fld>
+            <a:endParaRPr lang="en-US"/>
+          </a:p>
+        </p:txBody>
+      </p:sp>
+      <p:sp>
+        <p:nvSpPr>
+          <p:cNvPr id="4" name="Slide Image Placeholder 3"/>
+          <p:cNvSpPr>
+            <a:spLocks noGrp="1" noRot="1" noChangeAspect="1"/>
+          </p:cNvSpPr>
+          <p:nvPr>
+            <p:ph type="sldImg" idx="2"/>
+          </p:nvPr>
+        </p:nvSpPr>
+        <p:spPr>
+          <a:xfrm>
+            <a:off x="1143000" y="685800"/>
+            <a:ext cx="4572000" cy="3429000"/>
+          </a:xfrm>
+          <a:prstGeom prst="rect">
+            <a:avLst/>
+          </a:prstGeom>
+          <a:noFill/>
+          <a:ln w="12700">
+            <a:solidFill>
+              <a:prstClr val="black"/>
+            </a:solidFill>
+          </a:ln>
+        </p:spPr>
+        <p:txBody>
+          <a:bodyPr vert="horz" lIns="91440" tIns="45720" rIns="91440" bIns="45720" rtlCol="0" anchor="ctr"/>
+          <a:lstStyle/>
+          <a:p>
+            <a:endParaRPr lang="en-US"/>
+          </a:p>
+        </p:txBody>
+      </p:sp>
+      <p:sp>
+        <p:nvSpPr>
+          <p:cNvPr id="5" name="Notes Placeholder 4"/>
+          <p:cNvSpPr>
+            <a:spLocks noGrp="1"/>
+          </p:cNvSpPr>
+          <p:nvPr>
+            <p:ph type="body" sz="quarter" idx="3"/>
+          </p:nvPr>
+        </p:nvSpPr>
+        <p:spPr>
+          <a:xfrm>
+            <a:off x="685800" y="4343400"/>
+            <a:ext cx="5486400" cy="4114800"/>
+          </a:xfrm>
+          <a:prstGeom prst="rect">
+            <a:avLst/>
+          </a:prstGeom>
+        </p:spPr>
+        <p:txBody>
+          <a:bodyPr vert="horz" lIns="91440" tIns="45720" rIns="91440" bIns="45720" rtlCol="0"/>
+          <a:lstStyle/>
+          <a:p>
+            <a:pPr lvl="0"/>
+            <a:r>
+              <a:rPr lang="en-US" smtClean="0"/>
+              <a:t>Click to edit Master text styles</a:t>
+            </a:r>
+          </a:p>
+          <a:p>
+            <a:pPr lvl="1"/>
+            <a:r>
+              <a:rPr lang="en-US" smtClean="0"/>
+              <a:t>Second level</a:t>
+            </a:r>
+          </a:p>
+          <a:p>
+            <a:pPr lvl="2"/>
+            <a:r>
+              <a:rPr lang="en-US" smtClean="0"/>
+              <a:t>Third level</a:t>
+            </a:r>
+          </a:p>
+          <a:p>
+            <a:pPr lvl="3"/>
+            <a:r>
+              <a:rPr lang="en-US" smtClean="0"/>
+              <a:t>Fourth level</a:t>
+            </a:r>
+          </a:p>
+          <a:p>
+            <a:pPr lvl="4"/>
+            <a:r>
+              <a:rPr lang="en-US" smtClean="0"/>
+              <a:t>Fifth level</a:t>
+            </a:r>
+            <a:endParaRPr lang="en-US"/>
+          </a:p>
+        </p:txBody>
+      </p:sp>
+      <p:sp>
+        <p:nvSpPr>
+          <p:cNvPr id="6" name="Footer Placeholder 5"/>
+          <p:cNvSpPr>
+            <a:spLocks noGrp="1"/>
+          </p:cNvSpPr>
+          <p:nvPr>
+            <p:ph type="ftr" sz="quarter" idx="4"/>
+          </p:nvPr>
+        </p:nvSpPr>
+        <p:spPr>
+          <a:xfrm>
+            <a:off x="0" y="8685213"/>
+            <a:ext cx="2971800" cy="457200"/>
+          </a:xfrm>
+          <a:prstGeom prst="rect">
+            <a:avLst/>
+          </a:prstGeom>
+        </p:spPr>
+        <p:txBody>
+          <a:bodyPr vert="horz" lIns="91440" tIns="45720" rIns="91440" bIns="45720" rtlCol="0" anchor="b"/>
+          <a:lstStyle>
+            <a:lvl1pPr algn="l">
+              <a:defRPr sz="1200"/>
+            </a:lvl1pPr>
+          </a:lstStyle>
+          <a:p>
+            <a:endParaRPr lang="en-US"/>
+          </a:p>
+        </p:txBody>
+      </p:sp>
+      <p:sp>
+        <p:nvSpPr>
+          <p:cNvPr id="7" name="Slide Number Placeholder 6"/>
+          <p:cNvSpPr>
+            <a:spLocks noGrp="1"/>
+          </p:cNvSpPr>
+          <p:nvPr>
+            <p:ph type="sldNum" sz="quarter" idx="5"/>
+          </p:nvPr>
+        </p:nvSpPr>
+        <p:spPr>
+          <a:xfrm>
+            <a:off x="3884613" y="8685213"/>
+            <a:ext cx="2971800" cy="457200"/>
+          </a:xfrm>
+          <a:prstGeom prst="rect">
+            <a:avLst/>
+          </a:prstGeom>
+        </p:spPr>
+        <p:txBody>
+          <a:bodyPr vert="horz" lIns="91440" tIns="45720" rIns="91440" bIns="45720" rtlCol="0" anchor="b"/>
+          <a:lstStyle>
+            <a:lvl1pPr algn="r">
+              <a:defRPr sz="1200"/>
+            </a:lvl1pPr>
+          </a:lstStyle>
+          <a:p>
+            <a:fld id="{EDAEE49F-D773-4B13-8FA7-3693091E3D45}" type="slidenum">
+              <a:rPr lang="en-US" smtClean="0"/>
+              <a:t>‹#›</a:t>
+            </a:fld>
+            <a:endParaRPr lang="en-US"/>
+          </a:p>
+        </p:txBody>
+      </p:sp>
+    </p:spTree>
+    <p:extLst>
+      <p:ext uri="{BB962C8B-B14F-4D97-AF65-F5344CB8AC3E}">
+        <p14:creationId xmlns:p14="http://schemas.microsoft.com/office/powerpoint/2010/main" val="2483209242"/>
+      </p:ext>
+    </p:extLst>
+  </p:cSld>
+  <p:clrMap bg1="lt1" tx1="dk1" bg2="lt2" tx2="dk2" accent1="accent1" accent2="accent2" accent3="accent3" accent4="accent4" accent5="accent5" accent6="accent6" hlink="hlink" folHlink="folHlink"/>
+  <p:notesStyle>
+    <a:lvl1pPr marL="0" algn="l" defTabSz="914400" rtl="0" eaLnBrk="1" latinLnBrk="0" hangingPunct="1">
+      <a:defRPr sz="1200" kern="1200">
+        <a:solidFill>
+          <a:schemeClr val="tx1"/>
+        </a:solidFill>
+        <a:latin typeface="+mn-lt"/>
+        <a:ea typeface="+mn-ea"/>
+        <a:cs typeface="+mn-cs"/>
+      </a:defRPr>
+    </a:lvl1pPr>
+    <a:lvl2pPr marL="457200" algn="l" defTabSz="914400" rtl="0" eaLnBrk="1" latinLnBrk="0" hangingPunct="1">
+      <a:defRPr sz="1200" kern="1200">
+        <a:solidFill>
+          <a:schemeClr val="tx1"/>
+        </a:solidFill>
+        <a:latin typeface="+mn-lt"/>
+        <a:ea typeface="+mn-ea"/>
+        <a:cs typeface="+mn-cs"/>
+      </a:defRPr>
+    </a:lvl2pPr>
+    <a:lvl3pPr marL="914400" algn="l" defTabSz="914400" rtl="0" eaLnBrk="1" latinLnBrk="0" hangingPunct="1">
+      <a:defRPr sz="1200" kern="1200">
+        <a:solidFill>
+          <a:schemeClr val="tx1"/>
+        </a:solidFill>
+        <a:latin typeface="+mn-lt"/>
+        <a:ea typeface="+mn-ea"/>
+        <a:cs typeface="+mn-cs"/>
+      </a:defRPr>
+    </a:lvl3pPr>
+    <a:lvl4pPr marL="1371600" algn="l" defTabSz="914400" rtl="0" eaLnBrk="1" latinLnBrk="0" hangingPunct="1">
+      <a:defRPr sz="1200" kern="1200">
+        <a:solidFill>
+          <a:schemeClr val="tx1"/>
+        </a:solidFill>
+        <a:latin typeface="+mn-lt"/>
+        <a:ea typeface="+mn-ea"/>
+        <a:cs typeface="+mn-cs"/>
+      </a:defRPr>
+    </a:lvl4pPr>
+    <a:lvl5pPr marL="1828800" algn="l" defTabSz="914400" rtl="0" eaLnBrk="1" latinLnBrk="0" hangingPunct="1">
+      <a:defRPr sz="1200" kern="1200">
+        <a:solidFill>
+          <a:schemeClr val="tx1"/>
+        </a:solidFill>
+        <a:latin typeface="+mn-lt"/>
+        <a:ea typeface="+mn-ea"/>
+        <a:cs typeface="+mn-cs"/>
+      </a:defRPr>
+    </a:lvl5pPr>
+    <a:lvl6pPr marL="2286000" algn="l" defTabSz="914400" rtl="0" eaLnBrk="1" latinLnBrk="0" hangingPunct="1">
+      <a:defRPr sz="1200" kern="1200">
+        <a:solidFill>
+          <a:schemeClr val="tx1"/>
+        </a:solidFill>
+        <a:latin typeface="+mn-lt"/>
+        <a:ea typeface="+mn-ea"/>
+        <a:cs typeface="+mn-cs"/>
+      </a:defRPr>
+    </a:lvl6pPr>
+    <a:lvl7pPr marL="2743200" algn="l" defTabSz="914400" rtl="0" eaLnBrk="1" latinLnBrk="0" hangingPunct="1">
+      <a:defRPr sz="1200" kern="1200">
+        <a:solidFill>
+          <a:schemeClr val="tx1"/>
+        </a:solidFill>
+        <a:latin typeface="+mn-lt"/>
+        <a:ea typeface="+mn-ea"/>
+        <a:cs typeface="+mn-cs"/>
+      </a:defRPr>
+    </a:lvl7pPr>
+    <a:lvl8pPr marL="3200400" algn="l" defTabSz="914400" rtl="0" eaLnBrk="1" latinLnBrk="0" hangingPunct="1">
+      <a:defRPr sz="1200" kern="1200">
+        <a:solidFill>
+          <a:schemeClr val="tx1"/>
+        </a:solidFill>
+        <a:latin typeface="+mn-lt"/>
+        <a:ea typeface="+mn-ea"/>
+        <a:cs typeface="+mn-cs"/>
+      </a:defRPr>
+    </a:lvl8pPr>
+    <a:lvl9pPr marL="3657600" algn="l" defTabSz="914400" rtl="0" eaLnBrk="1" latinLnBrk="0" hangingPunct="1">
+      <a:defRPr sz="1200" kern="1200">
+        <a:solidFill>
+          <a:schemeClr val="tx1"/>
+        </a:solidFill>
+        <a:latin typeface="+mn-lt"/>
+        <a:ea typeface="+mn-ea"/>
+        <a:cs typeface="+mn-cs"/>
+      </a:defRPr>
+    </a:lvl9pPr>
+  </p:notesStyle>
+</p:notesMaster>
+</file>
+
+<file path=ppt/notesSlides/notesSlide1.xml><?xml version="1.0" encoding="utf-8"?>
+<p:notes xmlns:a="http://schemas.openxmlformats.org/drawingml/2006/main" xmlns:r="http://schemas.openxmlformats.org/officeDocument/2006/relationships" xmlns:p="http://schemas.openxmlformats.org/presentationml/2006/main">
+  <p:cSld>
+    <p:spTree>
+      <p:nvGrpSpPr>
+        <p:cNvPr id="1" name=""/>
+        <p:cNvGrpSpPr/>
+        <p:nvPr/>
+      </p:nvGrpSpPr>
+      <p:grpSpPr>
+        <a:xfrm>
+          <a:off x="0" y="0"/>
+          <a:ext cx="0" cy="0"/>
+          <a:chOff x="0" y="0"/>
+          <a:chExt cx="0" cy="0"/>
+        </a:xfrm>
+      </p:grpSpPr>
+      <p:sp>
+        <p:nvSpPr>
+          <p:cNvPr id="2" name="Slide Image Placeholder 1"/>
+          <p:cNvSpPr>
+            <a:spLocks noGrp="1" noRot="1" noChangeAspect="1"/>
+          </p:cNvSpPr>
+          <p:nvPr>
+            <p:ph type="sldImg"/>
+          </p:nvPr>
+        </p:nvSpPr>
+        <p:spPr/>
+      </p:sp>
+      <p:sp>
+        <p:nvSpPr>
+          <p:cNvPr id="3" name="Notes Placeholder 2"/>
+          <p:cNvSpPr>
+            <a:spLocks noGrp="1"/>
+          </p:cNvSpPr>
+          <p:nvPr>
+            <p:ph type="body" idx="1"/>
+          </p:nvPr>
+        </p:nvSpPr>
+        <p:spPr/>
+        <p:txBody>
+          <a:bodyPr/>
+          <a:lstStyle/>
+          <a:p>
+            <a:endParaRPr lang="en-US" dirty="0"/>
+          </a:p>
+        </p:txBody>
+      </p:sp>
+      <p:sp>
+        <p:nvSpPr>
+          <p:cNvPr id="4" name="Slide Number Placeholder 3"/>
+          <p:cNvSpPr>
+            <a:spLocks noGrp="1"/>
+          </p:cNvSpPr>
+          <p:nvPr>
+            <p:ph type="sldNum" sz="quarter" idx="10"/>
+          </p:nvPr>
+        </p:nvSpPr>
+        <p:spPr/>
+        <p:txBody>
+          <a:bodyPr/>
+          <a:lstStyle/>
+          <a:p>
+            <a:fld id="{EDAEE49F-D773-4B13-8FA7-3693091E3D45}" type="slidenum">
+              <a:rPr lang="en-US" smtClean="0"/>
+              <a:t>10</a:t>
+            </a:fld>
+            <a:endParaRPr lang="en-US"/>
+          </a:p>
+        </p:txBody>
+      </p:sp>
+    </p:spTree>
+    <p:extLst>
+      <p:ext uri="{BB962C8B-B14F-4D97-AF65-F5344CB8AC3E}">
+        <p14:creationId xmlns:p14="http://schemas.microsoft.com/office/powerpoint/2010/main" val="3499637052"/>
+      </p:ext>
+    </p:extLst>
+  </p:cSld>
+  <p:clrMapOvr>
+    <a:masterClrMapping/>
+  </p:clrMapOvr>
+</p:notes>
 </file>
 
 <file path=ppt/slideLayouts/slideLayout1.xml><?xml version="1.0" encoding="utf-8"?>
@@ -314,7 +753,7 @@
           <a:p>
             <a:fld id="{40565BA0-CA72-496A-94A4-036ADC11FC7E}" type="datetimeFigureOut">
               <a:rPr lang="en-US" smtClean="0"/>
-              <a:t>11/8/2015</a:t>
+              <a:t>11/9/2015</a:t>
             </a:fld>
             <a:endParaRPr lang="en-US"/>
           </a:p>
@@ -484,7 +923,7 @@
           <a:p>
             <a:fld id="{40565BA0-CA72-496A-94A4-036ADC11FC7E}" type="datetimeFigureOut">
               <a:rPr lang="en-US" smtClean="0"/>
-              <a:t>11/8/2015</a:t>
+              <a:t>11/9/2015</a:t>
             </a:fld>
             <a:endParaRPr lang="en-US"/>
           </a:p>
@@ -664,7 +1103,7 @@
           <a:p>
             <a:fld id="{40565BA0-CA72-496A-94A4-036ADC11FC7E}" type="datetimeFigureOut">
               <a:rPr lang="en-US" smtClean="0"/>
-              <a:t>11/8/2015</a:t>
+              <a:t>11/9/2015</a:t>
             </a:fld>
             <a:endParaRPr lang="en-US"/>
           </a:p>
@@ -834,7 +1273,7 @@
           <a:p>
             <a:fld id="{40565BA0-CA72-496A-94A4-036ADC11FC7E}" type="datetimeFigureOut">
               <a:rPr lang="en-US" smtClean="0"/>
-              <a:t>11/8/2015</a:t>
+              <a:t>11/9/2015</a:t>
             </a:fld>
             <a:endParaRPr lang="en-US"/>
           </a:p>
@@ -1080,7 +1519,7 @@
           <a:p>
             <a:fld id="{40565BA0-CA72-496A-94A4-036ADC11FC7E}" type="datetimeFigureOut">
               <a:rPr lang="en-US" smtClean="0"/>
-              <a:t>11/8/2015</a:t>
+              <a:t>11/9/2015</a:t>
             </a:fld>
             <a:endParaRPr lang="en-US"/>
           </a:p>
@@ -1368,7 +1807,7 @@
           <a:p>
             <a:fld id="{40565BA0-CA72-496A-94A4-036ADC11FC7E}" type="datetimeFigureOut">
               <a:rPr lang="en-US" smtClean="0"/>
-              <a:t>11/8/2015</a:t>
+              <a:t>11/9/2015</a:t>
             </a:fld>
             <a:endParaRPr lang="en-US"/>
           </a:p>
@@ -1790,7 +2229,7 @@
           <a:p>
             <a:fld id="{40565BA0-CA72-496A-94A4-036ADC11FC7E}" type="datetimeFigureOut">
               <a:rPr lang="en-US" smtClean="0"/>
-              <a:t>11/8/2015</a:t>
+              <a:t>11/9/2015</a:t>
             </a:fld>
             <a:endParaRPr lang="en-US"/>
           </a:p>
@@ -1908,7 +2347,7 @@
           <a:p>
             <a:fld id="{40565BA0-CA72-496A-94A4-036ADC11FC7E}" type="datetimeFigureOut">
               <a:rPr lang="en-US" smtClean="0"/>
-              <a:t>11/8/2015</a:t>
+              <a:t>11/9/2015</a:t>
             </a:fld>
             <a:endParaRPr lang="en-US"/>
           </a:p>
@@ -2003,7 +2442,7 @@
           <a:p>
             <a:fld id="{40565BA0-CA72-496A-94A4-036ADC11FC7E}" type="datetimeFigureOut">
               <a:rPr lang="en-US" smtClean="0"/>
-              <a:t>11/8/2015</a:t>
+              <a:t>11/9/2015</a:t>
             </a:fld>
             <a:endParaRPr lang="en-US"/>
           </a:p>
@@ -2280,7 +2719,7 @@
           <a:p>
             <a:fld id="{40565BA0-CA72-496A-94A4-036ADC11FC7E}" type="datetimeFigureOut">
               <a:rPr lang="en-US" smtClean="0"/>
-              <a:t>11/8/2015</a:t>
+              <a:t>11/9/2015</a:t>
             </a:fld>
             <a:endParaRPr lang="en-US"/>
           </a:p>
@@ -2533,7 +2972,7 @@
           <a:p>
             <a:fld id="{40565BA0-CA72-496A-94A4-036ADC11FC7E}" type="datetimeFigureOut">
               <a:rPr lang="en-US" smtClean="0"/>
-              <a:t>11/8/2015</a:t>
+              <a:t>11/9/2015</a:t>
             </a:fld>
             <a:endParaRPr lang="en-US"/>
           </a:p>
@@ -2746,7 +3185,7 @@
           <a:p>
             <a:fld id="{40565BA0-CA72-496A-94A4-036ADC11FC7E}" type="datetimeFigureOut">
               <a:rPr lang="en-US" smtClean="0"/>
-              <a:t>11/8/2015</a:t>
+              <a:t>11/9/2015</a:t>
             </a:fld>
             <a:endParaRPr lang="en-US"/>
           </a:p>
@@ -3442,7 +3881,7 @@
           <a:p>
             <a:r>
               <a:rPr lang="en-US" dirty="0" smtClean="0"/>
-              <a:t>Not covered</a:t>
+              <a:t>This time…</a:t>
             </a:r>
             <a:endParaRPr lang="en-US" dirty="0"/>
           </a:p>
@@ -3461,14 +3900,705 @@
         <p:spPr/>
         <p:txBody>
           <a:bodyPr>
+            <a:normAutofit fontScale="70000" lnSpcReduction="20000"/>
+          </a:bodyPr>
+          <a:lstStyle/>
+          <a:p>
+            <a:r>
+              <a:rPr lang="en-US" dirty="0" smtClean="0"/>
+              <a:t>Start container in Java </a:t>
+            </a:r>
+            <a:r>
+              <a:rPr lang="en-US" dirty="0" smtClean="0"/>
+              <a:t>SE</a:t>
+            </a:r>
+          </a:p>
+          <a:p>
+            <a:r>
+              <a:rPr lang="en-US" dirty="0" smtClean="0"/>
+              <a:t>Basic dependency injection (DI)</a:t>
+            </a:r>
+          </a:p>
+          <a:p>
+            <a:r>
+              <a:rPr lang="en-US" dirty="0" smtClean="0"/>
+              <a:t>Lifecycle </a:t>
+            </a:r>
+            <a:r>
+              <a:rPr lang="en-US" dirty="0" smtClean="0"/>
+              <a:t>callbacks</a:t>
+            </a:r>
+          </a:p>
+          <a:p>
+            <a:r>
+              <a:rPr lang="en-US" dirty="0" smtClean="0"/>
+              <a:t>Deployment exceptions</a:t>
+            </a:r>
+            <a:endParaRPr lang="en-US" dirty="0" smtClean="0"/>
+          </a:p>
+          <a:p>
+            <a:r>
+              <a:rPr lang="en-US" dirty="0" err="1" smtClean="0"/>
+              <a:t>InjectionPoint</a:t>
+            </a:r>
+            <a:endParaRPr lang="en-US" dirty="0" smtClean="0"/>
+          </a:p>
+          <a:p>
+            <a:r>
+              <a:rPr lang="en-US" dirty="0" smtClean="0"/>
+              <a:t>Qualifiers</a:t>
+            </a:r>
+          </a:p>
+          <a:p>
+            <a:r>
+              <a:rPr lang="en-US" dirty="0"/>
+              <a:t>Producer/Disposer</a:t>
+            </a:r>
+            <a:endParaRPr lang="en-US" dirty="0" smtClean="0"/>
+          </a:p>
+          <a:p>
+            <a:r>
+              <a:rPr lang="en-US" dirty="0" smtClean="0"/>
+              <a:t>Parameterized types</a:t>
+            </a:r>
+          </a:p>
+          <a:p>
+            <a:r>
+              <a:rPr lang="en-US" dirty="0" smtClean="0"/>
+              <a:t>Instance</a:t>
+            </a:r>
+          </a:p>
+          <a:p>
+            <a:r>
+              <a:rPr lang="en-US" dirty="0" smtClean="0"/>
+              <a:t>Events</a:t>
+            </a:r>
+            <a:endParaRPr lang="en-US" dirty="0" smtClean="0"/>
+          </a:p>
+          <a:p>
+            <a:r>
+              <a:rPr lang="en-US" dirty="0" smtClean="0"/>
+              <a:t>Interceptor</a:t>
+            </a:r>
+            <a:endParaRPr lang="en-US" dirty="0" smtClean="0"/>
+          </a:p>
+          <a:p>
+            <a:r>
+              <a:rPr lang="en-US" dirty="0" smtClean="0"/>
+              <a:t>Decorator</a:t>
+            </a:r>
+            <a:endParaRPr lang="en-US" dirty="0" smtClean="0"/>
+          </a:p>
+          <a:p>
+            <a:endParaRPr lang="en-US" dirty="0"/>
+          </a:p>
+          <a:p>
+            <a:endParaRPr lang="en-US" dirty="0"/>
+          </a:p>
+        </p:txBody>
+      </p:sp>
+      <p:sp>
+        <p:nvSpPr>
+          <p:cNvPr id="8" name="Content Placeholder 2"/>
+          <p:cNvSpPr txBox="1">
+            <a:spLocks/>
+          </p:cNvSpPr>
+          <p:nvPr/>
+        </p:nvSpPr>
+        <p:spPr>
+          <a:xfrm>
+            <a:off x="0" y="6489701"/>
+            <a:ext cx="9144000" cy="380999"/>
+          </a:xfrm>
+          <a:prstGeom prst="rect">
+            <a:avLst/>
+          </a:prstGeom>
+          <a:solidFill>
+            <a:srgbClr val="4D4D79"/>
+          </a:solidFill>
+        </p:spPr>
+        <p:txBody>
+          <a:bodyPr vert="horz" lIns="91440" tIns="45720" rIns="91440" bIns="45720" rtlCol="0">
             <a:normAutofit/>
           </a:bodyPr>
+          <a:lstStyle>
+            <a:lvl1pPr marL="342900" indent="-342900" algn="l" defTabSz="914400" rtl="0" eaLnBrk="1" latinLnBrk="0" hangingPunct="1">
+              <a:spcBef>
+                <a:spcPct val="20000"/>
+              </a:spcBef>
+              <a:buFont typeface="Arial" panose="020B0604020202020204" pitchFamily="34" charset="0"/>
+              <a:buChar char="•"/>
+              <a:defRPr sz="3200" kern="1200">
+                <a:solidFill>
+                  <a:schemeClr val="tx1"/>
+                </a:solidFill>
+                <a:latin typeface="+mn-lt"/>
+                <a:ea typeface="+mn-ea"/>
+                <a:cs typeface="+mn-cs"/>
+              </a:defRPr>
+            </a:lvl1pPr>
+            <a:lvl2pPr marL="742950" indent="-285750" algn="l" defTabSz="914400" rtl="0" eaLnBrk="1" latinLnBrk="0" hangingPunct="1">
+              <a:spcBef>
+                <a:spcPct val="20000"/>
+              </a:spcBef>
+              <a:buFont typeface="Arial" panose="020B0604020202020204" pitchFamily="34" charset="0"/>
+              <a:buChar char="–"/>
+              <a:defRPr sz="2800" kern="1200">
+                <a:solidFill>
+                  <a:schemeClr val="tx1"/>
+                </a:solidFill>
+                <a:latin typeface="+mn-lt"/>
+                <a:ea typeface="+mn-ea"/>
+                <a:cs typeface="+mn-cs"/>
+              </a:defRPr>
+            </a:lvl2pPr>
+            <a:lvl3pPr marL="1143000" indent="-228600" algn="l" defTabSz="914400" rtl="0" eaLnBrk="1" latinLnBrk="0" hangingPunct="1">
+              <a:spcBef>
+                <a:spcPct val="20000"/>
+              </a:spcBef>
+              <a:buFont typeface="Arial" panose="020B0604020202020204" pitchFamily="34" charset="0"/>
+              <a:buChar char="•"/>
+              <a:defRPr sz="2400" kern="1200">
+                <a:solidFill>
+                  <a:schemeClr val="tx1"/>
+                </a:solidFill>
+                <a:latin typeface="+mn-lt"/>
+                <a:ea typeface="+mn-ea"/>
+                <a:cs typeface="+mn-cs"/>
+              </a:defRPr>
+            </a:lvl3pPr>
+            <a:lvl4pPr marL="1600200" indent="-228600" algn="l" defTabSz="914400" rtl="0" eaLnBrk="1" latinLnBrk="0" hangingPunct="1">
+              <a:spcBef>
+                <a:spcPct val="20000"/>
+              </a:spcBef>
+              <a:buFont typeface="Arial" panose="020B0604020202020204" pitchFamily="34" charset="0"/>
+              <a:buChar char="–"/>
+              <a:defRPr sz="2000" kern="1200">
+                <a:solidFill>
+                  <a:schemeClr val="tx1"/>
+                </a:solidFill>
+                <a:latin typeface="+mn-lt"/>
+                <a:ea typeface="+mn-ea"/>
+                <a:cs typeface="+mn-cs"/>
+              </a:defRPr>
+            </a:lvl4pPr>
+            <a:lvl5pPr marL="2057400" indent="-228600" algn="l" defTabSz="914400" rtl="0" eaLnBrk="1" latinLnBrk="0" hangingPunct="1">
+              <a:spcBef>
+                <a:spcPct val="20000"/>
+              </a:spcBef>
+              <a:buFont typeface="Arial" panose="020B0604020202020204" pitchFamily="34" charset="0"/>
+              <a:buChar char="»"/>
+              <a:defRPr sz="2000" kern="1200">
+                <a:solidFill>
+                  <a:schemeClr val="tx1"/>
+                </a:solidFill>
+                <a:latin typeface="+mn-lt"/>
+                <a:ea typeface="+mn-ea"/>
+                <a:cs typeface="+mn-cs"/>
+              </a:defRPr>
+            </a:lvl5pPr>
+            <a:lvl6pPr marL="2514600" indent="-228600" algn="l" defTabSz="914400" rtl="0" eaLnBrk="1" latinLnBrk="0" hangingPunct="1">
+              <a:spcBef>
+                <a:spcPct val="20000"/>
+              </a:spcBef>
+              <a:buFont typeface="Arial" panose="020B0604020202020204" pitchFamily="34" charset="0"/>
+              <a:buChar char="•"/>
+              <a:defRPr sz="2000" kern="1200">
+                <a:solidFill>
+                  <a:schemeClr val="tx1"/>
+                </a:solidFill>
+                <a:latin typeface="+mn-lt"/>
+                <a:ea typeface="+mn-ea"/>
+                <a:cs typeface="+mn-cs"/>
+              </a:defRPr>
+            </a:lvl6pPr>
+            <a:lvl7pPr marL="2971800" indent="-228600" algn="l" defTabSz="914400" rtl="0" eaLnBrk="1" latinLnBrk="0" hangingPunct="1">
+              <a:spcBef>
+                <a:spcPct val="20000"/>
+              </a:spcBef>
+              <a:buFont typeface="Arial" panose="020B0604020202020204" pitchFamily="34" charset="0"/>
+              <a:buChar char="•"/>
+              <a:defRPr sz="2000" kern="1200">
+                <a:solidFill>
+                  <a:schemeClr val="tx1"/>
+                </a:solidFill>
+                <a:latin typeface="+mn-lt"/>
+                <a:ea typeface="+mn-ea"/>
+                <a:cs typeface="+mn-cs"/>
+              </a:defRPr>
+            </a:lvl7pPr>
+            <a:lvl8pPr marL="3429000" indent="-228600" algn="l" defTabSz="914400" rtl="0" eaLnBrk="1" latinLnBrk="0" hangingPunct="1">
+              <a:spcBef>
+                <a:spcPct val="20000"/>
+              </a:spcBef>
+              <a:buFont typeface="Arial" panose="020B0604020202020204" pitchFamily="34" charset="0"/>
+              <a:buChar char="•"/>
+              <a:defRPr sz="2000" kern="1200">
+                <a:solidFill>
+                  <a:schemeClr val="tx1"/>
+                </a:solidFill>
+                <a:latin typeface="+mn-lt"/>
+                <a:ea typeface="+mn-ea"/>
+                <a:cs typeface="+mn-cs"/>
+              </a:defRPr>
+            </a:lvl8pPr>
+            <a:lvl9pPr marL="3886200" indent="-228600" algn="l" defTabSz="914400" rtl="0" eaLnBrk="1" latinLnBrk="0" hangingPunct="1">
+              <a:spcBef>
+                <a:spcPct val="20000"/>
+              </a:spcBef>
+              <a:buFont typeface="Arial" panose="020B0604020202020204" pitchFamily="34" charset="0"/>
+              <a:buChar char="•"/>
+              <a:defRPr sz="2000" kern="1200">
+                <a:solidFill>
+                  <a:schemeClr val="tx1"/>
+                </a:solidFill>
+                <a:latin typeface="+mn-lt"/>
+                <a:ea typeface="+mn-ea"/>
+                <a:cs typeface="+mn-cs"/>
+              </a:defRPr>
+            </a:lvl9pPr>
+          </a:lstStyle>
+          <a:p>
+            <a:pPr marL="0" indent="0" algn="ctr">
+              <a:buNone/>
+            </a:pPr>
+            <a:r>
+              <a:rPr lang="en-US" sz="1600" dirty="0">
+                <a:solidFill>
+                  <a:schemeClr val="bg1"/>
+                </a:solidFill>
+              </a:rPr>
+              <a:t>Michael Remijan      mjremijan@yahoo.com      @</a:t>
+            </a:r>
+            <a:r>
+              <a:rPr lang="en-US" sz="1600" dirty="0" err="1">
+                <a:solidFill>
+                  <a:schemeClr val="bg1"/>
+                </a:solidFill>
+              </a:rPr>
+              <a:t>mjremijan</a:t>
+            </a:r>
+            <a:r>
+              <a:rPr lang="en-US" sz="1600" dirty="0">
+                <a:solidFill>
+                  <a:schemeClr val="bg1"/>
+                </a:solidFill>
+              </a:rPr>
+              <a:t>      github.com/</a:t>
+            </a:r>
+            <a:r>
+              <a:rPr lang="en-US" sz="1600" dirty="0" err="1">
+                <a:solidFill>
+                  <a:schemeClr val="bg1"/>
+                </a:solidFill>
+              </a:rPr>
+              <a:t>mjremijan</a:t>
+            </a:r>
+            <a:r>
+              <a:rPr lang="en-US" sz="1600" dirty="0">
+                <a:solidFill>
+                  <a:schemeClr val="bg1"/>
+                </a:solidFill>
+              </a:rPr>
+              <a:t>/</a:t>
+            </a:r>
+            <a:r>
+              <a:rPr lang="en-US" sz="1600" dirty="0" err="1">
+                <a:solidFill>
+                  <a:schemeClr val="bg1"/>
+                </a:solidFill>
+              </a:rPr>
+              <a:t>ferris</a:t>
+            </a:r>
+            <a:r>
+              <a:rPr lang="en-US" sz="1600" dirty="0">
+                <a:solidFill>
+                  <a:schemeClr val="bg1"/>
+                </a:solidFill>
+              </a:rPr>
+              <a:t>-cdi-presentation</a:t>
+            </a:r>
+          </a:p>
+          <a:p>
+            <a:endParaRPr lang="en-US" dirty="0" smtClean="0"/>
+          </a:p>
+          <a:p>
+            <a:endParaRPr lang="en-US" dirty="0"/>
+          </a:p>
+        </p:txBody>
+      </p:sp>
+      <p:sp>
+        <p:nvSpPr>
+          <p:cNvPr id="9" name="Content Placeholder 2"/>
+          <p:cNvSpPr txBox="1">
+            <a:spLocks/>
+          </p:cNvSpPr>
+          <p:nvPr/>
+        </p:nvSpPr>
+        <p:spPr>
+          <a:xfrm>
+            <a:off x="0" y="0"/>
+            <a:ext cx="9144000" cy="380999"/>
+          </a:xfrm>
+          <a:prstGeom prst="rect">
+            <a:avLst/>
+          </a:prstGeom>
+          <a:solidFill>
+            <a:srgbClr val="4D4D79"/>
+          </a:solidFill>
+        </p:spPr>
+        <p:txBody>
+          <a:bodyPr vert="horz" lIns="91440" tIns="45720" rIns="91440" bIns="45720" rtlCol="0">
+            <a:normAutofit/>
+          </a:bodyPr>
+          <a:lstStyle>
+            <a:lvl1pPr marL="342900" indent="-342900" algn="l" defTabSz="914400" rtl="0" eaLnBrk="1" latinLnBrk="0" hangingPunct="1">
+              <a:spcBef>
+                <a:spcPct val="20000"/>
+              </a:spcBef>
+              <a:buFont typeface="Arial" panose="020B0604020202020204" pitchFamily="34" charset="0"/>
+              <a:buChar char="•"/>
+              <a:defRPr sz="3200" kern="1200">
+                <a:solidFill>
+                  <a:schemeClr val="tx1"/>
+                </a:solidFill>
+                <a:latin typeface="+mn-lt"/>
+                <a:ea typeface="+mn-ea"/>
+                <a:cs typeface="+mn-cs"/>
+              </a:defRPr>
+            </a:lvl1pPr>
+            <a:lvl2pPr marL="742950" indent="-285750" algn="l" defTabSz="914400" rtl="0" eaLnBrk="1" latinLnBrk="0" hangingPunct="1">
+              <a:spcBef>
+                <a:spcPct val="20000"/>
+              </a:spcBef>
+              <a:buFont typeface="Arial" panose="020B0604020202020204" pitchFamily="34" charset="0"/>
+              <a:buChar char="–"/>
+              <a:defRPr sz="2800" kern="1200">
+                <a:solidFill>
+                  <a:schemeClr val="tx1"/>
+                </a:solidFill>
+                <a:latin typeface="+mn-lt"/>
+                <a:ea typeface="+mn-ea"/>
+                <a:cs typeface="+mn-cs"/>
+              </a:defRPr>
+            </a:lvl2pPr>
+            <a:lvl3pPr marL="1143000" indent="-228600" algn="l" defTabSz="914400" rtl="0" eaLnBrk="1" latinLnBrk="0" hangingPunct="1">
+              <a:spcBef>
+                <a:spcPct val="20000"/>
+              </a:spcBef>
+              <a:buFont typeface="Arial" panose="020B0604020202020204" pitchFamily="34" charset="0"/>
+              <a:buChar char="•"/>
+              <a:defRPr sz="2400" kern="1200">
+                <a:solidFill>
+                  <a:schemeClr val="tx1"/>
+                </a:solidFill>
+                <a:latin typeface="+mn-lt"/>
+                <a:ea typeface="+mn-ea"/>
+                <a:cs typeface="+mn-cs"/>
+              </a:defRPr>
+            </a:lvl3pPr>
+            <a:lvl4pPr marL="1600200" indent="-228600" algn="l" defTabSz="914400" rtl="0" eaLnBrk="1" latinLnBrk="0" hangingPunct="1">
+              <a:spcBef>
+                <a:spcPct val="20000"/>
+              </a:spcBef>
+              <a:buFont typeface="Arial" panose="020B0604020202020204" pitchFamily="34" charset="0"/>
+              <a:buChar char="–"/>
+              <a:defRPr sz="2000" kern="1200">
+                <a:solidFill>
+                  <a:schemeClr val="tx1"/>
+                </a:solidFill>
+                <a:latin typeface="+mn-lt"/>
+                <a:ea typeface="+mn-ea"/>
+                <a:cs typeface="+mn-cs"/>
+              </a:defRPr>
+            </a:lvl4pPr>
+            <a:lvl5pPr marL="2057400" indent="-228600" algn="l" defTabSz="914400" rtl="0" eaLnBrk="1" latinLnBrk="0" hangingPunct="1">
+              <a:spcBef>
+                <a:spcPct val="20000"/>
+              </a:spcBef>
+              <a:buFont typeface="Arial" panose="020B0604020202020204" pitchFamily="34" charset="0"/>
+              <a:buChar char="»"/>
+              <a:defRPr sz="2000" kern="1200">
+                <a:solidFill>
+                  <a:schemeClr val="tx1"/>
+                </a:solidFill>
+                <a:latin typeface="+mn-lt"/>
+                <a:ea typeface="+mn-ea"/>
+                <a:cs typeface="+mn-cs"/>
+              </a:defRPr>
+            </a:lvl5pPr>
+            <a:lvl6pPr marL="2514600" indent="-228600" algn="l" defTabSz="914400" rtl="0" eaLnBrk="1" latinLnBrk="0" hangingPunct="1">
+              <a:spcBef>
+                <a:spcPct val="20000"/>
+              </a:spcBef>
+              <a:buFont typeface="Arial" panose="020B0604020202020204" pitchFamily="34" charset="0"/>
+              <a:buChar char="•"/>
+              <a:defRPr sz="2000" kern="1200">
+                <a:solidFill>
+                  <a:schemeClr val="tx1"/>
+                </a:solidFill>
+                <a:latin typeface="+mn-lt"/>
+                <a:ea typeface="+mn-ea"/>
+                <a:cs typeface="+mn-cs"/>
+              </a:defRPr>
+            </a:lvl6pPr>
+            <a:lvl7pPr marL="2971800" indent="-228600" algn="l" defTabSz="914400" rtl="0" eaLnBrk="1" latinLnBrk="0" hangingPunct="1">
+              <a:spcBef>
+                <a:spcPct val="20000"/>
+              </a:spcBef>
+              <a:buFont typeface="Arial" panose="020B0604020202020204" pitchFamily="34" charset="0"/>
+              <a:buChar char="•"/>
+              <a:defRPr sz="2000" kern="1200">
+                <a:solidFill>
+                  <a:schemeClr val="tx1"/>
+                </a:solidFill>
+                <a:latin typeface="+mn-lt"/>
+                <a:ea typeface="+mn-ea"/>
+                <a:cs typeface="+mn-cs"/>
+              </a:defRPr>
+            </a:lvl7pPr>
+            <a:lvl8pPr marL="3429000" indent="-228600" algn="l" defTabSz="914400" rtl="0" eaLnBrk="1" latinLnBrk="0" hangingPunct="1">
+              <a:spcBef>
+                <a:spcPct val="20000"/>
+              </a:spcBef>
+              <a:buFont typeface="Arial" panose="020B0604020202020204" pitchFamily="34" charset="0"/>
+              <a:buChar char="•"/>
+              <a:defRPr sz="2000" kern="1200">
+                <a:solidFill>
+                  <a:schemeClr val="tx1"/>
+                </a:solidFill>
+                <a:latin typeface="+mn-lt"/>
+                <a:ea typeface="+mn-ea"/>
+                <a:cs typeface="+mn-cs"/>
+              </a:defRPr>
+            </a:lvl8pPr>
+            <a:lvl9pPr marL="3886200" indent="-228600" algn="l" defTabSz="914400" rtl="0" eaLnBrk="1" latinLnBrk="0" hangingPunct="1">
+              <a:spcBef>
+                <a:spcPct val="20000"/>
+              </a:spcBef>
+              <a:buFont typeface="Arial" panose="020B0604020202020204" pitchFamily="34" charset="0"/>
+              <a:buChar char="•"/>
+              <a:defRPr sz="2000" kern="1200">
+                <a:solidFill>
+                  <a:schemeClr val="tx1"/>
+                </a:solidFill>
+                <a:latin typeface="+mn-lt"/>
+                <a:ea typeface="+mn-ea"/>
+                <a:cs typeface="+mn-cs"/>
+              </a:defRPr>
+            </a:lvl9pPr>
+          </a:lstStyle>
+          <a:p>
+            <a:pPr marL="0" indent="0" algn="ctr">
+              <a:buNone/>
+            </a:pPr>
+            <a:r>
+              <a:rPr lang="en-US" sz="1600" dirty="0" smtClean="0">
+                <a:solidFill>
+                  <a:schemeClr val="bg1"/>
+                </a:solidFill>
+              </a:rPr>
+              <a:t>CDI</a:t>
+            </a:r>
+          </a:p>
+          <a:p>
+            <a:endParaRPr lang="en-US" dirty="0" smtClean="0"/>
+          </a:p>
+          <a:p>
+            <a:endParaRPr lang="en-US" dirty="0"/>
+          </a:p>
+        </p:txBody>
+      </p:sp>
+    </p:spTree>
+    <p:extLst>
+      <p:ext uri="{BB962C8B-B14F-4D97-AF65-F5344CB8AC3E}">
+        <p14:creationId xmlns:p14="http://schemas.microsoft.com/office/powerpoint/2010/main" val="4081083299"/>
+      </p:ext>
+    </p:extLst>
+  </p:cSld>
+  <p:clrMapOvr>
+    <a:masterClrMapping/>
+  </p:clrMapOvr>
+  <p:timing>
+    <p:tnLst>
+      <p:par>
+        <p:cTn id="1" dur="indefinite" restart="never" nodeType="tmRoot"/>
+      </p:par>
+    </p:tnLst>
+  </p:timing>
+</p:sld>
+</file>
+
+<file path=ppt/slides/slide11.xml><?xml version="1.0" encoding="utf-8"?>
+<p:sld xmlns:a="http://schemas.openxmlformats.org/drawingml/2006/main" xmlns:r="http://schemas.openxmlformats.org/officeDocument/2006/relationships" xmlns:p="http://schemas.openxmlformats.org/presentationml/2006/main">
+  <p:cSld>
+    <p:spTree>
+      <p:nvGrpSpPr>
+        <p:cNvPr id="1" name=""/>
+        <p:cNvGrpSpPr/>
+        <p:nvPr/>
+      </p:nvGrpSpPr>
+      <p:grpSpPr>
+        <a:xfrm>
+          <a:off x="0" y="0"/>
+          <a:ext cx="0" cy="0"/>
+          <a:chOff x="0" y="0"/>
+          <a:chExt cx="0" cy="0"/>
+        </a:xfrm>
+      </p:grpSpPr>
+      <p:sp>
+        <p:nvSpPr>
+          <p:cNvPr id="2" name="Title 1"/>
+          <p:cNvSpPr>
+            <a:spLocks noGrp="1"/>
+          </p:cNvSpPr>
+          <p:nvPr>
+            <p:ph type="title"/>
+          </p:nvPr>
+        </p:nvSpPr>
+        <p:spPr/>
+        <p:txBody>
+          <a:bodyPr/>
           <a:lstStyle/>
           <a:p>
             <a:r>
               <a:rPr lang="en-US" dirty="0" smtClean="0"/>
-              <a:t>Contexts</a:t>
-            </a:r>
+              <a:t>Maybe next time?</a:t>
+            </a:r>
+            <a:endParaRPr lang="en-US" dirty="0"/>
+          </a:p>
+        </p:txBody>
+      </p:sp>
+      <p:sp>
+        <p:nvSpPr>
+          <p:cNvPr id="3" name="Content Placeholder 2"/>
+          <p:cNvSpPr>
+            <a:spLocks noGrp="1"/>
+          </p:cNvSpPr>
+          <p:nvPr>
+            <p:ph idx="1"/>
+          </p:nvPr>
+        </p:nvSpPr>
+        <p:spPr/>
+        <p:txBody>
+          <a:bodyPr>
+            <a:normAutofit fontScale="62500" lnSpcReduction="20000"/>
+          </a:bodyPr>
+          <a:lstStyle/>
+          <a:p>
+            <a:r>
+              <a:rPr lang="en-US" dirty="0" smtClean="0"/>
+              <a:t>Context</a:t>
+            </a:r>
+          </a:p>
+          <a:p>
+            <a:pPr lvl="1"/>
+            <a:r>
+              <a:rPr lang="en-US" dirty="0" smtClean="0"/>
+              <a:t>Application, Session, Conversation</a:t>
+            </a:r>
+          </a:p>
+          <a:p>
+            <a:pPr lvl="1"/>
+            <a:r>
+              <a:rPr lang="en-US" dirty="0" err="1" smtClean="0"/>
+              <a:t>WebApp</a:t>
+            </a:r>
+            <a:endParaRPr lang="en-US" dirty="0" smtClean="0"/>
+          </a:p>
+          <a:p>
+            <a:pPr lvl="1"/>
+            <a:r>
+              <a:rPr lang="en-US" dirty="0" smtClean="0"/>
+              <a:t>Needed anymore with HTML5 and </a:t>
+            </a:r>
+            <a:r>
+              <a:rPr lang="en-US" dirty="0" err="1" smtClean="0"/>
+              <a:t>Microservices</a:t>
+            </a:r>
+            <a:r>
+              <a:rPr lang="en-US" dirty="0" smtClean="0"/>
+              <a:t>?</a:t>
+            </a:r>
+          </a:p>
+          <a:p>
+            <a:r>
+              <a:rPr lang="en-US" dirty="0" smtClean="0"/>
+              <a:t>Stereotype</a:t>
+            </a:r>
+          </a:p>
+          <a:p>
+            <a:pPr lvl="1"/>
+            <a:r>
+              <a:rPr lang="en-US" dirty="0" smtClean="0"/>
+              <a:t>Annotation of annotations</a:t>
+            </a:r>
+          </a:p>
+          <a:p>
+            <a:r>
+              <a:rPr lang="en-US" dirty="0" smtClean="0"/>
+              <a:t>Alternative</a:t>
+            </a:r>
+          </a:p>
+          <a:p>
+            <a:pPr lvl="1"/>
+            <a:r>
+              <a:rPr lang="en-US" dirty="0" smtClean="0"/>
+              <a:t>Bean replacement</a:t>
+            </a:r>
+          </a:p>
+          <a:p>
+            <a:pPr lvl="1"/>
+            <a:r>
+              <a:rPr lang="en-US" dirty="0" smtClean="0"/>
+              <a:t>Deployment time </a:t>
+            </a:r>
+            <a:r>
+              <a:rPr lang="en-US" dirty="0" err="1" smtClean="0"/>
+              <a:t>overrride</a:t>
+            </a:r>
+            <a:endParaRPr lang="en-US" dirty="0" smtClean="0"/>
+          </a:p>
+          <a:p>
+            <a:pPr lvl="1"/>
+            <a:r>
+              <a:rPr lang="en-US" dirty="0" smtClean="0"/>
+              <a:t>beans.xml</a:t>
+            </a:r>
+          </a:p>
+          <a:p>
+            <a:pPr lvl="2"/>
+            <a:r>
+              <a:rPr lang="en-US" dirty="0" smtClean="0"/>
+              <a:t>Testing, environments</a:t>
+            </a:r>
+          </a:p>
+          <a:p>
+            <a:r>
+              <a:rPr lang="en-US" dirty="0" smtClean="0"/>
+              <a:t>Specialization</a:t>
+            </a:r>
+          </a:p>
+          <a:p>
+            <a:pPr lvl="1"/>
+            <a:r>
+              <a:rPr lang="en-US" dirty="0" smtClean="0"/>
+              <a:t>Stricter Alternative</a:t>
+            </a:r>
+          </a:p>
+          <a:p>
+            <a:r>
+              <a:rPr lang="en-US" dirty="0" smtClean="0"/>
+              <a:t>Transactional Event</a:t>
+            </a:r>
+          </a:p>
+          <a:p>
+            <a:pPr lvl="1"/>
+            <a:r>
+              <a:rPr lang="en-US" dirty="0" smtClean="0"/>
+              <a:t>Bind to transaction phases</a:t>
+            </a:r>
+            <a:endParaRPr lang="en-US" dirty="0" smtClean="0"/>
           </a:p>
           <a:p>
             <a:endParaRPr lang="en-US" dirty="0" smtClean="0"/>
@@ -3916,7 +5046,7 @@
 </p:sld>
 </file>
 
-<file path=ppt/slides/slide11.xml><?xml version="1.0" encoding="utf-8"?>
+<file path=ppt/slides/slide12.xml><?xml version="1.0" encoding="utf-8"?>
 <p:sld xmlns:a="http://schemas.openxmlformats.org/drawingml/2006/main" xmlns:r="http://schemas.openxmlformats.org/officeDocument/2006/relationships" xmlns:p="http://schemas.openxmlformats.org/presentationml/2006/main">
   <p:cSld>
     <p:spTree>
@@ -4436,6 +5566,575 @@
     <p:extLst>
       <p:ext uri="{BB962C8B-B14F-4D97-AF65-F5344CB8AC3E}">
         <p14:creationId xmlns:p14="http://schemas.microsoft.com/office/powerpoint/2010/main" val="1490742660"/>
+      </p:ext>
+    </p:extLst>
+  </p:cSld>
+  <p:clrMapOvr>
+    <a:masterClrMapping/>
+  </p:clrMapOvr>
+  <p:timing>
+    <p:tnLst>
+      <p:par>
+        <p:cTn id="1" dur="indefinite" restart="never" nodeType="tmRoot"/>
+      </p:par>
+    </p:tnLst>
+  </p:timing>
+</p:sld>
+</file>
+
+<file path=ppt/slides/slide13.xml><?xml version="1.0" encoding="utf-8"?>
+<p:sld xmlns:a="http://schemas.openxmlformats.org/drawingml/2006/main" xmlns:r="http://schemas.openxmlformats.org/officeDocument/2006/relationships" xmlns:p="http://schemas.openxmlformats.org/presentationml/2006/main">
+  <p:cSld>
+    <p:spTree>
+      <p:nvGrpSpPr>
+        <p:cNvPr id="1" name=""/>
+        <p:cNvGrpSpPr/>
+        <p:nvPr/>
+      </p:nvGrpSpPr>
+      <p:grpSpPr>
+        <a:xfrm>
+          <a:off x="0" y="0"/>
+          <a:ext cx="0" cy="0"/>
+          <a:chOff x="0" y="0"/>
+          <a:chExt cx="0" cy="0"/>
+        </a:xfrm>
+      </p:grpSpPr>
+      <p:sp>
+        <p:nvSpPr>
+          <p:cNvPr id="2" name="Title 1"/>
+          <p:cNvSpPr>
+            <a:spLocks noGrp="1"/>
+          </p:cNvSpPr>
+          <p:nvPr>
+            <p:ph type="title"/>
+          </p:nvPr>
+        </p:nvSpPr>
+        <p:spPr/>
+        <p:txBody>
+          <a:bodyPr/>
+          <a:lstStyle/>
+          <a:p>
+            <a:r>
+              <a:rPr lang="en-US" dirty="0" smtClean="0"/>
+              <a:t>Tips</a:t>
+            </a:r>
+            <a:endParaRPr lang="en-US" dirty="0"/>
+          </a:p>
+        </p:txBody>
+      </p:sp>
+      <p:sp>
+        <p:nvSpPr>
+          <p:cNvPr id="3" name="Content Placeholder 2"/>
+          <p:cNvSpPr>
+            <a:spLocks noGrp="1"/>
+          </p:cNvSpPr>
+          <p:nvPr>
+            <p:ph idx="1"/>
+          </p:nvPr>
+        </p:nvSpPr>
+        <p:spPr/>
+        <p:txBody>
+          <a:bodyPr>
+            <a:normAutofit fontScale="92500" lnSpcReduction="20000"/>
+          </a:bodyPr>
+          <a:lstStyle/>
+          <a:p>
+            <a:r>
+              <a:rPr lang="en-US" dirty="0" smtClean="0"/>
+              <a:t>Name classes appropriately</a:t>
+            </a:r>
+          </a:p>
+          <a:p>
+            <a:pPr lvl="1"/>
+            <a:r>
+              <a:rPr lang="en-US" dirty="0" smtClean="0"/>
+              <a:t>*Producer</a:t>
+            </a:r>
+          </a:p>
+          <a:p>
+            <a:pPr lvl="1"/>
+            <a:r>
+              <a:rPr lang="en-US" dirty="0" smtClean="0"/>
+              <a:t>*Event</a:t>
+            </a:r>
+          </a:p>
+          <a:p>
+            <a:pPr lvl="1"/>
+            <a:r>
+              <a:rPr lang="en-US" dirty="0" smtClean="0"/>
+              <a:t>*Interceptor</a:t>
+            </a:r>
+          </a:p>
+          <a:p>
+            <a:pPr lvl="1"/>
+            <a:r>
+              <a:rPr lang="en-US" dirty="0" smtClean="0"/>
+              <a:t>*Decorator</a:t>
+            </a:r>
+          </a:p>
+          <a:p>
+            <a:pPr lvl="1"/>
+            <a:r>
+              <a:rPr lang="en-US" dirty="0" smtClean="0"/>
+              <a:t>*Observer ??</a:t>
+            </a:r>
+          </a:p>
+          <a:p>
+            <a:r>
+              <a:rPr lang="en-US" dirty="0" smtClean="0"/>
+              <a:t>Packaging</a:t>
+            </a:r>
+          </a:p>
+          <a:p>
+            <a:pPr lvl="1"/>
+            <a:r>
+              <a:rPr lang="en-US" dirty="0" smtClean="0"/>
+              <a:t>Layer vs. Function?  </a:t>
+            </a:r>
+          </a:p>
+          <a:p>
+            <a:r>
+              <a:rPr lang="en-US" dirty="0" smtClean="0"/>
+              <a:t>Keep event priority values centralized</a:t>
+            </a:r>
+          </a:p>
+          <a:p>
+            <a:pPr lvl="1"/>
+            <a:r>
+              <a:rPr lang="en-US" dirty="0" smtClean="0"/>
+              <a:t>Interface</a:t>
+            </a:r>
+          </a:p>
+          <a:p>
+            <a:endParaRPr lang="en-US" dirty="0"/>
+          </a:p>
+          <a:p>
+            <a:endParaRPr lang="en-US" dirty="0" smtClean="0"/>
+          </a:p>
+          <a:p>
+            <a:endParaRPr lang="en-US" dirty="0"/>
+          </a:p>
+          <a:p>
+            <a:endParaRPr lang="en-US" dirty="0"/>
+          </a:p>
+        </p:txBody>
+      </p:sp>
+      <p:sp>
+        <p:nvSpPr>
+          <p:cNvPr id="8" name="Content Placeholder 2"/>
+          <p:cNvSpPr txBox="1">
+            <a:spLocks/>
+          </p:cNvSpPr>
+          <p:nvPr/>
+        </p:nvSpPr>
+        <p:spPr>
+          <a:xfrm>
+            <a:off x="0" y="6489701"/>
+            <a:ext cx="9144000" cy="380999"/>
+          </a:xfrm>
+          <a:prstGeom prst="rect">
+            <a:avLst/>
+          </a:prstGeom>
+          <a:solidFill>
+            <a:srgbClr val="4D4D79"/>
+          </a:solidFill>
+        </p:spPr>
+        <p:txBody>
+          <a:bodyPr vert="horz" lIns="91440" tIns="45720" rIns="91440" bIns="45720" rtlCol="0">
+            <a:normAutofit/>
+          </a:bodyPr>
+          <a:lstStyle>
+            <a:lvl1pPr marL="342900" indent="-342900" algn="l" defTabSz="914400" rtl="0" eaLnBrk="1" latinLnBrk="0" hangingPunct="1">
+              <a:spcBef>
+                <a:spcPct val="20000"/>
+              </a:spcBef>
+              <a:buFont typeface="Arial" panose="020B0604020202020204" pitchFamily="34" charset="0"/>
+              <a:buChar char="•"/>
+              <a:defRPr sz="3200" kern="1200">
+                <a:solidFill>
+                  <a:schemeClr val="tx1"/>
+                </a:solidFill>
+                <a:latin typeface="+mn-lt"/>
+                <a:ea typeface="+mn-ea"/>
+                <a:cs typeface="+mn-cs"/>
+              </a:defRPr>
+            </a:lvl1pPr>
+            <a:lvl2pPr marL="742950" indent="-285750" algn="l" defTabSz="914400" rtl="0" eaLnBrk="1" latinLnBrk="0" hangingPunct="1">
+              <a:spcBef>
+                <a:spcPct val="20000"/>
+              </a:spcBef>
+              <a:buFont typeface="Arial" panose="020B0604020202020204" pitchFamily="34" charset="0"/>
+              <a:buChar char="–"/>
+              <a:defRPr sz="2800" kern="1200">
+                <a:solidFill>
+                  <a:schemeClr val="tx1"/>
+                </a:solidFill>
+                <a:latin typeface="+mn-lt"/>
+                <a:ea typeface="+mn-ea"/>
+                <a:cs typeface="+mn-cs"/>
+              </a:defRPr>
+            </a:lvl2pPr>
+            <a:lvl3pPr marL="1143000" indent="-228600" algn="l" defTabSz="914400" rtl="0" eaLnBrk="1" latinLnBrk="0" hangingPunct="1">
+              <a:spcBef>
+                <a:spcPct val="20000"/>
+              </a:spcBef>
+              <a:buFont typeface="Arial" panose="020B0604020202020204" pitchFamily="34" charset="0"/>
+              <a:buChar char="•"/>
+              <a:defRPr sz="2400" kern="1200">
+                <a:solidFill>
+                  <a:schemeClr val="tx1"/>
+                </a:solidFill>
+                <a:latin typeface="+mn-lt"/>
+                <a:ea typeface="+mn-ea"/>
+                <a:cs typeface="+mn-cs"/>
+              </a:defRPr>
+            </a:lvl3pPr>
+            <a:lvl4pPr marL="1600200" indent="-228600" algn="l" defTabSz="914400" rtl="0" eaLnBrk="1" latinLnBrk="0" hangingPunct="1">
+              <a:spcBef>
+                <a:spcPct val="20000"/>
+              </a:spcBef>
+              <a:buFont typeface="Arial" panose="020B0604020202020204" pitchFamily="34" charset="0"/>
+              <a:buChar char="–"/>
+              <a:defRPr sz="2000" kern="1200">
+                <a:solidFill>
+                  <a:schemeClr val="tx1"/>
+                </a:solidFill>
+                <a:latin typeface="+mn-lt"/>
+                <a:ea typeface="+mn-ea"/>
+                <a:cs typeface="+mn-cs"/>
+              </a:defRPr>
+            </a:lvl4pPr>
+            <a:lvl5pPr marL="2057400" indent="-228600" algn="l" defTabSz="914400" rtl="0" eaLnBrk="1" latinLnBrk="0" hangingPunct="1">
+              <a:spcBef>
+                <a:spcPct val="20000"/>
+              </a:spcBef>
+              <a:buFont typeface="Arial" panose="020B0604020202020204" pitchFamily="34" charset="0"/>
+              <a:buChar char="»"/>
+              <a:defRPr sz="2000" kern="1200">
+                <a:solidFill>
+                  <a:schemeClr val="tx1"/>
+                </a:solidFill>
+                <a:latin typeface="+mn-lt"/>
+                <a:ea typeface="+mn-ea"/>
+                <a:cs typeface="+mn-cs"/>
+              </a:defRPr>
+            </a:lvl5pPr>
+            <a:lvl6pPr marL="2514600" indent="-228600" algn="l" defTabSz="914400" rtl="0" eaLnBrk="1" latinLnBrk="0" hangingPunct="1">
+              <a:spcBef>
+                <a:spcPct val="20000"/>
+              </a:spcBef>
+              <a:buFont typeface="Arial" panose="020B0604020202020204" pitchFamily="34" charset="0"/>
+              <a:buChar char="•"/>
+              <a:defRPr sz="2000" kern="1200">
+                <a:solidFill>
+                  <a:schemeClr val="tx1"/>
+                </a:solidFill>
+                <a:latin typeface="+mn-lt"/>
+                <a:ea typeface="+mn-ea"/>
+                <a:cs typeface="+mn-cs"/>
+              </a:defRPr>
+            </a:lvl6pPr>
+            <a:lvl7pPr marL="2971800" indent="-228600" algn="l" defTabSz="914400" rtl="0" eaLnBrk="1" latinLnBrk="0" hangingPunct="1">
+              <a:spcBef>
+                <a:spcPct val="20000"/>
+              </a:spcBef>
+              <a:buFont typeface="Arial" panose="020B0604020202020204" pitchFamily="34" charset="0"/>
+              <a:buChar char="•"/>
+              <a:defRPr sz="2000" kern="1200">
+                <a:solidFill>
+                  <a:schemeClr val="tx1"/>
+                </a:solidFill>
+                <a:latin typeface="+mn-lt"/>
+                <a:ea typeface="+mn-ea"/>
+                <a:cs typeface="+mn-cs"/>
+              </a:defRPr>
+            </a:lvl7pPr>
+            <a:lvl8pPr marL="3429000" indent="-228600" algn="l" defTabSz="914400" rtl="0" eaLnBrk="1" latinLnBrk="0" hangingPunct="1">
+              <a:spcBef>
+                <a:spcPct val="20000"/>
+              </a:spcBef>
+              <a:buFont typeface="Arial" panose="020B0604020202020204" pitchFamily="34" charset="0"/>
+              <a:buChar char="•"/>
+              <a:defRPr sz="2000" kern="1200">
+                <a:solidFill>
+                  <a:schemeClr val="tx1"/>
+                </a:solidFill>
+                <a:latin typeface="+mn-lt"/>
+                <a:ea typeface="+mn-ea"/>
+                <a:cs typeface="+mn-cs"/>
+              </a:defRPr>
+            </a:lvl8pPr>
+            <a:lvl9pPr marL="3886200" indent="-228600" algn="l" defTabSz="914400" rtl="0" eaLnBrk="1" latinLnBrk="0" hangingPunct="1">
+              <a:spcBef>
+                <a:spcPct val="20000"/>
+              </a:spcBef>
+              <a:buFont typeface="Arial" panose="020B0604020202020204" pitchFamily="34" charset="0"/>
+              <a:buChar char="•"/>
+              <a:defRPr sz="2000" kern="1200">
+                <a:solidFill>
+                  <a:schemeClr val="tx1"/>
+                </a:solidFill>
+                <a:latin typeface="+mn-lt"/>
+                <a:ea typeface="+mn-ea"/>
+                <a:cs typeface="+mn-cs"/>
+              </a:defRPr>
+            </a:lvl9pPr>
+          </a:lstStyle>
+          <a:p>
+            <a:pPr marL="0" indent="0" algn="ctr">
+              <a:buNone/>
+            </a:pPr>
+            <a:r>
+              <a:rPr lang="en-US" sz="1600" dirty="0">
+                <a:solidFill>
+                  <a:schemeClr val="bg1"/>
+                </a:solidFill>
+              </a:rPr>
+              <a:t>Michael Remijan      mjremijan@yahoo.com      @</a:t>
+            </a:r>
+            <a:r>
+              <a:rPr lang="en-US" sz="1600" dirty="0" err="1">
+                <a:solidFill>
+                  <a:schemeClr val="bg1"/>
+                </a:solidFill>
+              </a:rPr>
+              <a:t>mjremijan</a:t>
+            </a:r>
+            <a:r>
+              <a:rPr lang="en-US" sz="1600" dirty="0">
+                <a:solidFill>
+                  <a:schemeClr val="bg1"/>
+                </a:solidFill>
+              </a:rPr>
+              <a:t>      github.com/</a:t>
+            </a:r>
+            <a:r>
+              <a:rPr lang="en-US" sz="1600" dirty="0" err="1">
+                <a:solidFill>
+                  <a:schemeClr val="bg1"/>
+                </a:solidFill>
+              </a:rPr>
+              <a:t>mjremijan</a:t>
+            </a:r>
+            <a:r>
+              <a:rPr lang="en-US" sz="1600" dirty="0">
+                <a:solidFill>
+                  <a:schemeClr val="bg1"/>
+                </a:solidFill>
+              </a:rPr>
+              <a:t>/</a:t>
+            </a:r>
+            <a:r>
+              <a:rPr lang="en-US" sz="1600" dirty="0" err="1">
+                <a:solidFill>
+                  <a:schemeClr val="bg1"/>
+                </a:solidFill>
+              </a:rPr>
+              <a:t>ferris</a:t>
+            </a:r>
+            <a:r>
+              <a:rPr lang="en-US" sz="1600" dirty="0">
+                <a:solidFill>
+                  <a:schemeClr val="bg1"/>
+                </a:solidFill>
+              </a:rPr>
+              <a:t>-cdi-presentation</a:t>
+            </a:r>
+          </a:p>
+          <a:p>
+            <a:endParaRPr lang="en-US" dirty="0" smtClean="0"/>
+          </a:p>
+          <a:p>
+            <a:endParaRPr lang="en-US" dirty="0"/>
+          </a:p>
+        </p:txBody>
+      </p:sp>
+      <p:sp>
+        <p:nvSpPr>
+          <p:cNvPr id="9" name="Content Placeholder 2"/>
+          <p:cNvSpPr txBox="1">
+            <a:spLocks/>
+          </p:cNvSpPr>
+          <p:nvPr/>
+        </p:nvSpPr>
+        <p:spPr>
+          <a:xfrm>
+            <a:off x="0" y="0"/>
+            <a:ext cx="9144000" cy="380999"/>
+          </a:xfrm>
+          <a:prstGeom prst="rect">
+            <a:avLst/>
+          </a:prstGeom>
+          <a:solidFill>
+            <a:srgbClr val="4D4D79"/>
+          </a:solidFill>
+        </p:spPr>
+        <p:txBody>
+          <a:bodyPr vert="horz" lIns="91440" tIns="45720" rIns="91440" bIns="45720" rtlCol="0">
+            <a:normAutofit/>
+          </a:bodyPr>
+          <a:lstStyle>
+            <a:lvl1pPr marL="342900" indent="-342900" algn="l" defTabSz="914400" rtl="0" eaLnBrk="1" latinLnBrk="0" hangingPunct="1">
+              <a:spcBef>
+                <a:spcPct val="20000"/>
+              </a:spcBef>
+              <a:buFont typeface="Arial" panose="020B0604020202020204" pitchFamily="34" charset="0"/>
+              <a:buChar char="•"/>
+              <a:defRPr sz="3200" kern="1200">
+                <a:solidFill>
+                  <a:schemeClr val="tx1"/>
+                </a:solidFill>
+                <a:latin typeface="+mn-lt"/>
+                <a:ea typeface="+mn-ea"/>
+                <a:cs typeface="+mn-cs"/>
+              </a:defRPr>
+            </a:lvl1pPr>
+            <a:lvl2pPr marL="742950" indent="-285750" algn="l" defTabSz="914400" rtl="0" eaLnBrk="1" latinLnBrk="0" hangingPunct="1">
+              <a:spcBef>
+                <a:spcPct val="20000"/>
+              </a:spcBef>
+              <a:buFont typeface="Arial" panose="020B0604020202020204" pitchFamily="34" charset="0"/>
+              <a:buChar char="–"/>
+              <a:defRPr sz="2800" kern="1200">
+                <a:solidFill>
+                  <a:schemeClr val="tx1"/>
+                </a:solidFill>
+                <a:latin typeface="+mn-lt"/>
+                <a:ea typeface="+mn-ea"/>
+                <a:cs typeface="+mn-cs"/>
+              </a:defRPr>
+            </a:lvl2pPr>
+            <a:lvl3pPr marL="1143000" indent="-228600" algn="l" defTabSz="914400" rtl="0" eaLnBrk="1" latinLnBrk="0" hangingPunct="1">
+              <a:spcBef>
+                <a:spcPct val="20000"/>
+              </a:spcBef>
+              <a:buFont typeface="Arial" panose="020B0604020202020204" pitchFamily="34" charset="0"/>
+              <a:buChar char="•"/>
+              <a:defRPr sz="2400" kern="1200">
+                <a:solidFill>
+                  <a:schemeClr val="tx1"/>
+                </a:solidFill>
+                <a:latin typeface="+mn-lt"/>
+                <a:ea typeface="+mn-ea"/>
+                <a:cs typeface="+mn-cs"/>
+              </a:defRPr>
+            </a:lvl3pPr>
+            <a:lvl4pPr marL="1600200" indent="-228600" algn="l" defTabSz="914400" rtl="0" eaLnBrk="1" latinLnBrk="0" hangingPunct="1">
+              <a:spcBef>
+                <a:spcPct val="20000"/>
+              </a:spcBef>
+              <a:buFont typeface="Arial" panose="020B0604020202020204" pitchFamily="34" charset="0"/>
+              <a:buChar char="–"/>
+              <a:defRPr sz="2000" kern="1200">
+                <a:solidFill>
+                  <a:schemeClr val="tx1"/>
+                </a:solidFill>
+                <a:latin typeface="+mn-lt"/>
+                <a:ea typeface="+mn-ea"/>
+                <a:cs typeface="+mn-cs"/>
+              </a:defRPr>
+            </a:lvl4pPr>
+            <a:lvl5pPr marL="2057400" indent="-228600" algn="l" defTabSz="914400" rtl="0" eaLnBrk="1" latinLnBrk="0" hangingPunct="1">
+              <a:spcBef>
+                <a:spcPct val="20000"/>
+              </a:spcBef>
+              <a:buFont typeface="Arial" panose="020B0604020202020204" pitchFamily="34" charset="0"/>
+              <a:buChar char="»"/>
+              <a:defRPr sz="2000" kern="1200">
+                <a:solidFill>
+                  <a:schemeClr val="tx1"/>
+                </a:solidFill>
+                <a:latin typeface="+mn-lt"/>
+                <a:ea typeface="+mn-ea"/>
+                <a:cs typeface="+mn-cs"/>
+              </a:defRPr>
+            </a:lvl5pPr>
+            <a:lvl6pPr marL="2514600" indent="-228600" algn="l" defTabSz="914400" rtl="0" eaLnBrk="1" latinLnBrk="0" hangingPunct="1">
+              <a:spcBef>
+                <a:spcPct val="20000"/>
+              </a:spcBef>
+              <a:buFont typeface="Arial" panose="020B0604020202020204" pitchFamily="34" charset="0"/>
+              <a:buChar char="•"/>
+              <a:defRPr sz="2000" kern="1200">
+                <a:solidFill>
+                  <a:schemeClr val="tx1"/>
+                </a:solidFill>
+                <a:latin typeface="+mn-lt"/>
+                <a:ea typeface="+mn-ea"/>
+                <a:cs typeface="+mn-cs"/>
+              </a:defRPr>
+            </a:lvl6pPr>
+            <a:lvl7pPr marL="2971800" indent="-228600" algn="l" defTabSz="914400" rtl="0" eaLnBrk="1" latinLnBrk="0" hangingPunct="1">
+              <a:spcBef>
+                <a:spcPct val="20000"/>
+              </a:spcBef>
+              <a:buFont typeface="Arial" panose="020B0604020202020204" pitchFamily="34" charset="0"/>
+              <a:buChar char="•"/>
+              <a:defRPr sz="2000" kern="1200">
+                <a:solidFill>
+                  <a:schemeClr val="tx1"/>
+                </a:solidFill>
+                <a:latin typeface="+mn-lt"/>
+                <a:ea typeface="+mn-ea"/>
+                <a:cs typeface="+mn-cs"/>
+              </a:defRPr>
+            </a:lvl7pPr>
+            <a:lvl8pPr marL="3429000" indent="-228600" algn="l" defTabSz="914400" rtl="0" eaLnBrk="1" latinLnBrk="0" hangingPunct="1">
+              <a:spcBef>
+                <a:spcPct val="20000"/>
+              </a:spcBef>
+              <a:buFont typeface="Arial" panose="020B0604020202020204" pitchFamily="34" charset="0"/>
+              <a:buChar char="•"/>
+              <a:defRPr sz="2000" kern="1200">
+                <a:solidFill>
+                  <a:schemeClr val="tx1"/>
+                </a:solidFill>
+                <a:latin typeface="+mn-lt"/>
+                <a:ea typeface="+mn-ea"/>
+                <a:cs typeface="+mn-cs"/>
+              </a:defRPr>
+            </a:lvl8pPr>
+            <a:lvl9pPr marL="3886200" indent="-228600" algn="l" defTabSz="914400" rtl="0" eaLnBrk="1" latinLnBrk="0" hangingPunct="1">
+              <a:spcBef>
+                <a:spcPct val="20000"/>
+              </a:spcBef>
+              <a:buFont typeface="Arial" panose="020B0604020202020204" pitchFamily="34" charset="0"/>
+              <a:buChar char="•"/>
+              <a:defRPr sz="2000" kern="1200">
+                <a:solidFill>
+                  <a:schemeClr val="tx1"/>
+                </a:solidFill>
+                <a:latin typeface="+mn-lt"/>
+                <a:ea typeface="+mn-ea"/>
+                <a:cs typeface="+mn-cs"/>
+              </a:defRPr>
+            </a:lvl9pPr>
+          </a:lstStyle>
+          <a:p>
+            <a:pPr marL="0" indent="0" algn="ctr">
+              <a:buNone/>
+            </a:pPr>
+            <a:r>
+              <a:rPr lang="en-US" sz="1600" dirty="0" smtClean="0">
+                <a:solidFill>
+                  <a:schemeClr val="bg1"/>
+                </a:solidFill>
+              </a:rPr>
+              <a:t>CDI</a:t>
+            </a:r>
+          </a:p>
+          <a:p>
+            <a:endParaRPr lang="en-US" dirty="0" smtClean="0"/>
+          </a:p>
+          <a:p>
+            <a:endParaRPr lang="en-US" dirty="0"/>
+          </a:p>
+        </p:txBody>
+      </p:sp>
+    </p:spTree>
+    <p:extLst>
+      <p:ext uri="{BB962C8B-B14F-4D97-AF65-F5344CB8AC3E}">
+        <p14:creationId xmlns:p14="http://schemas.microsoft.com/office/powerpoint/2010/main" val="647812747"/>
       </p:ext>
     </p:extLst>
   </p:cSld>
@@ -5567,13 +7266,13 @@
               <a:rPr lang="en-US" dirty="0" smtClean="0"/>
               <a:t>Resources</a:t>
             </a:r>
+            <a:endParaRPr lang="en-US" dirty="0" smtClean="0"/>
           </a:p>
           <a:p>
             <a:r>
               <a:rPr lang="en-US" dirty="0" smtClean="0"/>
               <a:t>History</a:t>
             </a:r>
-            <a:endParaRPr lang="en-US" dirty="0" smtClean="0"/>
           </a:p>
           <a:p>
             <a:r>
@@ -5584,8 +7283,9 @@
           <a:p>
             <a:r>
               <a:rPr lang="en-US" dirty="0" smtClean="0"/>
-              <a:t>Topics</a:t>
-            </a:r>
+              <a:t>This time…</a:t>
+            </a:r>
+            <a:endParaRPr lang="en-US" dirty="0" smtClean="0"/>
           </a:p>
           <a:p>
             <a:r>
@@ -5630,8 +7330,8 @@
         </p:blipFill>
         <p:spPr bwMode="auto">
           <a:xfrm>
-            <a:off x="607356" y="1600200"/>
-            <a:ext cx="614089" cy="614089"/>
+            <a:off x="414669" y="1674632"/>
+            <a:ext cx="752318" cy="752318"/>
           </a:xfrm>
           <a:prstGeom prst="rect">
             <a:avLst/>
@@ -6132,13 +7832,13 @@
         </p:nvSpPr>
         <p:spPr>
           <a:xfrm>
-            <a:off x="457200" y="1600200"/>
-            <a:ext cx="4724400" cy="4525963"/>
+            <a:off x="1421360" y="1600200"/>
+            <a:ext cx="7036840" cy="4343400"/>
           </a:xfrm>
         </p:spPr>
         <p:txBody>
           <a:bodyPr>
-            <a:normAutofit/>
+            <a:noAutofit/>
           </a:bodyPr>
           <a:lstStyle/>
           <a:p>
@@ -6147,8 +7847,9 @@
             </a:pPr>
             <a:r>
               <a:rPr lang="en-US" sz="2000" b="1" dirty="0" smtClean="0"/>
-              <a:t>Project website</a:t>
-            </a:r>
+              <a:t>Project</a:t>
+            </a:r>
+            <a:endParaRPr lang="en-US" sz="2000" b="1" dirty="0" smtClean="0"/>
           </a:p>
           <a:p>
             <a:pPr marL="0" indent="0">
@@ -6158,7 +7859,7 @@
               <a:rPr lang="en-US" sz="2000" dirty="0" smtClean="0">
                 <a:hlinkClick r:id="rId2"/>
               </a:rPr>
-              <a:t>http://www.cdi-spec.org/download/</a:t>
+              <a:t>http://www.cdi-spec.org</a:t>
             </a:r>
             <a:endParaRPr lang="en-US" sz="2000" dirty="0" smtClean="0"/>
           </a:p>
@@ -6174,8 +7875,9 @@
             </a:pPr>
             <a:r>
               <a:rPr lang="en-US" sz="2000" b="1" dirty="0" smtClean="0"/>
-              <a:t>JSR</a:t>
-            </a:r>
+              <a:t>JSR (CDI 2.0)</a:t>
+            </a:r>
+            <a:endParaRPr lang="en-US" sz="2000" b="1" dirty="0" smtClean="0"/>
           </a:p>
           <a:p>
             <a:pPr marL="0" indent="0">
@@ -6209,9 +7911,16 @@
               <a:buNone/>
             </a:pPr>
             <a:r>
+              <a:rPr lang="en-US" sz="2000" dirty="0" smtClean="0">
+                <a:hlinkClick r:id="rId4"/>
+              </a:rPr>
+              <a:t>http://weld.cdi-spec.org</a:t>
+            </a:r>
+            <a:r>
               <a:rPr lang="en-US" sz="2000" dirty="0" smtClean="0"/>
-              <a:t>http://weld.cdi-spec.org/</a:t>
-            </a:r>
+              <a:t> </a:t>
+            </a:r>
+            <a:endParaRPr lang="en-US" sz="2000" dirty="0" smtClean="0"/>
           </a:p>
           <a:p>
             <a:pPr marL="0" indent="0">
@@ -6234,9 +7943,16 @@
               <a:buNone/>
             </a:pPr>
             <a:r>
-              <a:rPr lang="en-US" sz="2000" dirty="0"/>
-              <a:t>https://docs.oracle.com/javaee/7/tutorial/</a:t>
-            </a:r>
+              <a:rPr lang="en-US" sz="2000" dirty="0" smtClean="0">
+                <a:hlinkClick r:id="rId5"/>
+              </a:rPr>
+              <a:t>https://docs.oracle.com/javaee/7/tutorial</a:t>
+            </a:r>
+            <a:r>
+              <a:rPr lang="en-US" sz="2000" dirty="0" smtClean="0"/>
+              <a:t> </a:t>
+            </a:r>
+            <a:endParaRPr lang="en-US" sz="2000" dirty="0"/>
           </a:p>
         </p:txBody>
       </p:sp>
@@ -6652,261 +8368,6 @@
           </a:p>
         </p:txBody>
       </p:sp>
-      <p:sp>
-        <p:nvSpPr>
-          <p:cNvPr id="7" name="Content Placeholder 2"/>
-          <p:cNvSpPr txBox="1">
-            <a:spLocks/>
-          </p:cNvSpPr>
-          <p:nvPr/>
-        </p:nvSpPr>
-        <p:spPr>
-          <a:xfrm>
-            <a:off x="4572000" y="1600200"/>
-            <a:ext cx="4572000" cy="4525963"/>
-          </a:xfrm>
-          <a:prstGeom prst="rect">
-            <a:avLst/>
-          </a:prstGeom>
-        </p:spPr>
-        <p:txBody>
-          <a:bodyPr vert="horz" lIns="91440" tIns="45720" rIns="91440" bIns="45720" rtlCol="0">
-            <a:normAutofit/>
-          </a:bodyPr>
-          <a:lstStyle>
-            <a:lvl1pPr marL="342900" indent="-342900" algn="l" defTabSz="914400" rtl="0" eaLnBrk="1" latinLnBrk="0" hangingPunct="1">
-              <a:spcBef>
-                <a:spcPct val="20000"/>
-              </a:spcBef>
-              <a:buFont typeface="Arial" panose="020B0604020202020204" pitchFamily="34" charset="0"/>
-              <a:buChar char="•"/>
-              <a:defRPr sz="3200" kern="1200">
-                <a:solidFill>
-                  <a:schemeClr val="tx1"/>
-                </a:solidFill>
-                <a:latin typeface="+mn-lt"/>
-                <a:ea typeface="+mn-ea"/>
-                <a:cs typeface="+mn-cs"/>
-              </a:defRPr>
-            </a:lvl1pPr>
-            <a:lvl2pPr marL="742950" indent="-285750" algn="l" defTabSz="914400" rtl="0" eaLnBrk="1" latinLnBrk="0" hangingPunct="1">
-              <a:spcBef>
-                <a:spcPct val="20000"/>
-              </a:spcBef>
-              <a:buFont typeface="Arial" panose="020B0604020202020204" pitchFamily="34" charset="0"/>
-              <a:buChar char="–"/>
-              <a:defRPr sz="2800" kern="1200">
-                <a:solidFill>
-                  <a:schemeClr val="tx1"/>
-                </a:solidFill>
-                <a:latin typeface="+mn-lt"/>
-                <a:ea typeface="+mn-ea"/>
-                <a:cs typeface="+mn-cs"/>
-              </a:defRPr>
-            </a:lvl2pPr>
-            <a:lvl3pPr marL="1143000" indent="-228600" algn="l" defTabSz="914400" rtl="0" eaLnBrk="1" latinLnBrk="0" hangingPunct="1">
-              <a:spcBef>
-                <a:spcPct val="20000"/>
-              </a:spcBef>
-              <a:buFont typeface="Arial" panose="020B0604020202020204" pitchFamily="34" charset="0"/>
-              <a:buChar char="•"/>
-              <a:defRPr sz="2400" kern="1200">
-                <a:solidFill>
-                  <a:schemeClr val="tx1"/>
-                </a:solidFill>
-                <a:latin typeface="+mn-lt"/>
-                <a:ea typeface="+mn-ea"/>
-                <a:cs typeface="+mn-cs"/>
-              </a:defRPr>
-            </a:lvl3pPr>
-            <a:lvl4pPr marL="1600200" indent="-228600" algn="l" defTabSz="914400" rtl="0" eaLnBrk="1" latinLnBrk="0" hangingPunct="1">
-              <a:spcBef>
-                <a:spcPct val="20000"/>
-              </a:spcBef>
-              <a:buFont typeface="Arial" panose="020B0604020202020204" pitchFamily="34" charset="0"/>
-              <a:buChar char="–"/>
-              <a:defRPr sz="2000" kern="1200">
-                <a:solidFill>
-                  <a:schemeClr val="tx1"/>
-                </a:solidFill>
-                <a:latin typeface="+mn-lt"/>
-                <a:ea typeface="+mn-ea"/>
-                <a:cs typeface="+mn-cs"/>
-              </a:defRPr>
-            </a:lvl4pPr>
-            <a:lvl5pPr marL="2057400" indent="-228600" algn="l" defTabSz="914400" rtl="0" eaLnBrk="1" latinLnBrk="0" hangingPunct="1">
-              <a:spcBef>
-                <a:spcPct val="20000"/>
-              </a:spcBef>
-              <a:buFont typeface="Arial" panose="020B0604020202020204" pitchFamily="34" charset="0"/>
-              <a:buChar char="»"/>
-              <a:defRPr sz="2000" kern="1200">
-                <a:solidFill>
-                  <a:schemeClr val="tx1"/>
-                </a:solidFill>
-                <a:latin typeface="+mn-lt"/>
-                <a:ea typeface="+mn-ea"/>
-                <a:cs typeface="+mn-cs"/>
-              </a:defRPr>
-            </a:lvl5pPr>
-            <a:lvl6pPr marL="2514600" indent="-228600" algn="l" defTabSz="914400" rtl="0" eaLnBrk="1" latinLnBrk="0" hangingPunct="1">
-              <a:spcBef>
-                <a:spcPct val="20000"/>
-              </a:spcBef>
-              <a:buFont typeface="Arial" panose="020B0604020202020204" pitchFamily="34" charset="0"/>
-              <a:buChar char="•"/>
-              <a:defRPr sz="2000" kern="1200">
-                <a:solidFill>
-                  <a:schemeClr val="tx1"/>
-                </a:solidFill>
-                <a:latin typeface="+mn-lt"/>
-                <a:ea typeface="+mn-ea"/>
-                <a:cs typeface="+mn-cs"/>
-              </a:defRPr>
-            </a:lvl6pPr>
-            <a:lvl7pPr marL="2971800" indent="-228600" algn="l" defTabSz="914400" rtl="0" eaLnBrk="1" latinLnBrk="0" hangingPunct="1">
-              <a:spcBef>
-                <a:spcPct val="20000"/>
-              </a:spcBef>
-              <a:buFont typeface="Arial" panose="020B0604020202020204" pitchFamily="34" charset="0"/>
-              <a:buChar char="•"/>
-              <a:defRPr sz="2000" kern="1200">
-                <a:solidFill>
-                  <a:schemeClr val="tx1"/>
-                </a:solidFill>
-                <a:latin typeface="+mn-lt"/>
-                <a:ea typeface="+mn-ea"/>
-                <a:cs typeface="+mn-cs"/>
-              </a:defRPr>
-            </a:lvl7pPr>
-            <a:lvl8pPr marL="3429000" indent="-228600" algn="l" defTabSz="914400" rtl="0" eaLnBrk="1" latinLnBrk="0" hangingPunct="1">
-              <a:spcBef>
-                <a:spcPct val="20000"/>
-              </a:spcBef>
-              <a:buFont typeface="Arial" panose="020B0604020202020204" pitchFamily="34" charset="0"/>
-              <a:buChar char="•"/>
-              <a:defRPr sz="2000" kern="1200">
-                <a:solidFill>
-                  <a:schemeClr val="tx1"/>
-                </a:solidFill>
-                <a:latin typeface="+mn-lt"/>
-                <a:ea typeface="+mn-ea"/>
-                <a:cs typeface="+mn-cs"/>
-              </a:defRPr>
-            </a:lvl8pPr>
-            <a:lvl9pPr marL="3886200" indent="-228600" algn="l" defTabSz="914400" rtl="0" eaLnBrk="1" latinLnBrk="0" hangingPunct="1">
-              <a:spcBef>
-                <a:spcPct val="20000"/>
-              </a:spcBef>
-              <a:buFont typeface="Arial" panose="020B0604020202020204" pitchFamily="34" charset="0"/>
-              <a:buChar char="•"/>
-              <a:defRPr sz="2000" kern="1200">
-                <a:solidFill>
-                  <a:schemeClr val="tx1"/>
-                </a:solidFill>
-                <a:latin typeface="+mn-lt"/>
-                <a:ea typeface="+mn-ea"/>
-                <a:cs typeface="+mn-cs"/>
-              </a:defRPr>
-            </a:lvl9pPr>
-          </a:lstStyle>
-          <a:p>
-            <a:pPr marL="0" indent="0">
-              <a:buFont typeface="Arial" panose="020B0604020202020204" pitchFamily="34" charset="0"/>
-              <a:buNone/>
-            </a:pPr>
-            <a:r>
-              <a:rPr lang="en-US" sz="2000" b="1" dirty="0" smtClean="0"/>
-              <a:t>Maven</a:t>
-            </a:r>
-          </a:p>
-          <a:p>
-            <a:pPr marL="0" indent="0">
-              <a:buFont typeface="Arial" panose="020B0604020202020204" pitchFamily="34" charset="0"/>
-              <a:buNone/>
-            </a:pPr>
-            <a:r>
-              <a:rPr lang="en-US" sz="2000" dirty="0" smtClean="0"/>
-              <a:t>&lt;dependency&gt;</a:t>
-            </a:r>
-          </a:p>
-          <a:p>
-            <a:pPr marL="0" indent="0">
-              <a:buFont typeface="Arial" panose="020B0604020202020204" pitchFamily="34" charset="0"/>
-              <a:buNone/>
-            </a:pPr>
-            <a:r>
-              <a:rPr lang="en-US" sz="2000" dirty="0" smtClean="0"/>
-              <a:t>   &lt;</a:t>
-            </a:r>
-            <a:r>
-              <a:rPr lang="en-US" sz="2000" dirty="0" err="1" smtClean="0"/>
-              <a:t>groupId</a:t>
-            </a:r>
-            <a:r>
-              <a:rPr lang="en-US" sz="2000" dirty="0" smtClean="0"/>
-              <a:t>&gt;org.jboss.weld.se&lt;/</a:t>
-            </a:r>
-            <a:r>
-              <a:rPr lang="en-US" sz="2000" dirty="0" err="1" smtClean="0"/>
-              <a:t>groupId</a:t>
-            </a:r>
-            <a:r>
-              <a:rPr lang="en-US" sz="2000" dirty="0" smtClean="0"/>
-              <a:t>&gt;</a:t>
-            </a:r>
-          </a:p>
-          <a:p>
-            <a:pPr marL="0" indent="0">
-              <a:buFont typeface="Arial" panose="020B0604020202020204" pitchFamily="34" charset="0"/>
-              <a:buNone/>
-            </a:pPr>
-            <a:r>
-              <a:rPr lang="en-US" sz="2000" dirty="0" smtClean="0"/>
-              <a:t>    &lt;</a:t>
-            </a:r>
-            <a:r>
-              <a:rPr lang="en-US" sz="2000" dirty="0" err="1" smtClean="0"/>
-              <a:t>artifactId</a:t>
-            </a:r>
-            <a:r>
-              <a:rPr lang="en-US" sz="2000" dirty="0" smtClean="0"/>
-              <a:t>&gt;weld-se-core&lt;/</a:t>
-            </a:r>
-            <a:r>
-              <a:rPr lang="en-US" sz="2000" dirty="0" err="1" smtClean="0"/>
-              <a:t>artifactId</a:t>
-            </a:r>
-            <a:r>
-              <a:rPr lang="en-US" sz="2000" dirty="0" smtClean="0"/>
-              <a:t>&gt;</a:t>
-            </a:r>
-          </a:p>
-          <a:p>
-            <a:pPr marL="0" indent="0">
-              <a:buFont typeface="Arial" panose="020B0604020202020204" pitchFamily="34" charset="0"/>
-              <a:buNone/>
-            </a:pPr>
-            <a:r>
-              <a:rPr lang="en-US" sz="2000" dirty="0" smtClean="0"/>
-              <a:t>    &lt;version&gt;3.0.0.Alpha13&lt;/version&gt;</a:t>
-            </a:r>
-          </a:p>
-          <a:p>
-            <a:pPr marL="0" indent="0">
-              <a:buFont typeface="Arial" panose="020B0604020202020204" pitchFamily="34" charset="0"/>
-              <a:buNone/>
-            </a:pPr>
-            <a:r>
-              <a:rPr lang="en-US" sz="2000" dirty="0" smtClean="0"/>
-              <a:t>&lt;/dependency&gt;</a:t>
-            </a:r>
-          </a:p>
-          <a:p>
-            <a:endParaRPr lang="en-US" dirty="0"/>
-          </a:p>
-        </p:txBody>
-      </p:sp>
       <p:pic>
         <p:nvPicPr>
           <p:cNvPr id="1026" name="Picture 2" descr="http://ecx.images-amazon.com/images/I/51mCp7z3AhL._SX390_BO1,204,203,200_.jpg"/>
@@ -6916,7 +8377,7 @@
           <p:nvPr/>
         </p:nvPicPr>
         <p:blipFill>
-          <a:blip r:embed="rId4" cstate="print">
+          <a:blip r:embed="rId6" cstate="print">
             <a:extLst>
               <a:ext uri="{28A0092B-C50C-407E-A947-70E740481C1C}">
                 <a14:useLocalDpi xmlns:a14="http://schemas.microsoft.com/office/drawing/2010/main" val="0"/>
@@ -6930,8 +8391,8 @@
         </p:blipFill>
         <p:spPr bwMode="auto">
           <a:xfrm>
-            <a:off x="5562600" y="4186173"/>
-            <a:ext cx="1524000" cy="1939990"/>
+            <a:off x="586565" y="4800600"/>
+            <a:ext cx="762000" cy="969995"/>
           </a:xfrm>
           <a:prstGeom prst="rect">
             <a:avLst/>
@@ -6948,10 +8409,239 @@
           </a:extLst>
         </p:spPr>
       </p:pic>
+      <p:pic>
+        <p:nvPicPr>
+          <p:cNvPr id="10" name="Picture 2"/>
+          <p:cNvPicPr>
+            <a:picLocks noChangeAspect="1" noChangeArrowheads="1"/>
+          </p:cNvPicPr>
+          <p:nvPr/>
+        </p:nvPicPr>
+        <p:blipFill rotWithShape="1">
+          <a:blip r:embed="rId7" cstate="print">
+            <a:extLst>
+              <a:ext uri="{28A0092B-C50C-407E-A947-70E740481C1C}">
+                <a14:useLocalDpi xmlns:a14="http://schemas.microsoft.com/office/drawing/2010/main" val="0"/>
+              </a:ext>
+            </a:extLst>
+          </a:blip>
+          <a:srcRect r="5385"/>
+          <a:stretch/>
+        </p:blipFill>
+        <p:spPr bwMode="auto">
+          <a:xfrm>
+            <a:off x="502466" y="1614390"/>
+            <a:ext cx="930198" cy="760212"/>
+          </a:xfrm>
+          <a:prstGeom prst="rect">
+            <a:avLst/>
+          </a:prstGeom>
+          <a:noFill/>
+          <a:ln>
+            <a:noFill/>
+          </a:ln>
+          <a:extLst>
+            <a:ext uri="{909E8E84-426E-40DD-AFC4-6F175D3DCCD1}">
+              <a14:hiddenFill xmlns:a14="http://schemas.microsoft.com/office/drawing/2010/main">
+                <a:solidFill>
+                  <a:schemeClr val="accent1"/>
+                </a:solidFill>
+              </a14:hiddenFill>
+            </a:ext>
+            <a:ext uri="{91240B29-F687-4F45-9708-019B960494DF}">
+              <a14:hiddenLine xmlns:a14="http://schemas.microsoft.com/office/drawing/2010/main" w="9525">
+                <a:solidFill>
+                  <a:schemeClr val="tx1"/>
+                </a:solidFill>
+                <a:miter lim="800000"/>
+                <a:headEnd/>
+                <a:tailEnd/>
+              </a14:hiddenLine>
+            </a:ext>
+          </a:extLst>
+        </p:spPr>
+      </p:pic>
+      <p:pic>
+        <p:nvPicPr>
+          <p:cNvPr id="4" name="Picture 2" descr="https://sp.yimg.com/xj/th?id=OIP.M09b3d9047b71c5b7b57aa2e6064f4b57o0&amp;pid=15.1&amp;P=0&amp;w=185&amp;h=158"/>
+          <p:cNvPicPr>
+            <a:picLocks noChangeAspect="1" noChangeArrowheads="1"/>
+          </p:cNvPicPr>
+          <p:nvPr/>
+        </p:nvPicPr>
+        <p:blipFill>
+          <a:blip r:embed="rId8" cstate="print">
+            <a:extLst>
+              <a:ext uri="{28A0092B-C50C-407E-A947-70E740481C1C}">
+                <a14:useLocalDpi xmlns:a14="http://schemas.microsoft.com/office/drawing/2010/main" val="0"/>
+              </a:ext>
+            </a:extLst>
+          </a:blip>
+          <a:srcRect/>
+          <a:stretch>
+            <a:fillRect/>
+          </a:stretch>
+        </p:blipFill>
+        <p:spPr bwMode="auto">
+          <a:xfrm>
+            <a:off x="586565" y="3840130"/>
+            <a:ext cx="762000" cy="650790"/>
+          </a:xfrm>
+          <a:prstGeom prst="rect">
+            <a:avLst/>
+          </a:prstGeom>
+          <a:noFill/>
+          <a:extLst>
+            <a:ext uri="{909E8E84-426E-40DD-AFC4-6F175D3DCCD1}">
+              <a14:hiddenFill xmlns:a14="http://schemas.microsoft.com/office/drawing/2010/main">
+                <a:solidFill>
+                  <a:srgbClr val="FFFFFF"/>
+                </a:solidFill>
+              </a14:hiddenFill>
+            </a:ext>
+          </a:extLst>
+        </p:spPr>
+      </p:pic>
+      <p:pic>
+        <p:nvPicPr>
+          <p:cNvPr id="1028" name="Picture 4" descr="Java Community Process"/>
+          <p:cNvPicPr>
+            <a:picLocks noChangeAspect="1" noChangeArrowheads="1"/>
+          </p:cNvPicPr>
+          <p:nvPr/>
+        </p:nvPicPr>
+        <p:blipFill>
+          <a:blip r:embed="rId9">
+            <a:extLst>
+              <a:ext uri="{28A0092B-C50C-407E-A947-70E740481C1C}">
+                <a14:useLocalDpi xmlns:a14="http://schemas.microsoft.com/office/drawing/2010/main" val="0"/>
+              </a:ext>
+            </a:extLst>
+          </a:blip>
+          <a:srcRect/>
+          <a:stretch>
+            <a:fillRect/>
+          </a:stretch>
+        </p:blipFill>
+        <p:spPr bwMode="auto">
+          <a:xfrm>
+            <a:off x="155575" y="-365125"/>
+            <a:ext cx="1438275" cy="771525"/>
+          </a:xfrm>
+          <a:prstGeom prst="rect">
+            <a:avLst/>
+          </a:prstGeom>
+          <a:noFill/>
+          <a:extLst>
+            <a:ext uri="{909E8E84-426E-40DD-AFC4-6F175D3DCCD1}">
+              <a14:hiddenFill xmlns:a14="http://schemas.microsoft.com/office/drawing/2010/main">
+                <a:solidFill>
+                  <a:srgbClr val="FFFFFF"/>
+                </a:solidFill>
+              </a14:hiddenFill>
+            </a:ext>
+          </a:extLst>
+        </p:spPr>
+      </p:pic>
+      <p:pic>
+        <p:nvPicPr>
+          <p:cNvPr id="1030" name="Picture 6" descr="Java Community Process"/>
+          <p:cNvPicPr>
+            <a:picLocks noChangeAspect="1" noChangeArrowheads="1"/>
+          </p:cNvPicPr>
+          <p:nvPr/>
+        </p:nvPicPr>
+        <p:blipFill>
+          <a:blip r:embed="rId9">
+            <a:extLst>
+              <a:ext uri="{28A0092B-C50C-407E-A947-70E740481C1C}">
+                <a14:useLocalDpi xmlns:a14="http://schemas.microsoft.com/office/drawing/2010/main" val="0"/>
+              </a:ext>
+            </a:extLst>
+          </a:blip>
+          <a:srcRect/>
+          <a:stretch>
+            <a:fillRect/>
+          </a:stretch>
+        </p:blipFill>
+        <p:spPr bwMode="auto">
+          <a:xfrm>
+            <a:off x="307975" y="-212725"/>
+            <a:ext cx="1438275" cy="771525"/>
+          </a:xfrm>
+          <a:prstGeom prst="rect">
+            <a:avLst/>
+          </a:prstGeom>
+          <a:noFill/>
+          <a:extLst>
+            <a:ext uri="{909E8E84-426E-40DD-AFC4-6F175D3DCCD1}">
+              <a14:hiddenFill xmlns:a14="http://schemas.microsoft.com/office/drawing/2010/main">
+                <a:solidFill>
+                  <a:srgbClr val="FFFFFF"/>
+                </a:solidFill>
+              </a14:hiddenFill>
+            </a:ext>
+          </a:extLst>
+        </p:spPr>
+      </p:pic>
+      <p:pic>
+        <p:nvPicPr>
+          <p:cNvPr id="1031" name="Picture 7"/>
+          <p:cNvPicPr>
+            <a:picLocks noChangeAspect="1" noChangeArrowheads="1"/>
+          </p:cNvPicPr>
+          <p:nvPr/>
+        </p:nvPicPr>
+        <p:blipFill>
+          <a:blip r:embed="rId10">
+            <a:extLst>
+              <a:ext uri="{28A0092B-C50C-407E-A947-70E740481C1C}">
+                <a14:useLocalDpi xmlns:a14="http://schemas.microsoft.com/office/drawing/2010/main" val="0"/>
+              </a:ext>
+            </a:extLst>
+          </a:blip>
+          <a:srcRect/>
+          <a:stretch>
+            <a:fillRect/>
+          </a:stretch>
+        </p:blipFill>
+        <p:spPr bwMode="auto">
+          <a:xfrm>
+            <a:off x="586565" y="2612066"/>
+            <a:ext cx="762000" cy="981559"/>
+          </a:xfrm>
+          <a:prstGeom prst="rect">
+            <a:avLst/>
+          </a:prstGeom>
+          <a:noFill/>
+          <a:ln>
+            <a:noFill/>
+          </a:ln>
+          <a:extLst>
+            <a:ext uri="{909E8E84-426E-40DD-AFC4-6F175D3DCCD1}">
+              <a14:hiddenFill xmlns:a14="http://schemas.microsoft.com/office/drawing/2010/main">
+                <a:solidFill>
+                  <a:schemeClr val="accent1"/>
+                </a:solidFill>
+              </a14:hiddenFill>
+            </a:ext>
+            <a:ext uri="{91240B29-F687-4F45-9708-019B960494DF}">
+              <a14:hiddenLine xmlns:a14="http://schemas.microsoft.com/office/drawing/2010/main" w="9525">
+                <a:solidFill>
+                  <a:schemeClr val="tx1"/>
+                </a:solidFill>
+                <a:miter lim="800000"/>
+                <a:headEnd/>
+                <a:tailEnd/>
+              </a14:hiddenLine>
+            </a:ext>
+          </a:extLst>
+        </p:spPr>
+      </p:pic>
     </p:spTree>
     <p:extLst>
       <p:ext uri="{BB962C8B-B14F-4D97-AF65-F5344CB8AC3E}">
-        <p14:creationId xmlns:p14="http://schemas.microsoft.com/office/powerpoint/2010/main" val="501775783"/>
+        <p14:creationId xmlns:p14="http://schemas.microsoft.com/office/powerpoint/2010/main" val="1161356507"/>
       </p:ext>
     </p:extLst>
   </p:cSld>
@@ -7002,7 +8692,7 @@
           <a:p>
             <a:r>
               <a:rPr lang="en-US" dirty="0" smtClean="0"/>
-              <a:t>History</a:t>
+              <a:t>Resources</a:t>
             </a:r>
             <a:endParaRPr lang="en-US" dirty="0"/>
           </a:p>
@@ -7018,13 +8708,793 @@
             <p:ph idx="1"/>
           </p:nvPr>
         </p:nvSpPr>
-        <p:spPr/>
+        <p:spPr>
+          <a:xfrm>
+            <a:off x="874712" y="2971800"/>
+            <a:ext cx="7583488" cy="3154363"/>
+          </a:xfrm>
+        </p:spPr>
         <p:txBody>
           <a:bodyPr>
             <a:normAutofit/>
           </a:bodyPr>
           <a:lstStyle/>
           <a:p>
+            <a:pPr marL="0" indent="0">
+              <a:buNone/>
+            </a:pPr>
+            <a:r>
+              <a:rPr lang="en-US" sz="2000" b="1" dirty="0" smtClean="0"/>
+              <a:t>Maven </a:t>
+            </a:r>
+            <a:r>
+              <a:rPr lang="en-US" sz="2000" dirty="0">
+                <a:solidFill>
+                  <a:schemeClr val="bg1">
+                    <a:lumMod val="75000"/>
+                  </a:schemeClr>
+                </a:solidFill>
+              </a:rPr>
+              <a:t>(9 Nov 2015)</a:t>
+            </a:r>
+          </a:p>
+          <a:p>
+            <a:pPr marL="0" indent="0">
+              <a:buNone/>
+            </a:pPr>
+            <a:endParaRPr lang="en-US" sz="2000" b="1" dirty="0" smtClean="0"/>
+          </a:p>
+          <a:p>
+            <a:pPr marL="0" indent="0">
+              <a:buNone/>
+            </a:pPr>
+            <a:r>
+              <a:rPr lang="en-US" sz="1800" dirty="0" smtClean="0">
+                <a:latin typeface="Consolas" panose="020B0609020204030204" pitchFamily="49" charset="0"/>
+                <a:cs typeface="Consolas" panose="020B0609020204030204" pitchFamily="49" charset="0"/>
+              </a:rPr>
+              <a:t>&lt;</a:t>
+            </a:r>
+            <a:r>
+              <a:rPr lang="en-US" sz="1800" dirty="0">
+                <a:latin typeface="Consolas" panose="020B0609020204030204" pitchFamily="49" charset="0"/>
+                <a:cs typeface="Consolas" panose="020B0609020204030204" pitchFamily="49" charset="0"/>
+              </a:rPr>
+              <a:t>dependency&gt;</a:t>
+            </a:r>
+          </a:p>
+          <a:p>
+            <a:pPr marL="0" indent="0">
+              <a:buNone/>
+            </a:pPr>
+            <a:r>
+              <a:rPr lang="en-US" sz="1800" dirty="0">
+                <a:latin typeface="Consolas" panose="020B0609020204030204" pitchFamily="49" charset="0"/>
+                <a:cs typeface="Consolas" panose="020B0609020204030204" pitchFamily="49" charset="0"/>
+              </a:rPr>
+              <a:t>   &lt;</a:t>
+            </a:r>
+            <a:r>
+              <a:rPr lang="en-US" sz="1800" dirty="0" err="1">
+                <a:latin typeface="Consolas" panose="020B0609020204030204" pitchFamily="49" charset="0"/>
+                <a:cs typeface="Consolas" panose="020B0609020204030204" pitchFamily="49" charset="0"/>
+              </a:rPr>
+              <a:t>groupId</a:t>
+            </a:r>
+            <a:r>
+              <a:rPr lang="en-US" sz="1800" dirty="0">
+                <a:latin typeface="Consolas" panose="020B0609020204030204" pitchFamily="49" charset="0"/>
+                <a:cs typeface="Consolas" panose="020B0609020204030204" pitchFamily="49" charset="0"/>
+              </a:rPr>
+              <a:t>&gt;org.jboss.weld.se&lt;/</a:t>
+            </a:r>
+            <a:r>
+              <a:rPr lang="en-US" sz="1800" dirty="0" err="1">
+                <a:latin typeface="Consolas" panose="020B0609020204030204" pitchFamily="49" charset="0"/>
+                <a:cs typeface="Consolas" panose="020B0609020204030204" pitchFamily="49" charset="0"/>
+              </a:rPr>
+              <a:t>groupId</a:t>
+            </a:r>
+            <a:r>
+              <a:rPr lang="en-US" sz="1800" dirty="0">
+                <a:latin typeface="Consolas" panose="020B0609020204030204" pitchFamily="49" charset="0"/>
+                <a:cs typeface="Consolas" panose="020B0609020204030204" pitchFamily="49" charset="0"/>
+              </a:rPr>
+              <a:t>&gt;</a:t>
+            </a:r>
+          </a:p>
+          <a:p>
+            <a:pPr marL="0" indent="0">
+              <a:buNone/>
+            </a:pPr>
+            <a:r>
+              <a:rPr lang="en-US" sz="1800" dirty="0">
+                <a:latin typeface="Consolas" panose="020B0609020204030204" pitchFamily="49" charset="0"/>
+                <a:cs typeface="Consolas" panose="020B0609020204030204" pitchFamily="49" charset="0"/>
+              </a:rPr>
+              <a:t>    &lt;</a:t>
+            </a:r>
+            <a:r>
+              <a:rPr lang="en-US" sz="1800" dirty="0" err="1">
+                <a:latin typeface="Consolas" panose="020B0609020204030204" pitchFamily="49" charset="0"/>
+                <a:cs typeface="Consolas" panose="020B0609020204030204" pitchFamily="49" charset="0"/>
+              </a:rPr>
+              <a:t>artifactId</a:t>
+            </a:r>
+            <a:r>
+              <a:rPr lang="en-US" sz="1800" dirty="0">
+                <a:latin typeface="Consolas" panose="020B0609020204030204" pitchFamily="49" charset="0"/>
+                <a:cs typeface="Consolas" panose="020B0609020204030204" pitchFamily="49" charset="0"/>
+              </a:rPr>
+              <a:t>&gt;weld-se-core&lt;/</a:t>
+            </a:r>
+            <a:r>
+              <a:rPr lang="en-US" sz="1800" dirty="0" err="1">
+                <a:latin typeface="Consolas" panose="020B0609020204030204" pitchFamily="49" charset="0"/>
+                <a:cs typeface="Consolas" panose="020B0609020204030204" pitchFamily="49" charset="0"/>
+              </a:rPr>
+              <a:t>artifactId</a:t>
+            </a:r>
+            <a:r>
+              <a:rPr lang="en-US" sz="1800" dirty="0">
+                <a:latin typeface="Consolas" panose="020B0609020204030204" pitchFamily="49" charset="0"/>
+                <a:cs typeface="Consolas" panose="020B0609020204030204" pitchFamily="49" charset="0"/>
+              </a:rPr>
+              <a:t>&gt;</a:t>
+            </a:r>
+          </a:p>
+          <a:p>
+            <a:pPr marL="0" indent="0">
+              <a:buNone/>
+            </a:pPr>
+            <a:r>
+              <a:rPr lang="en-US" sz="1800" dirty="0">
+                <a:latin typeface="Consolas" panose="020B0609020204030204" pitchFamily="49" charset="0"/>
+                <a:cs typeface="Consolas" panose="020B0609020204030204" pitchFamily="49" charset="0"/>
+              </a:rPr>
+              <a:t>    &lt;version&gt;3.0.0.Alpha13&lt;/version&gt;</a:t>
+            </a:r>
+          </a:p>
+          <a:p>
+            <a:pPr marL="0" indent="0">
+              <a:buNone/>
+            </a:pPr>
+            <a:r>
+              <a:rPr lang="en-US" sz="1800" dirty="0">
+                <a:latin typeface="Consolas" panose="020B0609020204030204" pitchFamily="49" charset="0"/>
+                <a:cs typeface="Consolas" panose="020B0609020204030204" pitchFamily="49" charset="0"/>
+              </a:rPr>
+              <a:t>&lt;/dependency&gt;</a:t>
+            </a:r>
+            <a:endParaRPr lang="en-US" sz="2000" dirty="0">
+              <a:latin typeface="Consolas" panose="020B0609020204030204" pitchFamily="49" charset="0"/>
+              <a:cs typeface="Consolas" panose="020B0609020204030204" pitchFamily="49" charset="0"/>
+            </a:endParaRPr>
+          </a:p>
+          <a:p>
+            <a:pPr marL="0" indent="0">
+              <a:buNone/>
+            </a:pPr>
+            <a:r>
+              <a:rPr lang="en-US" sz="2000" dirty="0" smtClean="0"/>
+              <a:t> </a:t>
+            </a:r>
+            <a:endParaRPr lang="en-US" sz="2000" dirty="0"/>
+          </a:p>
+        </p:txBody>
+      </p:sp>
+      <p:sp>
+        <p:nvSpPr>
+          <p:cNvPr id="8" name="Content Placeholder 2"/>
+          <p:cNvSpPr txBox="1">
+            <a:spLocks/>
+          </p:cNvSpPr>
+          <p:nvPr/>
+        </p:nvSpPr>
+        <p:spPr>
+          <a:xfrm>
+            <a:off x="0" y="6489701"/>
+            <a:ext cx="9144000" cy="380999"/>
+          </a:xfrm>
+          <a:prstGeom prst="rect">
+            <a:avLst/>
+          </a:prstGeom>
+          <a:solidFill>
+            <a:srgbClr val="4D4D79"/>
+          </a:solidFill>
+        </p:spPr>
+        <p:txBody>
+          <a:bodyPr vert="horz" lIns="91440" tIns="45720" rIns="91440" bIns="45720" rtlCol="0">
+            <a:normAutofit/>
+          </a:bodyPr>
+          <a:lstStyle>
+            <a:lvl1pPr marL="342900" indent="-342900" algn="l" defTabSz="914400" rtl="0" eaLnBrk="1" latinLnBrk="0" hangingPunct="1">
+              <a:spcBef>
+                <a:spcPct val="20000"/>
+              </a:spcBef>
+              <a:buFont typeface="Arial" panose="020B0604020202020204" pitchFamily="34" charset="0"/>
+              <a:buChar char="•"/>
+              <a:defRPr sz="3200" kern="1200">
+                <a:solidFill>
+                  <a:schemeClr val="tx1"/>
+                </a:solidFill>
+                <a:latin typeface="+mn-lt"/>
+                <a:ea typeface="+mn-ea"/>
+                <a:cs typeface="+mn-cs"/>
+              </a:defRPr>
+            </a:lvl1pPr>
+            <a:lvl2pPr marL="742950" indent="-285750" algn="l" defTabSz="914400" rtl="0" eaLnBrk="1" latinLnBrk="0" hangingPunct="1">
+              <a:spcBef>
+                <a:spcPct val="20000"/>
+              </a:spcBef>
+              <a:buFont typeface="Arial" panose="020B0604020202020204" pitchFamily="34" charset="0"/>
+              <a:buChar char="–"/>
+              <a:defRPr sz="2800" kern="1200">
+                <a:solidFill>
+                  <a:schemeClr val="tx1"/>
+                </a:solidFill>
+                <a:latin typeface="+mn-lt"/>
+                <a:ea typeface="+mn-ea"/>
+                <a:cs typeface="+mn-cs"/>
+              </a:defRPr>
+            </a:lvl2pPr>
+            <a:lvl3pPr marL="1143000" indent="-228600" algn="l" defTabSz="914400" rtl="0" eaLnBrk="1" latinLnBrk="0" hangingPunct="1">
+              <a:spcBef>
+                <a:spcPct val="20000"/>
+              </a:spcBef>
+              <a:buFont typeface="Arial" panose="020B0604020202020204" pitchFamily="34" charset="0"/>
+              <a:buChar char="•"/>
+              <a:defRPr sz="2400" kern="1200">
+                <a:solidFill>
+                  <a:schemeClr val="tx1"/>
+                </a:solidFill>
+                <a:latin typeface="+mn-lt"/>
+                <a:ea typeface="+mn-ea"/>
+                <a:cs typeface="+mn-cs"/>
+              </a:defRPr>
+            </a:lvl3pPr>
+            <a:lvl4pPr marL="1600200" indent="-228600" algn="l" defTabSz="914400" rtl="0" eaLnBrk="1" latinLnBrk="0" hangingPunct="1">
+              <a:spcBef>
+                <a:spcPct val="20000"/>
+              </a:spcBef>
+              <a:buFont typeface="Arial" panose="020B0604020202020204" pitchFamily="34" charset="0"/>
+              <a:buChar char="–"/>
+              <a:defRPr sz="2000" kern="1200">
+                <a:solidFill>
+                  <a:schemeClr val="tx1"/>
+                </a:solidFill>
+                <a:latin typeface="+mn-lt"/>
+                <a:ea typeface="+mn-ea"/>
+                <a:cs typeface="+mn-cs"/>
+              </a:defRPr>
+            </a:lvl4pPr>
+            <a:lvl5pPr marL="2057400" indent="-228600" algn="l" defTabSz="914400" rtl="0" eaLnBrk="1" latinLnBrk="0" hangingPunct="1">
+              <a:spcBef>
+                <a:spcPct val="20000"/>
+              </a:spcBef>
+              <a:buFont typeface="Arial" panose="020B0604020202020204" pitchFamily="34" charset="0"/>
+              <a:buChar char="»"/>
+              <a:defRPr sz="2000" kern="1200">
+                <a:solidFill>
+                  <a:schemeClr val="tx1"/>
+                </a:solidFill>
+                <a:latin typeface="+mn-lt"/>
+                <a:ea typeface="+mn-ea"/>
+                <a:cs typeface="+mn-cs"/>
+              </a:defRPr>
+            </a:lvl5pPr>
+            <a:lvl6pPr marL="2514600" indent="-228600" algn="l" defTabSz="914400" rtl="0" eaLnBrk="1" latinLnBrk="0" hangingPunct="1">
+              <a:spcBef>
+                <a:spcPct val="20000"/>
+              </a:spcBef>
+              <a:buFont typeface="Arial" panose="020B0604020202020204" pitchFamily="34" charset="0"/>
+              <a:buChar char="•"/>
+              <a:defRPr sz="2000" kern="1200">
+                <a:solidFill>
+                  <a:schemeClr val="tx1"/>
+                </a:solidFill>
+                <a:latin typeface="+mn-lt"/>
+                <a:ea typeface="+mn-ea"/>
+                <a:cs typeface="+mn-cs"/>
+              </a:defRPr>
+            </a:lvl6pPr>
+            <a:lvl7pPr marL="2971800" indent="-228600" algn="l" defTabSz="914400" rtl="0" eaLnBrk="1" latinLnBrk="0" hangingPunct="1">
+              <a:spcBef>
+                <a:spcPct val="20000"/>
+              </a:spcBef>
+              <a:buFont typeface="Arial" panose="020B0604020202020204" pitchFamily="34" charset="0"/>
+              <a:buChar char="•"/>
+              <a:defRPr sz="2000" kern="1200">
+                <a:solidFill>
+                  <a:schemeClr val="tx1"/>
+                </a:solidFill>
+                <a:latin typeface="+mn-lt"/>
+                <a:ea typeface="+mn-ea"/>
+                <a:cs typeface="+mn-cs"/>
+              </a:defRPr>
+            </a:lvl7pPr>
+            <a:lvl8pPr marL="3429000" indent="-228600" algn="l" defTabSz="914400" rtl="0" eaLnBrk="1" latinLnBrk="0" hangingPunct="1">
+              <a:spcBef>
+                <a:spcPct val="20000"/>
+              </a:spcBef>
+              <a:buFont typeface="Arial" panose="020B0604020202020204" pitchFamily="34" charset="0"/>
+              <a:buChar char="•"/>
+              <a:defRPr sz="2000" kern="1200">
+                <a:solidFill>
+                  <a:schemeClr val="tx1"/>
+                </a:solidFill>
+                <a:latin typeface="+mn-lt"/>
+                <a:ea typeface="+mn-ea"/>
+                <a:cs typeface="+mn-cs"/>
+              </a:defRPr>
+            </a:lvl8pPr>
+            <a:lvl9pPr marL="3886200" indent="-228600" algn="l" defTabSz="914400" rtl="0" eaLnBrk="1" latinLnBrk="0" hangingPunct="1">
+              <a:spcBef>
+                <a:spcPct val="20000"/>
+              </a:spcBef>
+              <a:buFont typeface="Arial" panose="020B0604020202020204" pitchFamily="34" charset="0"/>
+              <a:buChar char="•"/>
+              <a:defRPr sz="2000" kern="1200">
+                <a:solidFill>
+                  <a:schemeClr val="tx1"/>
+                </a:solidFill>
+                <a:latin typeface="+mn-lt"/>
+                <a:ea typeface="+mn-ea"/>
+                <a:cs typeface="+mn-cs"/>
+              </a:defRPr>
+            </a:lvl9pPr>
+          </a:lstStyle>
+          <a:p>
+            <a:pPr marL="0" indent="0" algn="ctr">
+              <a:buNone/>
+            </a:pPr>
+            <a:r>
+              <a:rPr lang="en-US" sz="1600" dirty="0">
+                <a:solidFill>
+                  <a:schemeClr val="bg1"/>
+                </a:solidFill>
+              </a:rPr>
+              <a:t>Michael Remijan      mjremijan@yahoo.com      @</a:t>
+            </a:r>
+            <a:r>
+              <a:rPr lang="en-US" sz="1600" dirty="0" err="1">
+                <a:solidFill>
+                  <a:schemeClr val="bg1"/>
+                </a:solidFill>
+              </a:rPr>
+              <a:t>mjremijan</a:t>
+            </a:r>
+            <a:r>
+              <a:rPr lang="en-US" sz="1600" dirty="0">
+                <a:solidFill>
+                  <a:schemeClr val="bg1"/>
+                </a:solidFill>
+              </a:rPr>
+              <a:t>      github.com/</a:t>
+            </a:r>
+            <a:r>
+              <a:rPr lang="en-US" sz="1600" dirty="0" err="1">
+                <a:solidFill>
+                  <a:schemeClr val="bg1"/>
+                </a:solidFill>
+              </a:rPr>
+              <a:t>mjremijan</a:t>
+            </a:r>
+            <a:r>
+              <a:rPr lang="en-US" sz="1600" dirty="0">
+                <a:solidFill>
+                  <a:schemeClr val="bg1"/>
+                </a:solidFill>
+              </a:rPr>
+              <a:t>/</a:t>
+            </a:r>
+            <a:r>
+              <a:rPr lang="en-US" sz="1600" dirty="0" err="1">
+                <a:solidFill>
+                  <a:schemeClr val="bg1"/>
+                </a:solidFill>
+              </a:rPr>
+              <a:t>ferris</a:t>
+            </a:r>
+            <a:r>
+              <a:rPr lang="en-US" sz="1600" dirty="0">
+                <a:solidFill>
+                  <a:schemeClr val="bg1"/>
+                </a:solidFill>
+              </a:rPr>
+              <a:t>-cdi-presentation</a:t>
+            </a:r>
+          </a:p>
+          <a:p>
+            <a:endParaRPr lang="en-US" dirty="0" smtClean="0"/>
+          </a:p>
+          <a:p>
+            <a:endParaRPr lang="en-US" dirty="0"/>
+          </a:p>
+        </p:txBody>
+      </p:sp>
+      <p:sp>
+        <p:nvSpPr>
+          <p:cNvPr id="9" name="Content Placeholder 2"/>
+          <p:cNvSpPr txBox="1">
+            <a:spLocks/>
+          </p:cNvSpPr>
+          <p:nvPr/>
+        </p:nvSpPr>
+        <p:spPr>
+          <a:xfrm>
+            <a:off x="0" y="0"/>
+            <a:ext cx="9144000" cy="380999"/>
+          </a:xfrm>
+          <a:prstGeom prst="rect">
+            <a:avLst/>
+          </a:prstGeom>
+          <a:solidFill>
+            <a:srgbClr val="4D4D79"/>
+          </a:solidFill>
+        </p:spPr>
+        <p:txBody>
+          <a:bodyPr vert="horz" lIns="91440" tIns="45720" rIns="91440" bIns="45720" rtlCol="0">
+            <a:normAutofit/>
+          </a:bodyPr>
+          <a:lstStyle>
+            <a:lvl1pPr marL="342900" indent="-342900" algn="l" defTabSz="914400" rtl="0" eaLnBrk="1" latinLnBrk="0" hangingPunct="1">
+              <a:spcBef>
+                <a:spcPct val="20000"/>
+              </a:spcBef>
+              <a:buFont typeface="Arial" panose="020B0604020202020204" pitchFamily="34" charset="0"/>
+              <a:buChar char="•"/>
+              <a:defRPr sz="3200" kern="1200">
+                <a:solidFill>
+                  <a:schemeClr val="tx1"/>
+                </a:solidFill>
+                <a:latin typeface="+mn-lt"/>
+                <a:ea typeface="+mn-ea"/>
+                <a:cs typeface="+mn-cs"/>
+              </a:defRPr>
+            </a:lvl1pPr>
+            <a:lvl2pPr marL="742950" indent="-285750" algn="l" defTabSz="914400" rtl="0" eaLnBrk="1" latinLnBrk="0" hangingPunct="1">
+              <a:spcBef>
+                <a:spcPct val="20000"/>
+              </a:spcBef>
+              <a:buFont typeface="Arial" panose="020B0604020202020204" pitchFamily="34" charset="0"/>
+              <a:buChar char="–"/>
+              <a:defRPr sz="2800" kern="1200">
+                <a:solidFill>
+                  <a:schemeClr val="tx1"/>
+                </a:solidFill>
+                <a:latin typeface="+mn-lt"/>
+                <a:ea typeface="+mn-ea"/>
+                <a:cs typeface="+mn-cs"/>
+              </a:defRPr>
+            </a:lvl2pPr>
+            <a:lvl3pPr marL="1143000" indent="-228600" algn="l" defTabSz="914400" rtl="0" eaLnBrk="1" latinLnBrk="0" hangingPunct="1">
+              <a:spcBef>
+                <a:spcPct val="20000"/>
+              </a:spcBef>
+              <a:buFont typeface="Arial" panose="020B0604020202020204" pitchFamily="34" charset="0"/>
+              <a:buChar char="•"/>
+              <a:defRPr sz="2400" kern="1200">
+                <a:solidFill>
+                  <a:schemeClr val="tx1"/>
+                </a:solidFill>
+                <a:latin typeface="+mn-lt"/>
+                <a:ea typeface="+mn-ea"/>
+                <a:cs typeface="+mn-cs"/>
+              </a:defRPr>
+            </a:lvl3pPr>
+            <a:lvl4pPr marL="1600200" indent="-228600" algn="l" defTabSz="914400" rtl="0" eaLnBrk="1" latinLnBrk="0" hangingPunct="1">
+              <a:spcBef>
+                <a:spcPct val="20000"/>
+              </a:spcBef>
+              <a:buFont typeface="Arial" panose="020B0604020202020204" pitchFamily="34" charset="0"/>
+              <a:buChar char="–"/>
+              <a:defRPr sz="2000" kern="1200">
+                <a:solidFill>
+                  <a:schemeClr val="tx1"/>
+                </a:solidFill>
+                <a:latin typeface="+mn-lt"/>
+                <a:ea typeface="+mn-ea"/>
+                <a:cs typeface="+mn-cs"/>
+              </a:defRPr>
+            </a:lvl4pPr>
+            <a:lvl5pPr marL="2057400" indent="-228600" algn="l" defTabSz="914400" rtl="0" eaLnBrk="1" latinLnBrk="0" hangingPunct="1">
+              <a:spcBef>
+                <a:spcPct val="20000"/>
+              </a:spcBef>
+              <a:buFont typeface="Arial" panose="020B0604020202020204" pitchFamily="34" charset="0"/>
+              <a:buChar char="»"/>
+              <a:defRPr sz="2000" kern="1200">
+                <a:solidFill>
+                  <a:schemeClr val="tx1"/>
+                </a:solidFill>
+                <a:latin typeface="+mn-lt"/>
+                <a:ea typeface="+mn-ea"/>
+                <a:cs typeface="+mn-cs"/>
+              </a:defRPr>
+            </a:lvl5pPr>
+            <a:lvl6pPr marL="2514600" indent="-228600" algn="l" defTabSz="914400" rtl="0" eaLnBrk="1" latinLnBrk="0" hangingPunct="1">
+              <a:spcBef>
+                <a:spcPct val="20000"/>
+              </a:spcBef>
+              <a:buFont typeface="Arial" panose="020B0604020202020204" pitchFamily="34" charset="0"/>
+              <a:buChar char="•"/>
+              <a:defRPr sz="2000" kern="1200">
+                <a:solidFill>
+                  <a:schemeClr val="tx1"/>
+                </a:solidFill>
+                <a:latin typeface="+mn-lt"/>
+                <a:ea typeface="+mn-ea"/>
+                <a:cs typeface="+mn-cs"/>
+              </a:defRPr>
+            </a:lvl6pPr>
+            <a:lvl7pPr marL="2971800" indent="-228600" algn="l" defTabSz="914400" rtl="0" eaLnBrk="1" latinLnBrk="0" hangingPunct="1">
+              <a:spcBef>
+                <a:spcPct val="20000"/>
+              </a:spcBef>
+              <a:buFont typeface="Arial" panose="020B0604020202020204" pitchFamily="34" charset="0"/>
+              <a:buChar char="•"/>
+              <a:defRPr sz="2000" kern="1200">
+                <a:solidFill>
+                  <a:schemeClr val="tx1"/>
+                </a:solidFill>
+                <a:latin typeface="+mn-lt"/>
+                <a:ea typeface="+mn-ea"/>
+                <a:cs typeface="+mn-cs"/>
+              </a:defRPr>
+            </a:lvl7pPr>
+            <a:lvl8pPr marL="3429000" indent="-228600" algn="l" defTabSz="914400" rtl="0" eaLnBrk="1" latinLnBrk="0" hangingPunct="1">
+              <a:spcBef>
+                <a:spcPct val="20000"/>
+              </a:spcBef>
+              <a:buFont typeface="Arial" panose="020B0604020202020204" pitchFamily="34" charset="0"/>
+              <a:buChar char="•"/>
+              <a:defRPr sz="2000" kern="1200">
+                <a:solidFill>
+                  <a:schemeClr val="tx1"/>
+                </a:solidFill>
+                <a:latin typeface="+mn-lt"/>
+                <a:ea typeface="+mn-ea"/>
+                <a:cs typeface="+mn-cs"/>
+              </a:defRPr>
+            </a:lvl8pPr>
+            <a:lvl9pPr marL="3886200" indent="-228600" algn="l" defTabSz="914400" rtl="0" eaLnBrk="1" latinLnBrk="0" hangingPunct="1">
+              <a:spcBef>
+                <a:spcPct val="20000"/>
+              </a:spcBef>
+              <a:buFont typeface="Arial" panose="020B0604020202020204" pitchFamily="34" charset="0"/>
+              <a:buChar char="•"/>
+              <a:defRPr sz="2000" kern="1200">
+                <a:solidFill>
+                  <a:schemeClr val="tx1"/>
+                </a:solidFill>
+                <a:latin typeface="+mn-lt"/>
+                <a:ea typeface="+mn-ea"/>
+                <a:cs typeface="+mn-cs"/>
+              </a:defRPr>
+            </a:lvl9pPr>
+          </a:lstStyle>
+          <a:p>
+            <a:pPr marL="0" indent="0" algn="ctr">
+              <a:buNone/>
+            </a:pPr>
+            <a:r>
+              <a:rPr lang="en-US" sz="1600" dirty="0" smtClean="0">
+                <a:solidFill>
+                  <a:schemeClr val="bg1"/>
+                </a:solidFill>
+              </a:rPr>
+              <a:t>CDI</a:t>
+            </a:r>
+          </a:p>
+          <a:p>
+            <a:endParaRPr lang="en-US" dirty="0" smtClean="0"/>
+          </a:p>
+          <a:p>
+            <a:endParaRPr lang="en-US" dirty="0"/>
+          </a:p>
+        </p:txBody>
+      </p:sp>
+      <p:pic>
+        <p:nvPicPr>
+          <p:cNvPr id="1028" name="Picture 4" descr="Java Community Process"/>
+          <p:cNvPicPr>
+            <a:picLocks noChangeAspect="1" noChangeArrowheads="1"/>
+          </p:cNvPicPr>
+          <p:nvPr/>
+        </p:nvPicPr>
+        <p:blipFill>
+          <a:blip r:embed="rId2">
+            <a:extLst>
+              <a:ext uri="{28A0092B-C50C-407E-A947-70E740481C1C}">
+                <a14:useLocalDpi xmlns:a14="http://schemas.microsoft.com/office/drawing/2010/main" val="0"/>
+              </a:ext>
+            </a:extLst>
+          </a:blip>
+          <a:srcRect/>
+          <a:stretch>
+            <a:fillRect/>
+          </a:stretch>
+        </p:blipFill>
+        <p:spPr bwMode="auto">
+          <a:xfrm>
+            <a:off x="155575" y="-365125"/>
+            <a:ext cx="1438275" cy="771525"/>
+          </a:xfrm>
+          <a:prstGeom prst="rect">
+            <a:avLst/>
+          </a:prstGeom>
+          <a:noFill/>
+          <a:extLst>
+            <a:ext uri="{909E8E84-426E-40DD-AFC4-6F175D3DCCD1}">
+              <a14:hiddenFill xmlns:a14="http://schemas.microsoft.com/office/drawing/2010/main">
+                <a:solidFill>
+                  <a:srgbClr val="FFFFFF"/>
+                </a:solidFill>
+              </a14:hiddenFill>
+            </a:ext>
+          </a:extLst>
+        </p:spPr>
+      </p:pic>
+      <p:pic>
+        <p:nvPicPr>
+          <p:cNvPr id="1030" name="Picture 6" descr="Java Community Process"/>
+          <p:cNvPicPr>
+            <a:picLocks noChangeAspect="1" noChangeArrowheads="1"/>
+          </p:cNvPicPr>
+          <p:nvPr/>
+        </p:nvPicPr>
+        <p:blipFill>
+          <a:blip r:embed="rId2">
+            <a:extLst>
+              <a:ext uri="{28A0092B-C50C-407E-A947-70E740481C1C}">
+                <a14:useLocalDpi xmlns:a14="http://schemas.microsoft.com/office/drawing/2010/main" val="0"/>
+              </a:ext>
+            </a:extLst>
+          </a:blip>
+          <a:srcRect/>
+          <a:stretch>
+            <a:fillRect/>
+          </a:stretch>
+        </p:blipFill>
+        <p:spPr bwMode="auto">
+          <a:xfrm>
+            <a:off x="307975" y="-212725"/>
+            <a:ext cx="1438275" cy="771525"/>
+          </a:xfrm>
+          <a:prstGeom prst="rect">
+            <a:avLst/>
+          </a:prstGeom>
+          <a:noFill/>
+          <a:extLst>
+            <a:ext uri="{909E8E84-426E-40DD-AFC4-6F175D3DCCD1}">
+              <a14:hiddenFill xmlns:a14="http://schemas.microsoft.com/office/drawing/2010/main">
+                <a:solidFill>
+                  <a:srgbClr val="FFFFFF"/>
+                </a:solidFill>
+              </a14:hiddenFill>
+            </a:ext>
+          </a:extLst>
+        </p:spPr>
+      </p:pic>
+      <p:pic>
+        <p:nvPicPr>
+          <p:cNvPr id="2050" name="Picture 2" descr="https://sp.yimg.com/xj/th?id=OIP.M5f02ca0779b8ea11dae4857b80adb4ddo0&amp;pid=15.1&amp;P=0&amp;w=306&amp;h=107"/>
+          <p:cNvPicPr>
+            <a:picLocks noChangeAspect="1" noChangeArrowheads="1"/>
+          </p:cNvPicPr>
+          <p:nvPr/>
+        </p:nvPicPr>
+        <p:blipFill>
+          <a:blip r:embed="rId3">
+            <a:extLst>
+              <a:ext uri="{28A0092B-C50C-407E-A947-70E740481C1C}">
+                <a14:useLocalDpi xmlns:a14="http://schemas.microsoft.com/office/drawing/2010/main" val="0"/>
+              </a:ext>
+            </a:extLst>
+          </a:blip>
+          <a:srcRect/>
+          <a:stretch>
+            <a:fillRect/>
+          </a:stretch>
+        </p:blipFill>
+        <p:spPr bwMode="auto">
+          <a:xfrm>
+            <a:off x="2638425" y="1326387"/>
+            <a:ext cx="3867150" cy="1340613"/>
+          </a:xfrm>
+          <a:prstGeom prst="rect">
+            <a:avLst/>
+          </a:prstGeom>
+          <a:noFill/>
+          <a:extLst>
+            <a:ext uri="{909E8E84-426E-40DD-AFC4-6F175D3DCCD1}">
+              <a14:hiddenFill xmlns:a14="http://schemas.microsoft.com/office/drawing/2010/main">
+                <a:solidFill>
+                  <a:srgbClr val="FFFFFF"/>
+                </a:solidFill>
+              </a14:hiddenFill>
+            </a:ext>
+          </a:extLst>
+        </p:spPr>
+      </p:pic>
+    </p:spTree>
+    <p:extLst>
+      <p:ext uri="{BB962C8B-B14F-4D97-AF65-F5344CB8AC3E}">
+        <p14:creationId xmlns:p14="http://schemas.microsoft.com/office/powerpoint/2010/main" val="2177124887"/>
+      </p:ext>
+    </p:extLst>
+  </p:cSld>
+  <p:clrMapOvr>
+    <a:masterClrMapping/>
+  </p:clrMapOvr>
+  <p:timing>
+    <p:tnLst>
+      <p:par>
+        <p:cTn id="1" dur="indefinite" restart="never" nodeType="tmRoot"/>
+      </p:par>
+    </p:tnLst>
+  </p:timing>
+</p:sld>
+</file>
+
+<file path=ppt/slides/slide7.xml><?xml version="1.0" encoding="utf-8"?>
+<p:sld xmlns:a="http://schemas.openxmlformats.org/drawingml/2006/main" xmlns:r="http://schemas.openxmlformats.org/officeDocument/2006/relationships" xmlns:p="http://schemas.openxmlformats.org/presentationml/2006/main">
+  <p:cSld>
+    <p:spTree>
+      <p:nvGrpSpPr>
+        <p:cNvPr id="1" name=""/>
+        <p:cNvGrpSpPr/>
+        <p:nvPr/>
+      </p:nvGrpSpPr>
+      <p:grpSpPr>
+        <a:xfrm>
+          <a:off x="0" y="0"/>
+          <a:ext cx="0" cy="0"/>
+          <a:chOff x="0" y="0"/>
+          <a:chExt cx="0" cy="0"/>
+        </a:xfrm>
+      </p:grpSpPr>
+      <p:sp>
+        <p:nvSpPr>
+          <p:cNvPr id="2" name="Title 1"/>
+          <p:cNvSpPr>
+            <a:spLocks noGrp="1"/>
+          </p:cNvSpPr>
+          <p:nvPr>
+            <p:ph type="title"/>
+          </p:nvPr>
+        </p:nvSpPr>
+        <p:spPr/>
+        <p:txBody>
+          <a:bodyPr/>
+          <a:lstStyle/>
+          <a:p>
+            <a:r>
+              <a:rPr lang="en-US" dirty="0" smtClean="0"/>
+              <a:t>History</a:t>
+            </a:r>
+            <a:endParaRPr lang="en-US" dirty="0"/>
+          </a:p>
+        </p:txBody>
+      </p:sp>
+      <p:sp>
+        <p:nvSpPr>
+          <p:cNvPr id="3" name="Content Placeholder 2"/>
+          <p:cNvSpPr>
+            <a:spLocks noGrp="1"/>
+          </p:cNvSpPr>
+          <p:nvPr>
+            <p:ph idx="1"/>
+          </p:nvPr>
+        </p:nvSpPr>
+        <p:spPr/>
+        <p:txBody>
+          <a:bodyPr>
+            <a:normAutofit/>
+          </a:bodyPr>
+          <a:lstStyle/>
+          <a:p>
             <a:r>
               <a:rPr lang="en-US" dirty="0" smtClean="0"/>
               <a:t>EE 5  (2006)</a:t>
@@ -7086,7 +9556,7 @@
               <a:rPr lang="en-US" dirty="0" smtClean="0">
                 <a:solidFill>
                   <a:schemeClr val="bg1">
-                    <a:lumMod val="75000"/>
+                    <a:lumMod val="65000"/>
                   </a:schemeClr>
                 </a:solidFill>
               </a:rPr>
@@ -7598,7 +10068,7 @@
 </p:sld>
 </file>
 
-<file path=ppt/slides/slide7.xml><?xml version="1.0" encoding="utf-8"?>
+<file path=ppt/slides/slide8.xml><?xml version="1.0" encoding="utf-8"?>
 <p:sld xmlns:a="http://schemas.openxmlformats.org/drawingml/2006/main" xmlns:r="http://schemas.openxmlformats.org/officeDocument/2006/relationships" xmlns:p="http://schemas.openxmlformats.org/presentationml/2006/main">
   <p:cSld>
     <p:spTree>
@@ -8279,7 +10749,7 @@
 </p:sld>
 </file>
 
-<file path=ppt/slides/slide8.xml><?xml version="1.0" encoding="utf-8"?>
+<file path=ppt/slides/slide9.xml><?xml version="1.0" encoding="utf-8"?>
 <p:sld xmlns:a="http://schemas.openxmlformats.org/drawingml/2006/main" xmlns:r="http://schemas.openxmlformats.org/officeDocument/2006/relationships" xmlns:p="http://schemas.openxmlformats.org/presentationml/2006/main">
   <p:cSld>
     <p:spTree>
@@ -8987,590 +11457,6 @@
     <p:extLst>
       <p:ext uri="{BB962C8B-B14F-4D97-AF65-F5344CB8AC3E}">
         <p14:creationId xmlns:p14="http://schemas.microsoft.com/office/powerpoint/2010/main" val="3025052900"/>
-      </p:ext>
-    </p:extLst>
-  </p:cSld>
-  <p:clrMapOvr>
-    <a:masterClrMapping/>
-  </p:clrMapOvr>
-  <p:timing>
-    <p:tnLst>
-      <p:par>
-        <p:cTn id="1" dur="indefinite" restart="never" nodeType="tmRoot"/>
-      </p:par>
-    </p:tnLst>
-  </p:timing>
-</p:sld>
-</file>
-
-<file path=ppt/slides/slide9.xml><?xml version="1.0" encoding="utf-8"?>
-<p:sld xmlns:a="http://schemas.openxmlformats.org/drawingml/2006/main" xmlns:r="http://schemas.openxmlformats.org/officeDocument/2006/relationships" xmlns:p="http://schemas.openxmlformats.org/presentationml/2006/main">
-  <p:cSld>
-    <p:spTree>
-      <p:nvGrpSpPr>
-        <p:cNvPr id="1" name=""/>
-        <p:cNvGrpSpPr/>
-        <p:nvPr/>
-      </p:nvGrpSpPr>
-      <p:grpSpPr>
-        <a:xfrm>
-          <a:off x="0" y="0"/>
-          <a:ext cx="0" cy="0"/>
-          <a:chOff x="0" y="0"/>
-          <a:chExt cx="0" cy="0"/>
-        </a:xfrm>
-      </p:grpSpPr>
-      <p:sp>
-        <p:nvSpPr>
-          <p:cNvPr id="2" name="Title 1"/>
-          <p:cNvSpPr>
-            <a:spLocks noGrp="1"/>
-          </p:cNvSpPr>
-          <p:nvPr>
-            <p:ph type="title"/>
-          </p:nvPr>
-        </p:nvSpPr>
-        <p:spPr/>
-        <p:txBody>
-          <a:bodyPr/>
-          <a:lstStyle/>
-          <a:p>
-            <a:r>
-              <a:rPr lang="en-US" dirty="0" smtClean="0"/>
-              <a:t>Topics</a:t>
-            </a:r>
-            <a:endParaRPr lang="en-US" dirty="0"/>
-          </a:p>
-        </p:txBody>
-      </p:sp>
-      <p:sp>
-        <p:nvSpPr>
-          <p:cNvPr id="3" name="Content Placeholder 2"/>
-          <p:cNvSpPr>
-            <a:spLocks noGrp="1"/>
-          </p:cNvSpPr>
-          <p:nvPr>
-            <p:ph idx="1"/>
-          </p:nvPr>
-        </p:nvSpPr>
-        <p:spPr/>
-        <p:txBody>
-          <a:bodyPr>
-            <a:normAutofit fontScale="70000" lnSpcReduction="20000"/>
-          </a:bodyPr>
-          <a:lstStyle/>
-          <a:p>
-            <a:r>
-              <a:rPr lang="en-US" dirty="0" smtClean="0"/>
-              <a:t>Bootstrap </a:t>
-            </a:r>
-            <a:r>
-              <a:rPr lang="en-US" dirty="0" smtClean="0"/>
-              <a:t>in an Java </a:t>
-            </a:r>
-            <a:r>
-              <a:rPr lang="en-US" dirty="0" smtClean="0"/>
-              <a:t>SE</a:t>
-            </a:r>
-          </a:p>
-          <a:p>
-            <a:r>
-              <a:rPr lang="en-US" dirty="0" smtClean="0"/>
-              <a:t>Basic dependency injection (DI)</a:t>
-            </a:r>
-          </a:p>
-          <a:p>
-            <a:r>
-              <a:rPr lang="en-US" dirty="0" smtClean="0"/>
-              <a:t>Lifecycle callbacks</a:t>
-            </a:r>
-          </a:p>
-          <a:p>
-            <a:r>
-              <a:rPr lang="en-US" dirty="0" smtClean="0"/>
-              <a:t>Producers</a:t>
-            </a:r>
-            <a:endParaRPr lang="en-US" dirty="0" smtClean="0"/>
-          </a:p>
-          <a:p>
-            <a:r>
-              <a:rPr lang="en-US" dirty="0" smtClean="0"/>
-              <a:t>Qualifiers</a:t>
-            </a:r>
-          </a:p>
-          <a:p>
-            <a:r>
-              <a:rPr lang="en-US" dirty="0" smtClean="0"/>
-              <a:t>Injection point &amp; annotations</a:t>
-            </a:r>
-          </a:p>
-          <a:p>
-            <a:r>
-              <a:rPr lang="en-US" dirty="0" smtClean="0"/>
-              <a:t>Decorators</a:t>
-            </a:r>
-          </a:p>
-          <a:p>
-            <a:r>
-              <a:rPr lang="en-US" dirty="0" smtClean="0"/>
-              <a:t>Alternatives</a:t>
-            </a:r>
-          </a:p>
-          <a:p>
-            <a:r>
-              <a:rPr lang="en-US" dirty="0" err="1" smtClean="0"/>
-              <a:t>Adf</a:t>
-            </a:r>
-            <a:endParaRPr lang="en-US" dirty="0" smtClean="0"/>
-          </a:p>
-          <a:p>
-            <a:r>
-              <a:rPr lang="en-US" dirty="0" err="1" smtClean="0"/>
-              <a:t>Adf</a:t>
-            </a:r>
-            <a:endParaRPr lang="en-US" dirty="0" smtClean="0"/>
-          </a:p>
-          <a:p>
-            <a:r>
-              <a:rPr lang="en-US" dirty="0" err="1" smtClean="0"/>
-              <a:t>Asdf</a:t>
-            </a:r>
-            <a:endParaRPr lang="en-US" dirty="0" smtClean="0"/>
-          </a:p>
-          <a:p>
-            <a:r>
-              <a:rPr lang="en-US" dirty="0" err="1" smtClean="0"/>
-              <a:t>Afd</a:t>
-            </a:r>
-            <a:endParaRPr lang="en-US" dirty="0" smtClean="0"/>
-          </a:p>
-          <a:p>
-            <a:endParaRPr lang="en-US" dirty="0" smtClean="0"/>
-          </a:p>
-          <a:p>
-            <a:endParaRPr lang="en-US" dirty="0"/>
-          </a:p>
-          <a:p>
-            <a:endParaRPr lang="en-US" dirty="0"/>
-          </a:p>
-        </p:txBody>
-      </p:sp>
-      <p:sp>
-        <p:nvSpPr>
-          <p:cNvPr id="8" name="Content Placeholder 2"/>
-          <p:cNvSpPr txBox="1">
-            <a:spLocks/>
-          </p:cNvSpPr>
-          <p:nvPr/>
-        </p:nvSpPr>
-        <p:spPr>
-          <a:xfrm>
-            <a:off x="0" y="6489701"/>
-            <a:ext cx="9144000" cy="380999"/>
-          </a:xfrm>
-          <a:prstGeom prst="rect">
-            <a:avLst/>
-          </a:prstGeom>
-          <a:solidFill>
-            <a:srgbClr val="4D4D79"/>
-          </a:solidFill>
-        </p:spPr>
-        <p:txBody>
-          <a:bodyPr vert="horz" lIns="91440" tIns="45720" rIns="91440" bIns="45720" rtlCol="0">
-            <a:normAutofit/>
-          </a:bodyPr>
-          <a:lstStyle>
-            <a:lvl1pPr marL="342900" indent="-342900" algn="l" defTabSz="914400" rtl="0" eaLnBrk="1" latinLnBrk="0" hangingPunct="1">
-              <a:spcBef>
-                <a:spcPct val="20000"/>
-              </a:spcBef>
-              <a:buFont typeface="Arial" panose="020B0604020202020204" pitchFamily="34" charset="0"/>
-              <a:buChar char="•"/>
-              <a:defRPr sz="3200" kern="1200">
-                <a:solidFill>
-                  <a:schemeClr val="tx1"/>
-                </a:solidFill>
-                <a:latin typeface="+mn-lt"/>
-                <a:ea typeface="+mn-ea"/>
-                <a:cs typeface="+mn-cs"/>
-              </a:defRPr>
-            </a:lvl1pPr>
-            <a:lvl2pPr marL="742950" indent="-285750" algn="l" defTabSz="914400" rtl="0" eaLnBrk="1" latinLnBrk="0" hangingPunct="1">
-              <a:spcBef>
-                <a:spcPct val="20000"/>
-              </a:spcBef>
-              <a:buFont typeface="Arial" panose="020B0604020202020204" pitchFamily="34" charset="0"/>
-              <a:buChar char="–"/>
-              <a:defRPr sz="2800" kern="1200">
-                <a:solidFill>
-                  <a:schemeClr val="tx1"/>
-                </a:solidFill>
-                <a:latin typeface="+mn-lt"/>
-                <a:ea typeface="+mn-ea"/>
-                <a:cs typeface="+mn-cs"/>
-              </a:defRPr>
-            </a:lvl2pPr>
-            <a:lvl3pPr marL="1143000" indent="-228600" algn="l" defTabSz="914400" rtl="0" eaLnBrk="1" latinLnBrk="0" hangingPunct="1">
-              <a:spcBef>
-                <a:spcPct val="20000"/>
-              </a:spcBef>
-              <a:buFont typeface="Arial" panose="020B0604020202020204" pitchFamily="34" charset="0"/>
-              <a:buChar char="•"/>
-              <a:defRPr sz="2400" kern="1200">
-                <a:solidFill>
-                  <a:schemeClr val="tx1"/>
-                </a:solidFill>
-                <a:latin typeface="+mn-lt"/>
-                <a:ea typeface="+mn-ea"/>
-                <a:cs typeface="+mn-cs"/>
-              </a:defRPr>
-            </a:lvl3pPr>
-            <a:lvl4pPr marL="1600200" indent="-228600" algn="l" defTabSz="914400" rtl="0" eaLnBrk="1" latinLnBrk="0" hangingPunct="1">
-              <a:spcBef>
-                <a:spcPct val="20000"/>
-              </a:spcBef>
-              <a:buFont typeface="Arial" panose="020B0604020202020204" pitchFamily="34" charset="0"/>
-              <a:buChar char="–"/>
-              <a:defRPr sz="2000" kern="1200">
-                <a:solidFill>
-                  <a:schemeClr val="tx1"/>
-                </a:solidFill>
-                <a:latin typeface="+mn-lt"/>
-                <a:ea typeface="+mn-ea"/>
-                <a:cs typeface="+mn-cs"/>
-              </a:defRPr>
-            </a:lvl4pPr>
-            <a:lvl5pPr marL="2057400" indent="-228600" algn="l" defTabSz="914400" rtl="0" eaLnBrk="1" latinLnBrk="0" hangingPunct="1">
-              <a:spcBef>
-                <a:spcPct val="20000"/>
-              </a:spcBef>
-              <a:buFont typeface="Arial" panose="020B0604020202020204" pitchFamily="34" charset="0"/>
-              <a:buChar char="»"/>
-              <a:defRPr sz="2000" kern="1200">
-                <a:solidFill>
-                  <a:schemeClr val="tx1"/>
-                </a:solidFill>
-                <a:latin typeface="+mn-lt"/>
-                <a:ea typeface="+mn-ea"/>
-                <a:cs typeface="+mn-cs"/>
-              </a:defRPr>
-            </a:lvl5pPr>
-            <a:lvl6pPr marL="2514600" indent="-228600" algn="l" defTabSz="914400" rtl="0" eaLnBrk="1" latinLnBrk="0" hangingPunct="1">
-              <a:spcBef>
-                <a:spcPct val="20000"/>
-              </a:spcBef>
-              <a:buFont typeface="Arial" panose="020B0604020202020204" pitchFamily="34" charset="0"/>
-              <a:buChar char="•"/>
-              <a:defRPr sz="2000" kern="1200">
-                <a:solidFill>
-                  <a:schemeClr val="tx1"/>
-                </a:solidFill>
-                <a:latin typeface="+mn-lt"/>
-                <a:ea typeface="+mn-ea"/>
-                <a:cs typeface="+mn-cs"/>
-              </a:defRPr>
-            </a:lvl6pPr>
-            <a:lvl7pPr marL="2971800" indent="-228600" algn="l" defTabSz="914400" rtl="0" eaLnBrk="1" latinLnBrk="0" hangingPunct="1">
-              <a:spcBef>
-                <a:spcPct val="20000"/>
-              </a:spcBef>
-              <a:buFont typeface="Arial" panose="020B0604020202020204" pitchFamily="34" charset="0"/>
-              <a:buChar char="•"/>
-              <a:defRPr sz="2000" kern="1200">
-                <a:solidFill>
-                  <a:schemeClr val="tx1"/>
-                </a:solidFill>
-                <a:latin typeface="+mn-lt"/>
-                <a:ea typeface="+mn-ea"/>
-                <a:cs typeface="+mn-cs"/>
-              </a:defRPr>
-            </a:lvl7pPr>
-            <a:lvl8pPr marL="3429000" indent="-228600" algn="l" defTabSz="914400" rtl="0" eaLnBrk="1" latinLnBrk="0" hangingPunct="1">
-              <a:spcBef>
-                <a:spcPct val="20000"/>
-              </a:spcBef>
-              <a:buFont typeface="Arial" panose="020B0604020202020204" pitchFamily="34" charset="0"/>
-              <a:buChar char="•"/>
-              <a:defRPr sz="2000" kern="1200">
-                <a:solidFill>
-                  <a:schemeClr val="tx1"/>
-                </a:solidFill>
-                <a:latin typeface="+mn-lt"/>
-                <a:ea typeface="+mn-ea"/>
-                <a:cs typeface="+mn-cs"/>
-              </a:defRPr>
-            </a:lvl8pPr>
-            <a:lvl9pPr marL="3886200" indent="-228600" algn="l" defTabSz="914400" rtl="0" eaLnBrk="1" latinLnBrk="0" hangingPunct="1">
-              <a:spcBef>
-                <a:spcPct val="20000"/>
-              </a:spcBef>
-              <a:buFont typeface="Arial" panose="020B0604020202020204" pitchFamily="34" charset="0"/>
-              <a:buChar char="•"/>
-              <a:defRPr sz="2000" kern="1200">
-                <a:solidFill>
-                  <a:schemeClr val="tx1"/>
-                </a:solidFill>
-                <a:latin typeface="+mn-lt"/>
-                <a:ea typeface="+mn-ea"/>
-                <a:cs typeface="+mn-cs"/>
-              </a:defRPr>
-            </a:lvl9pPr>
-          </a:lstStyle>
-          <a:p>
-            <a:pPr marL="0" indent="0" algn="ctr">
-              <a:buNone/>
-            </a:pPr>
-            <a:r>
-              <a:rPr lang="en-US" sz="1600" dirty="0">
-                <a:solidFill>
-                  <a:schemeClr val="bg1"/>
-                </a:solidFill>
-              </a:rPr>
-              <a:t>Michael Remijan      mjremijan@yahoo.com      @</a:t>
-            </a:r>
-            <a:r>
-              <a:rPr lang="en-US" sz="1600" dirty="0" err="1">
-                <a:solidFill>
-                  <a:schemeClr val="bg1"/>
-                </a:solidFill>
-              </a:rPr>
-              <a:t>mjremijan</a:t>
-            </a:r>
-            <a:r>
-              <a:rPr lang="en-US" sz="1600" dirty="0">
-                <a:solidFill>
-                  <a:schemeClr val="bg1"/>
-                </a:solidFill>
-              </a:rPr>
-              <a:t>      github.com/</a:t>
-            </a:r>
-            <a:r>
-              <a:rPr lang="en-US" sz="1600" dirty="0" err="1">
-                <a:solidFill>
-                  <a:schemeClr val="bg1"/>
-                </a:solidFill>
-              </a:rPr>
-              <a:t>mjremijan</a:t>
-            </a:r>
-            <a:r>
-              <a:rPr lang="en-US" sz="1600" dirty="0">
-                <a:solidFill>
-                  <a:schemeClr val="bg1"/>
-                </a:solidFill>
-              </a:rPr>
-              <a:t>/</a:t>
-            </a:r>
-            <a:r>
-              <a:rPr lang="en-US" sz="1600" dirty="0" err="1">
-                <a:solidFill>
-                  <a:schemeClr val="bg1"/>
-                </a:solidFill>
-              </a:rPr>
-              <a:t>ferris</a:t>
-            </a:r>
-            <a:r>
-              <a:rPr lang="en-US" sz="1600" dirty="0">
-                <a:solidFill>
-                  <a:schemeClr val="bg1"/>
-                </a:solidFill>
-              </a:rPr>
-              <a:t>-cdi-presentation</a:t>
-            </a:r>
-          </a:p>
-          <a:p>
-            <a:endParaRPr lang="en-US" dirty="0" smtClean="0"/>
-          </a:p>
-          <a:p>
-            <a:endParaRPr lang="en-US" dirty="0"/>
-          </a:p>
-        </p:txBody>
-      </p:sp>
-      <p:sp>
-        <p:nvSpPr>
-          <p:cNvPr id="9" name="Content Placeholder 2"/>
-          <p:cNvSpPr txBox="1">
-            <a:spLocks/>
-          </p:cNvSpPr>
-          <p:nvPr/>
-        </p:nvSpPr>
-        <p:spPr>
-          <a:xfrm>
-            <a:off x="0" y="0"/>
-            <a:ext cx="9144000" cy="380999"/>
-          </a:xfrm>
-          <a:prstGeom prst="rect">
-            <a:avLst/>
-          </a:prstGeom>
-          <a:solidFill>
-            <a:srgbClr val="4D4D79"/>
-          </a:solidFill>
-        </p:spPr>
-        <p:txBody>
-          <a:bodyPr vert="horz" lIns="91440" tIns="45720" rIns="91440" bIns="45720" rtlCol="0">
-            <a:normAutofit/>
-          </a:bodyPr>
-          <a:lstStyle>
-            <a:lvl1pPr marL="342900" indent="-342900" algn="l" defTabSz="914400" rtl="0" eaLnBrk="1" latinLnBrk="0" hangingPunct="1">
-              <a:spcBef>
-                <a:spcPct val="20000"/>
-              </a:spcBef>
-              <a:buFont typeface="Arial" panose="020B0604020202020204" pitchFamily="34" charset="0"/>
-              <a:buChar char="•"/>
-              <a:defRPr sz="3200" kern="1200">
-                <a:solidFill>
-                  <a:schemeClr val="tx1"/>
-                </a:solidFill>
-                <a:latin typeface="+mn-lt"/>
-                <a:ea typeface="+mn-ea"/>
-                <a:cs typeface="+mn-cs"/>
-              </a:defRPr>
-            </a:lvl1pPr>
-            <a:lvl2pPr marL="742950" indent="-285750" algn="l" defTabSz="914400" rtl="0" eaLnBrk="1" latinLnBrk="0" hangingPunct="1">
-              <a:spcBef>
-                <a:spcPct val="20000"/>
-              </a:spcBef>
-              <a:buFont typeface="Arial" panose="020B0604020202020204" pitchFamily="34" charset="0"/>
-              <a:buChar char="–"/>
-              <a:defRPr sz="2800" kern="1200">
-                <a:solidFill>
-                  <a:schemeClr val="tx1"/>
-                </a:solidFill>
-                <a:latin typeface="+mn-lt"/>
-                <a:ea typeface="+mn-ea"/>
-                <a:cs typeface="+mn-cs"/>
-              </a:defRPr>
-            </a:lvl2pPr>
-            <a:lvl3pPr marL="1143000" indent="-228600" algn="l" defTabSz="914400" rtl="0" eaLnBrk="1" latinLnBrk="0" hangingPunct="1">
-              <a:spcBef>
-                <a:spcPct val="20000"/>
-              </a:spcBef>
-              <a:buFont typeface="Arial" panose="020B0604020202020204" pitchFamily="34" charset="0"/>
-              <a:buChar char="•"/>
-              <a:defRPr sz="2400" kern="1200">
-                <a:solidFill>
-                  <a:schemeClr val="tx1"/>
-                </a:solidFill>
-                <a:latin typeface="+mn-lt"/>
-                <a:ea typeface="+mn-ea"/>
-                <a:cs typeface="+mn-cs"/>
-              </a:defRPr>
-            </a:lvl3pPr>
-            <a:lvl4pPr marL="1600200" indent="-228600" algn="l" defTabSz="914400" rtl="0" eaLnBrk="1" latinLnBrk="0" hangingPunct="1">
-              <a:spcBef>
-                <a:spcPct val="20000"/>
-              </a:spcBef>
-              <a:buFont typeface="Arial" panose="020B0604020202020204" pitchFamily="34" charset="0"/>
-              <a:buChar char="–"/>
-              <a:defRPr sz="2000" kern="1200">
-                <a:solidFill>
-                  <a:schemeClr val="tx1"/>
-                </a:solidFill>
-                <a:latin typeface="+mn-lt"/>
-                <a:ea typeface="+mn-ea"/>
-                <a:cs typeface="+mn-cs"/>
-              </a:defRPr>
-            </a:lvl4pPr>
-            <a:lvl5pPr marL="2057400" indent="-228600" algn="l" defTabSz="914400" rtl="0" eaLnBrk="1" latinLnBrk="0" hangingPunct="1">
-              <a:spcBef>
-                <a:spcPct val="20000"/>
-              </a:spcBef>
-              <a:buFont typeface="Arial" panose="020B0604020202020204" pitchFamily="34" charset="0"/>
-              <a:buChar char="»"/>
-              <a:defRPr sz="2000" kern="1200">
-                <a:solidFill>
-                  <a:schemeClr val="tx1"/>
-                </a:solidFill>
-                <a:latin typeface="+mn-lt"/>
-                <a:ea typeface="+mn-ea"/>
-                <a:cs typeface="+mn-cs"/>
-              </a:defRPr>
-            </a:lvl5pPr>
-            <a:lvl6pPr marL="2514600" indent="-228600" algn="l" defTabSz="914400" rtl="0" eaLnBrk="1" latinLnBrk="0" hangingPunct="1">
-              <a:spcBef>
-                <a:spcPct val="20000"/>
-              </a:spcBef>
-              <a:buFont typeface="Arial" panose="020B0604020202020204" pitchFamily="34" charset="0"/>
-              <a:buChar char="•"/>
-              <a:defRPr sz="2000" kern="1200">
-                <a:solidFill>
-                  <a:schemeClr val="tx1"/>
-                </a:solidFill>
-                <a:latin typeface="+mn-lt"/>
-                <a:ea typeface="+mn-ea"/>
-                <a:cs typeface="+mn-cs"/>
-              </a:defRPr>
-            </a:lvl6pPr>
-            <a:lvl7pPr marL="2971800" indent="-228600" algn="l" defTabSz="914400" rtl="0" eaLnBrk="1" latinLnBrk="0" hangingPunct="1">
-              <a:spcBef>
-                <a:spcPct val="20000"/>
-              </a:spcBef>
-              <a:buFont typeface="Arial" panose="020B0604020202020204" pitchFamily="34" charset="0"/>
-              <a:buChar char="•"/>
-              <a:defRPr sz="2000" kern="1200">
-                <a:solidFill>
-                  <a:schemeClr val="tx1"/>
-                </a:solidFill>
-                <a:latin typeface="+mn-lt"/>
-                <a:ea typeface="+mn-ea"/>
-                <a:cs typeface="+mn-cs"/>
-              </a:defRPr>
-            </a:lvl7pPr>
-            <a:lvl8pPr marL="3429000" indent="-228600" algn="l" defTabSz="914400" rtl="0" eaLnBrk="1" latinLnBrk="0" hangingPunct="1">
-              <a:spcBef>
-                <a:spcPct val="20000"/>
-              </a:spcBef>
-              <a:buFont typeface="Arial" panose="020B0604020202020204" pitchFamily="34" charset="0"/>
-              <a:buChar char="•"/>
-              <a:defRPr sz="2000" kern="1200">
-                <a:solidFill>
-                  <a:schemeClr val="tx1"/>
-                </a:solidFill>
-                <a:latin typeface="+mn-lt"/>
-                <a:ea typeface="+mn-ea"/>
-                <a:cs typeface="+mn-cs"/>
-              </a:defRPr>
-            </a:lvl8pPr>
-            <a:lvl9pPr marL="3886200" indent="-228600" algn="l" defTabSz="914400" rtl="0" eaLnBrk="1" latinLnBrk="0" hangingPunct="1">
-              <a:spcBef>
-                <a:spcPct val="20000"/>
-              </a:spcBef>
-              <a:buFont typeface="Arial" panose="020B0604020202020204" pitchFamily="34" charset="0"/>
-              <a:buChar char="•"/>
-              <a:defRPr sz="2000" kern="1200">
-                <a:solidFill>
-                  <a:schemeClr val="tx1"/>
-                </a:solidFill>
-                <a:latin typeface="+mn-lt"/>
-                <a:ea typeface="+mn-ea"/>
-                <a:cs typeface="+mn-cs"/>
-              </a:defRPr>
-            </a:lvl9pPr>
-          </a:lstStyle>
-          <a:p>
-            <a:pPr marL="0" indent="0" algn="ctr">
-              <a:buNone/>
-            </a:pPr>
-            <a:r>
-              <a:rPr lang="en-US" sz="1600" dirty="0" smtClean="0">
-                <a:solidFill>
-                  <a:schemeClr val="bg1"/>
-                </a:solidFill>
-              </a:rPr>
-              <a:t>CDI</a:t>
-            </a:r>
-          </a:p>
-          <a:p>
-            <a:endParaRPr lang="en-US" dirty="0" smtClean="0"/>
-          </a:p>
-          <a:p>
-            <a:endParaRPr lang="en-US" dirty="0"/>
-          </a:p>
-        </p:txBody>
-      </p:sp>
-    </p:spTree>
-    <p:extLst>
-      <p:ext uri="{BB962C8B-B14F-4D97-AF65-F5344CB8AC3E}">
-        <p14:creationId xmlns:p14="http://schemas.microsoft.com/office/powerpoint/2010/main" val="4081083299"/>
       </p:ext>
     </p:extLst>
   </p:cSld>
@@ -9870,4 +11756,289 @@
   <a:objectDefaults/>
   <a:extraClrSchemeLst/>
 </a:theme>
+</file>
+
+<file path=ppt/theme/theme2.xml><?xml version="1.0" encoding="utf-8"?>
+<a:theme xmlns:a="http://schemas.openxmlformats.org/drawingml/2006/main" name="Office Theme">
+  <a:themeElements>
+    <a:clrScheme name="Office">
+      <a:dk1>
+        <a:sysClr val="windowText" lastClr="000000"/>
+      </a:dk1>
+      <a:lt1>
+        <a:sysClr val="window" lastClr="FFFFFF"/>
+      </a:lt1>
+      <a:dk2>
+        <a:srgbClr val="1F497D"/>
+      </a:dk2>
+      <a:lt2>
+        <a:srgbClr val="EEECE1"/>
+      </a:lt2>
+      <a:accent1>
+        <a:srgbClr val="4F81BD"/>
+      </a:accent1>
+      <a:accent2>
+        <a:srgbClr val="C0504D"/>
+      </a:accent2>
+      <a:accent3>
+        <a:srgbClr val="9BBB59"/>
+      </a:accent3>
+      <a:accent4>
+        <a:srgbClr val="8064A2"/>
+      </a:accent4>
+      <a:accent5>
+        <a:srgbClr val="4BACC6"/>
+      </a:accent5>
+      <a:accent6>
+        <a:srgbClr val="F79646"/>
+      </a:accent6>
+      <a:hlink>
+        <a:srgbClr val="0000FF"/>
+      </a:hlink>
+      <a:folHlink>
+        <a:srgbClr val="800080"/>
+      </a:folHlink>
+    </a:clrScheme>
+    <a:fontScheme name="Office">
+      <a:majorFont>
+        <a:latin typeface="Calibri"/>
+        <a:ea typeface=""/>
+        <a:cs typeface=""/>
+        <a:font script="Jpan" typeface="ＭＳ Ｐゴシック"/>
+        <a:font script="Hang" typeface="맑은 고딕"/>
+        <a:font script="Hans" typeface="宋体"/>
+        <a:font script="Hant" typeface="新細明體"/>
+        <a:font script="Arab" typeface="Times New Roman"/>
+        <a:font script="Hebr" typeface="Times New Roman"/>
+        <a:font script="Thai" typeface="Angsana New"/>
+        <a:font script="Ethi" typeface="Nyala"/>
+        <a:font script="Beng" typeface="Vrinda"/>
+        <a:font script="Gujr" typeface="Shruti"/>
+        <a:font script="Khmr" typeface="MoolBoran"/>
+        <a:font script="Knda" typeface="Tunga"/>
+        <a:font script="Guru" typeface="Raavi"/>
+        <a:font script="Cans" typeface="Euphemia"/>
+        <a:font script="Cher" typeface="Plantagenet Cherokee"/>
+        <a:font script="Yiii" typeface="Microsoft Yi Baiti"/>
+        <a:font script="Tibt" typeface="Microsoft Himalaya"/>
+        <a:font script="Thaa" typeface="MV Boli"/>
+        <a:font script="Deva" typeface="Mangal"/>
+        <a:font script="Telu" typeface="Gautami"/>
+        <a:font script="Taml" typeface="Latha"/>
+        <a:font script="Syrc" typeface="Estrangelo Edessa"/>
+        <a:font script="Orya" typeface="Kalinga"/>
+        <a:font script="Mlym" typeface="Kartika"/>
+        <a:font script="Laoo" typeface="DokChampa"/>
+        <a:font script="Sinh" typeface="Iskoola Pota"/>
+        <a:font script="Mong" typeface="Mongolian Baiti"/>
+        <a:font script="Viet" typeface="Times New Roman"/>
+        <a:font script="Uigh" typeface="Microsoft Uighur"/>
+        <a:font script="Geor" typeface="Sylfaen"/>
+      </a:majorFont>
+      <a:minorFont>
+        <a:latin typeface="Calibri"/>
+        <a:ea typeface=""/>
+        <a:cs typeface=""/>
+        <a:font script="Jpan" typeface="ＭＳ Ｐゴシック"/>
+        <a:font script="Hang" typeface="맑은 고딕"/>
+        <a:font script="Hans" typeface="宋体"/>
+        <a:font script="Hant" typeface="新細明體"/>
+        <a:font script="Arab" typeface="Arial"/>
+        <a:font script="Hebr" typeface="Arial"/>
+        <a:font script="Thai" typeface="Cordia New"/>
+        <a:font script="Ethi" typeface="Nyala"/>
+        <a:font script="Beng" typeface="Vrinda"/>
+        <a:font script="Gujr" typeface="Shruti"/>
+        <a:font script="Khmr" typeface="DaunPenh"/>
+        <a:font script="Knda" typeface="Tunga"/>
+        <a:font script="Guru" typeface="Raavi"/>
+        <a:font script="Cans" typeface="Euphemia"/>
+        <a:font script="Cher" typeface="Plantagenet Cherokee"/>
+        <a:font script="Yiii" typeface="Microsoft Yi Baiti"/>
+        <a:font script="Tibt" typeface="Microsoft Himalaya"/>
+        <a:font script="Thaa" typeface="MV Boli"/>
+        <a:font script="Deva" typeface="Mangal"/>
+        <a:font script="Telu" typeface="Gautami"/>
+        <a:font script="Taml" typeface="Latha"/>
+        <a:font script="Syrc" typeface="Estrangelo Edessa"/>
+        <a:font script="Orya" typeface="Kalinga"/>
+        <a:font script="Mlym" typeface="Kartika"/>
+        <a:font script="Laoo" typeface="DokChampa"/>
+        <a:font script="Sinh" typeface="Iskoola Pota"/>
+        <a:font script="Mong" typeface="Mongolian Baiti"/>
+        <a:font script="Viet" typeface="Arial"/>
+        <a:font script="Uigh" typeface="Microsoft Uighur"/>
+        <a:font script="Geor" typeface="Sylfaen"/>
+      </a:minorFont>
+    </a:fontScheme>
+    <a:fmtScheme name="Office">
+      <a:fillStyleLst>
+        <a:solidFill>
+          <a:schemeClr val="phClr"/>
+        </a:solidFill>
+        <a:gradFill rotWithShape="1">
+          <a:gsLst>
+            <a:gs pos="0">
+              <a:schemeClr val="phClr">
+                <a:tint val="50000"/>
+                <a:satMod val="300000"/>
+              </a:schemeClr>
+            </a:gs>
+            <a:gs pos="35000">
+              <a:schemeClr val="phClr">
+                <a:tint val="37000"/>
+                <a:satMod val="300000"/>
+              </a:schemeClr>
+            </a:gs>
+            <a:gs pos="100000">
+              <a:schemeClr val="phClr">
+                <a:tint val="15000"/>
+                <a:satMod val="350000"/>
+              </a:schemeClr>
+            </a:gs>
+          </a:gsLst>
+          <a:lin ang="16200000" scaled="1"/>
+        </a:gradFill>
+        <a:gradFill rotWithShape="1">
+          <a:gsLst>
+            <a:gs pos="0">
+              <a:schemeClr val="phClr">
+                <a:shade val="51000"/>
+                <a:satMod val="130000"/>
+              </a:schemeClr>
+            </a:gs>
+            <a:gs pos="80000">
+              <a:schemeClr val="phClr">
+                <a:shade val="93000"/>
+                <a:satMod val="130000"/>
+              </a:schemeClr>
+            </a:gs>
+            <a:gs pos="100000">
+              <a:schemeClr val="phClr">
+                <a:shade val="94000"/>
+                <a:satMod val="135000"/>
+              </a:schemeClr>
+            </a:gs>
+          </a:gsLst>
+          <a:lin ang="16200000" scaled="0"/>
+        </a:gradFill>
+      </a:fillStyleLst>
+      <a:lnStyleLst>
+        <a:ln w="9525" cap="flat" cmpd="sng" algn="ctr">
+          <a:solidFill>
+            <a:schemeClr val="phClr">
+              <a:shade val="95000"/>
+              <a:satMod val="105000"/>
+            </a:schemeClr>
+          </a:solidFill>
+          <a:prstDash val="solid"/>
+        </a:ln>
+        <a:ln w="25400" cap="flat" cmpd="sng" algn="ctr">
+          <a:solidFill>
+            <a:schemeClr val="phClr"/>
+          </a:solidFill>
+          <a:prstDash val="solid"/>
+        </a:ln>
+        <a:ln w="38100" cap="flat" cmpd="sng" algn="ctr">
+          <a:solidFill>
+            <a:schemeClr val="phClr"/>
+          </a:solidFill>
+          <a:prstDash val="solid"/>
+        </a:ln>
+      </a:lnStyleLst>
+      <a:effectStyleLst>
+        <a:effectStyle>
+          <a:effectLst>
+            <a:outerShdw blurRad="40000" dist="20000" dir="5400000" rotWithShape="0">
+              <a:srgbClr val="000000">
+                <a:alpha val="38000"/>
+              </a:srgbClr>
+            </a:outerShdw>
+          </a:effectLst>
+        </a:effectStyle>
+        <a:effectStyle>
+          <a:effectLst>
+            <a:outerShdw blurRad="40000" dist="23000" dir="5400000" rotWithShape="0">
+              <a:srgbClr val="000000">
+                <a:alpha val="35000"/>
+              </a:srgbClr>
+            </a:outerShdw>
+          </a:effectLst>
+        </a:effectStyle>
+        <a:effectStyle>
+          <a:effectLst>
+            <a:outerShdw blurRad="40000" dist="23000" dir="5400000" rotWithShape="0">
+              <a:srgbClr val="000000">
+                <a:alpha val="35000"/>
+              </a:srgbClr>
+            </a:outerShdw>
+          </a:effectLst>
+          <a:scene3d>
+            <a:camera prst="orthographicFront">
+              <a:rot lat="0" lon="0" rev="0"/>
+            </a:camera>
+            <a:lightRig rig="threePt" dir="t">
+              <a:rot lat="0" lon="0" rev="1200000"/>
+            </a:lightRig>
+          </a:scene3d>
+          <a:sp3d>
+            <a:bevelT w="63500" h="25400"/>
+          </a:sp3d>
+        </a:effectStyle>
+      </a:effectStyleLst>
+      <a:bgFillStyleLst>
+        <a:solidFill>
+          <a:schemeClr val="phClr"/>
+        </a:solidFill>
+        <a:gradFill rotWithShape="1">
+          <a:gsLst>
+            <a:gs pos="0">
+              <a:schemeClr val="phClr">
+                <a:tint val="40000"/>
+                <a:satMod val="350000"/>
+              </a:schemeClr>
+            </a:gs>
+            <a:gs pos="40000">
+              <a:schemeClr val="phClr">
+                <a:tint val="45000"/>
+                <a:shade val="99000"/>
+                <a:satMod val="350000"/>
+              </a:schemeClr>
+            </a:gs>
+            <a:gs pos="100000">
+              <a:schemeClr val="phClr">
+                <a:shade val="20000"/>
+                <a:satMod val="255000"/>
+              </a:schemeClr>
+            </a:gs>
+          </a:gsLst>
+          <a:path path="circle">
+            <a:fillToRect l="50000" t="-80000" r="50000" b="180000"/>
+          </a:path>
+        </a:gradFill>
+        <a:gradFill rotWithShape="1">
+          <a:gsLst>
+            <a:gs pos="0">
+              <a:schemeClr val="phClr">
+                <a:tint val="80000"/>
+                <a:satMod val="300000"/>
+              </a:schemeClr>
+            </a:gs>
+            <a:gs pos="100000">
+              <a:schemeClr val="phClr">
+                <a:shade val="30000"/>
+                <a:satMod val="200000"/>
+              </a:schemeClr>
+            </a:gs>
+          </a:gsLst>
+          <a:path path="circle">
+            <a:fillToRect l="50000" t="50000" r="50000" b="50000"/>
+          </a:path>
+        </a:gradFill>
+      </a:bgFillStyleLst>
+    </a:fmtScheme>
+  </a:themeElements>
+  <a:objectDefaults/>
+  <a:extraClrSchemeLst/>
+</a:theme>
 </file>
</xml_diff>

<commit_message>
Added "shared project" section examples Added "lifecycle" section examples
</commit_message>
<xml_diff>
--- a/Presentation.pptx
+++ b/Presentation.pptx
@@ -3897,20 +3897,21 @@
             <p:ph idx="1"/>
           </p:nvPr>
         </p:nvSpPr>
-        <p:spPr/>
+        <p:spPr>
+          <a:xfrm>
+            <a:off x="457199" y="1600200"/>
+            <a:ext cx="4571999" cy="4525963"/>
+          </a:xfrm>
+        </p:spPr>
         <p:txBody>
           <a:bodyPr>
-            <a:normAutofit fontScale="70000" lnSpcReduction="20000"/>
+            <a:normAutofit fontScale="92500" lnSpcReduction="10000"/>
           </a:bodyPr>
           <a:lstStyle/>
           <a:p>
             <a:r>
               <a:rPr lang="en-US" dirty="0" smtClean="0"/>
-              <a:t>Start container in Java </a:t>
-            </a:r>
-            <a:r>
-              <a:rPr lang="en-US" dirty="0" smtClean="0"/>
-              <a:t>SE</a:t>
+              <a:t>Start container in Java SE</a:t>
             </a:r>
           </a:p>
           <a:p>
@@ -3922,11 +3923,20 @@
           <a:p>
             <a:r>
               <a:rPr lang="en-US" dirty="0" smtClean="0"/>
-              <a:t>Lifecycle </a:t>
-            </a:r>
+              <a:t>Interfaces and concrete classes</a:t>
+            </a:r>
+          </a:p>
+          <a:p>
+            <a:r>
+              <a:rPr lang="en-US" smtClean="0"/>
+              <a:t>Shared project</a:t>
+            </a:r>
+            <a:endParaRPr lang="en-US" dirty="0" smtClean="0"/>
+          </a:p>
+          <a:p>
             <a:r>
               <a:rPr lang="en-US" dirty="0" smtClean="0"/>
-              <a:t>callbacks</a:t>
+              <a:t>Lifecycle callbacks</a:t>
             </a:r>
           </a:p>
           <a:p>
@@ -3934,7 +3944,6 @@
               <a:rPr lang="en-US" dirty="0" smtClean="0"/>
               <a:t>Deployment exceptions</a:t>
             </a:r>
-            <a:endParaRPr lang="en-US" dirty="0" smtClean="0"/>
           </a:p>
           <a:p>
             <a:r>
@@ -3944,49 +3953,6 @@
             <a:endParaRPr lang="en-US" dirty="0" smtClean="0"/>
           </a:p>
           <a:p>
-            <a:r>
-              <a:rPr lang="en-US" dirty="0" smtClean="0"/>
-              <a:t>Qualifiers</a:t>
-            </a:r>
-          </a:p>
-          <a:p>
-            <a:r>
-              <a:rPr lang="en-US" dirty="0"/>
-              <a:t>Producer/Disposer</a:t>
-            </a:r>
-            <a:endParaRPr lang="en-US" dirty="0" smtClean="0"/>
-          </a:p>
-          <a:p>
-            <a:r>
-              <a:rPr lang="en-US" dirty="0" smtClean="0"/>
-              <a:t>Parameterized types</a:t>
-            </a:r>
-          </a:p>
-          <a:p>
-            <a:r>
-              <a:rPr lang="en-US" dirty="0" smtClean="0"/>
-              <a:t>Instance</a:t>
-            </a:r>
-          </a:p>
-          <a:p>
-            <a:r>
-              <a:rPr lang="en-US" dirty="0" smtClean="0"/>
-              <a:t>Events</a:t>
-            </a:r>
-            <a:endParaRPr lang="en-US" dirty="0" smtClean="0"/>
-          </a:p>
-          <a:p>
-            <a:r>
-              <a:rPr lang="en-US" dirty="0" smtClean="0"/>
-              <a:t>Interceptor</a:t>
-            </a:r>
-            <a:endParaRPr lang="en-US" dirty="0" smtClean="0"/>
-          </a:p>
-          <a:p>
-            <a:r>
-              <a:rPr lang="en-US" dirty="0" smtClean="0"/>
-              <a:t>Decorator</a:t>
-            </a:r>
             <a:endParaRPr lang="en-US" dirty="0" smtClean="0"/>
           </a:p>
           <a:p>
@@ -4399,6 +4365,221 @@
                 </a:solidFill>
               </a:rPr>
               <a:t>CDI</a:t>
+            </a:r>
+          </a:p>
+          <a:p>
+            <a:endParaRPr lang="en-US" dirty="0" smtClean="0"/>
+          </a:p>
+          <a:p>
+            <a:endParaRPr lang="en-US" dirty="0"/>
+          </a:p>
+        </p:txBody>
+      </p:sp>
+      <p:sp>
+        <p:nvSpPr>
+          <p:cNvPr id="6" name="Content Placeholder 2"/>
+          <p:cNvSpPr txBox="1">
+            <a:spLocks/>
+          </p:cNvSpPr>
+          <p:nvPr/>
+        </p:nvSpPr>
+        <p:spPr>
+          <a:xfrm>
+            <a:off x="5029199" y="1570037"/>
+            <a:ext cx="3733801" cy="4525963"/>
+          </a:xfrm>
+          <a:prstGeom prst="rect">
+            <a:avLst/>
+          </a:prstGeom>
+        </p:spPr>
+        <p:txBody>
+          <a:bodyPr vert="horz" lIns="91440" tIns="45720" rIns="91440" bIns="45720" rtlCol="0">
+            <a:normAutofit fontScale="92500"/>
+          </a:bodyPr>
+          <a:lstStyle>
+            <a:lvl1pPr marL="342900" indent="-342900" algn="l" defTabSz="914400" rtl="0" eaLnBrk="1" latinLnBrk="0" hangingPunct="1">
+              <a:spcBef>
+                <a:spcPct val="20000"/>
+              </a:spcBef>
+              <a:buFont typeface="Arial" panose="020B0604020202020204" pitchFamily="34" charset="0"/>
+              <a:buChar char="•"/>
+              <a:defRPr sz="3200" kern="1200">
+                <a:solidFill>
+                  <a:schemeClr val="tx1"/>
+                </a:solidFill>
+                <a:latin typeface="+mn-lt"/>
+                <a:ea typeface="+mn-ea"/>
+                <a:cs typeface="+mn-cs"/>
+              </a:defRPr>
+            </a:lvl1pPr>
+            <a:lvl2pPr marL="742950" indent="-285750" algn="l" defTabSz="914400" rtl="0" eaLnBrk="1" latinLnBrk="0" hangingPunct="1">
+              <a:spcBef>
+                <a:spcPct val="20000"/>
+              </a:spcBef>
+              <a:buFont typeface="Arial" panose="020B0604020202020204" pitchFamily="34" charset="0"/>
+              <a:buChar char="–"/>
+              <a:defRPr sz="2800" kern="1200">
+                <a:solidFill>
+                  <a:schemeClr val="tx1"/>
+                </a:solidFill>
+                <a:latin typeface="+mn-lt"/>
+                <a:ea typeface="+mn-ea"/>
+                <a:cs typeface="+mn-cs"/>
+              </a:defRPr>
+            </a:lvl2pPr>
+            <a:lvl3pPr marL="1143000" indent="-228600" algn="l" defTabSz="914400" rtl="0" eaLnBrk="1" latinLnBrk="0" hangingPunct="1">
+              <a:spcBef>
+                <a:spcPct val="20000"/>
+              </a:spcBef>
+              <a:buFont typeface="Arial" panose="020B0604020202020204" pitchFamily="34" charset="0"/>
+              <a:buChar char="•"/>
+              <a:defRPr sz="2400" kern="1200">
+                <a:solidFill>
+                  <a:schemeClr val="tx1"/>
+                </a:solidFill>
+                <a:latin typeface="+mn-lt"/>
+                <a:ea typeface="+mn-ea"/>
+                <a:cs typeface="+mn-cs"/>
+              </a:defRPr>
+            </a:lvl3pPr>
+            <a:lvl4pPr marL="1600200" indent="-228600" algn="l" defTabSz="914400" rtl="0" eaLnBrk="1" latinLnBrk="0" hangingPunct="1">
+              <a:spcBef>
+                <a:spcPct val="20000"/>
+              </a:spcBef>
+              <a:buFont typeface="Arial" panose="020B0604020202020204" pitchFamily="34" charset="0"/>
+              <a:buChar char="–"/>
+              <a:defRPr sz="2000" kern="1200">
+                <a:solidFill>
+                  <a:schemeClr val="tx1"/>
+                </a:solidFill>
+                <a:latin typeface="+mn-lt"/>
+                <a:ea typeface="+mn-ea"/>
+                <a:cs typeface="+mn-cs"/>
+              </a:defRPr>
+            </a:lvl4pPr>
+            <a:lvl5pPr marL="2057400" indent="-228600" algn="l" defTabSz="914400" rtl="0" eaLnBrk="1" latinLnBrk="0" hangingPunct="1">
+              <a:spcBef>
+                <a:spcPct val="20000"/>
+              </a:spcBef>
+              <a:buFont typeface="Arial" panose="020B0604020202020204" pitchFamily="34" charset="0"/>
+              <a:buChar char="»"/>
+              <a:defRPr sz="2000" kern="1200">
+                <a:solidFill>
+                  <a:schemeClr val="tx1"/>
+                </a:solidFill>
+                <a:latin typeface="+mn-lt"/>
+                <a:ea typeface="+mn-ea"/>
+                <a:cs typeface="+mn-cs"/>
+              </a:defRPr>
+            </a:lvl5pPr>
+            <a:lvl6pPr marL="2514600" indent="-228600" algn="l" defTabSz="914400" rtl="0" eaLnBrk="1" latinLnBrk="0" hangingPunct="1">
+              <a:spcBef>
+                <a:spcPct val="20000"/>
+              </a:spcBef>
+              <a:buFont typeface="Arial" panose="020B0604020202020204" pitchFamily="34" charset="0"/>
+              <a:buChar char="•"/>
+              <a:defRPr sz="2000" kern="1200">
+                <a:solidFill>
+                  <a:schemeClr val="tx1"/>
+                </a:solidFill>
+                <a:latin typeface="+mn-lt"/>
+                <a:ea typeface="+mn-ea"/>
+                <a:cs typeface="+mn-cs"/>
+              </a:defRPr>
+            </a:lvl6pPr>
+            <a:lvl7pPr marL="2971800" indent="-228600" algn="l" defTabSz="914400" rtl="0" eaLnBrk="1" latinLnBrk="0" hangingPunct="1">
+              <a:spcBef>
+                <a:spcPct val="20000"/>
+              </a:spcBef>
+              <a:buFont typeface="Arial" panose="020B0604020202020204" pitchFamily="34" charset="0"/>
+              <a:buChar char="•"/>
+              <a:defRPr sz="2000" kern="1200">
+                <a:solidFill>
+                  <a:schemeClr val="tx1"/>
+                </a:solidFill>
+                <a:latin typeface="+mn-lt"/>
+                <a:ea typeface="+mn-ea"/>
+                <a:cs typeface="+mn-cs"/>
+              </a:defRPr>
+            </a:lvl7pPr>
+            <a:lvl8pPr marL="3429000" indent="-228600" algn="l" defTabSz="914400" rtl="0" eaLnBrk="1" latinLnBrk="0" hangingPunct="1">
+              <a:spcBef>
+                <a:spcPct val="20000"/>
+              </a:spcBef>
+              <a:buFont typeface="Arial" panose="020B0604020202020204" pitchFamily="34" charset="0"/>
+              <a:buChar char="•"/>
+              <a:defRPr sz="2000" kern="1200">
+                <a:solidFill>
+                  <a:schemeClr val="tx1"/>
+                </a:solidFill>
+                <a:latin typeface="+mn-lt"/>
+                <a:ea typeface="+mn-ea"/>
+                <a:cs typeface="+mn-cs"/>
+              </a:defRPr>
+            </a:lvl8pPr>
+            <a:lvl9pPr marL="3886200" indent="-228600" algn="l" defTabSz="914400" rtl="0" eaLnBrk="1" latinLnBrk="0" hangingPunct="1">
+              <a:spcBef>
+                <a:spcPct val="20000"/>
+              </a:spcBef>
+              <a:buFont typeface="Arial" panose="020B0604020202020204" pitchFamily="34" charset="0"/>
+              <a:buChar char="•"/>
+              <a:defRPr sz="2000" kern="1200">
+                <a:solidFill>
+                  <a:schemeClr val="tx1"/>
+                </a:solidFill>
+                <a:latin typeface="+mn-lt"/>
+                <a:ea typeface="+mn-ea"/>
+                <a:cs typeface="+mn-cs"/>
+              </a:defRPr>
+            </a:lvl9pPr>
+          </a:lstStyle>
+          <a:p>
+            <a:r>
+              <a:rPr lang="en-US" dirty="0" err="1" smtClean="0"/>
+              <a:t>InjectionPoint</a:t>
+            </a:r>
+            <a:endParaRPr lang="en-US" dirty="0" smtClean="0"/>
+          </a:p>
+          <a:p>
+            <a:r>
+              <a:rPr lang="en-US" dirty="0" smtClean="0"/>
+              <a:t>Qualifiers</a:t>
+            </a:r>
+          </a:p>
+          <a:p>
+            <a:r>
+              <a:rPr lang="en-US" dirty="0" smtClean="0"/>
+              <a:t>Producer/Disposer</a:t>
+            </a:r>
+          </a:p>
+          <a:p>
+            <a:r>
+              <a:rPr lang="en-US" dirty="0" smtClean="0"/>
+              <a:t>Parameterized types</a:t>
+            </a:r>
+          </a:p>
+          <a:p>
+            <a:r>
+              <a:rPr lang="en-US" dirty="0" smtClean="0"/>
+              <a:t>Instance</a:t>
+            </a:r>
+          </a:p>
+          <a:p>
+            <a:r>
+              <a:rPr lang="en-US" dirty="0" smtClean="0"/>
+              <a:t>Events</a:t>
+            </a:r>
+          </a:p>
+          <a:p>
+            <a:r>
+              <a:rPr lang="en-US" dirty="0" smtClean="0"/>
+              <a:t>Interceptor</a:t>
+            </a:r>
+          </a:p>
+          <a:p>
+            <a:r>
+              <a:rPr lang="en-US" dirty="0" smtClean="0"/>
+              <a:t>Decorator</a:t>
             </a:r>
           </a:p>
           <a:p>
@@ -4598,7 +4779,6 @@
               <a:rPr lang="en-US" dirty="0" smtClean="0"/>
               <a:t>Bind to transaction phases</a:t>
             </a:r>
-            <a:endParaRPr lang="en-US" dirty="0" smtClean="0"/>
           </a:p>
           <a:p>
             <a:endParaRPr lang="en-US" dirty="0" smtClean="0"/>
@@ -7266,7 +7446,6 @@
               <a:rPr lang="en-US" dirty="0" smtClean="0"/>
               <a:t>Resources</a:t>
             </a:r>
-            <a:endParaRPr lang="en-US" dirty="0" smtClean="0"/>
           </a:p>
           <a:p>
             <a:r>
@@ -7285,7 +7464,6 @@
               <a:rPr lang="en-US" dirty="0" smtClean="0"/>
               <a:t>This time…</a:t>
             </a:r>
-            <a:endParaRPr lang="en-US" dirty="0" smtClean="0"/>
           </a:p>
           <a:p>
             <a:r>
@@ -7849,7 +8027,6 @@
               <a:rPr lang="en-US" sz="2000" b="1" dirty="0" smtClean="0"/>
               <a:t>Project</a:t>
             </a:r>
-            <a:endParaRPr lang="en-US" sz="2000" b="1" dirty="0" smtClean="0"/>
           </a:p>
           <a:p>
             <a:pPr marL="0" indent="0">
@@ -7877,7 +8054,6 @@
               <a:rPr lang="en-US" sz="2000" b="1" dirty="0" smtClean="0"/>
               <a:t>JSR (CDI 2.0)</a:t>
             </a:r>
-            <a:endParaRPr lang="en-US" sz="2000" b="1" dirty="0" smtClean="0"/>
           </a:p>
           <a:p>
             <a:pPr marL="0" indent="0">
@@ -7920,7 +8096,6 @@
               <a:rPr lang="en-US" sz="2000" dirty="0" smtClean="0"/>
               <a:t> </a:t>
             </a:r>
-            <a:endParaRPr lang="en-US" sz="2000" dirty="0" smtClean="0"/>
           </a:p>
           <a:p>
             <a:pPr marL="0" indent="0">

</xml_diff>

<commit_message>
producer example with parameters to producer method.
</commit_message>
<xml_diff>
--- a/Presentation.pptx
+++ b/Presentation.pptx
@@ -121,7 +121,7 @@
   </p:defaultTextStyle>
   <p:extLst>
     <p:ext uri="{EFAFB233-063F-42B5-8137-9DF3F51BA10A}">
-      <p15:sldGuideLst xmlns:p15="http://schemas.microsoft.com/office/powerpoint/2012/main">
+      <p15:sldGuideLst xmlns:p15="http://schemas.microsoft.com/office/powerpoint/2012/main" xmlns="">
         <p15:guide id="1" orient="horz" pos="2160">
           <p15:clr>
             <a:srgbClr val="A4A3A4"/>
@@ -220,7 +220,7 @@
           <a:p>
             <a:fld id="{50C997D9-49C9-4558-8AB1-F20238619037}" type="datetimeFigureOut">
               <a:rPr lang="en-US" smtClean="0"/>
-              <a:t>11/9/2015</a:t>
+              <a:t>11/10/2015</a:t>
             </a:fld>
             <a:endParaRPr lang="en-US"/>
           </a:p>
@@ -753,7 +753,7 @@
           <a:p>
             <a:fld id="{40565BA0-CA72-496A-94A4-036ADC11FC7E}" type="datetimeFigureOut">
               <a:rPr lang="en-US" smtClean="0"/>
-              <a:t>11/9/2015</a:t>
+              <a:t>11/10/2015</a:t>
             </a:fld>
             <a:endParaRPr lang="en-US"/>
           </a:p>
@@ -923,7 +923,7 @@
           <a:p>
             <a:fld id="{40565BA0-CA72-496A-94A4-036ADC11FC7E}" type="datetimeFigureOut">
               <a:rPr lang="en-US" smtClean="0"/>
-              <a:t>11/9/2015</a:t>
+              <a:t>11/10/2015</a:t>
             </a:fld>
             <a:endParaRPr lang="en-US"/>
           </a:p>
@@ -1103,7 +1103,7 @@
           <a:p>
             <a:fld id="{40565BA0-CA72-496A-94A4-036ADC11FC7E}" type="datetimeFigureOut">
               <a:rPr lang="en-US" smtClean="0"/>
-              <a:t>11/9/2015</a:t>
+              <a:t>11/10/2015</a:t>
             </a:fld>
             <a:endParaRPr lang="en-US"/>
           </a:p>
@@ -1273,7 +1273,7 @@
           <a:p>
             <a:fld id="{40565BA0-CA72-496A-94A4-036ADC11FC7E}" type="datetimeFigureOut">
               <a:rPr lang="en-US" smtClean="0"/>
-              <a:t>11/9/2015</a:t>
+              <a:t>11/10/2015</a:t>
             </a:fld>
             <a:endParaRPr lang="en-US"/>
           </a:p>
@@ -1519,7 +1519,7 @@
           <a:p>
             <a:fld id="{40565BA0-CA72-496A-94A4-036ADC11FC7E}" type="datetimeFigureOut">
               <a:rPr lang="en-US" smtClean="0"/>
-              <a:t>11/9/2015</a:t>
+              <a:t>11/10/2015</a:t>
             </a:fld>
             <a:endParaRPr lang="en-US"/>
           </a:p>
@@ -1807,7 +1807,7 @@
           <a:p>
             <a:fld id="{40565BA0-CA72-496A-94A4-036ADC11FC7E}" type="datetimeFigureOut">
               <a:rPr lang="en-US" smtClean="0"/>
-              <a:t>11/9/2015</a:t>
+              <a:t>11/10/2015</a:t>
             </a:fld>
             <a:endParaRPr lang="en-US"/>
           </a:p>
@@ -2229,7 +2229,7 @@
           <a:p>
             <a:fld id="{40565BA0-CA72-496A-94A4-036ADC11FC7E}" type="datetimeFigureOut">
               <a:rPr lang="en-US" smtClean="0"/>
-              <a:t>11/9/2015</a:t>
+              <a:t>11/10/2015</a:t>
             </a:fld>
             <a:endParaRPr lang="en-US"/>
           </a:p>
@@ -2347,7 +2347,7 @@
           <a:p>
             <a:fld id="{40565BA0-CA72-496A-94A4-036ADC11FC7E}" type="datetimeFigureOut">
               <a:rPr lang="en-US" smtClean="0"/>
-              <a:t>11/9/2015</a:t>
+              <a:t>11/10/2015</a:t>
             </a:fld>
             <a:endParaRPr lang="en-US"/>
           </a:p>
@@ -2442,7 +2442,7 @@
           <a:p>
             <a:fld id="{40565BA0-CA72-496A-94A4-036ADC11FC7E}" type="datetimeFigureOut">
               <a:rPr lang="en-US" smtClean="0"/>
-              <a:t>11/9/2015</a:t>
+              <a:t>11/10/2015</a:t>
             </a:fld>
             <a:endParaRPr lang="en-US"/>
           </a:p>
@@ -2719,7 +2719,7 @@
           <a:p>
             <a:fld id="{40565BA0-CA72-496A-94A4-036ADC11FC7E}" type="datetimeFigureOut">
               <a:rPr lang="en-US" smtClean="0"/>
-              <a:t>11/9/2015</a:t>
+              <a:t>11/10/2015</a:t>
             </a:fld>
             <a:endParaRPr lang="en-US"/>
           </a:p>
@@ -2972,7 +2972,7 @@
           <a:p>
             <a:fld id="{40565BA0-CA72-496A-94A4-036ADC11FC7E}" type="datetimeFigureOut">
               <a:rPr lang="en-US" smtClean="0"/>
-              <a:t>11/9/2015</a:t>
+              <a:t>11/10/2015</a:t>
             </a:fld>
             <a:endParaRPr lang="en-US"/>
           </a:p>
@@ -3185,7 +3185,7 @@
           <a:p>
             <a:fld id="{40565BA0-CA72-496A-94A4-036ADC11FC7E}" type="datetimeFigureOut">
               <a:rPr lang="en-US" smtClean="0"/>
-              <a:t>11/9/2015</a:t>
+              <a:t>11/10/2015</a:t>
             </a:fld>
             <a:endParaRPr lang="en-US"/>
           </a:p>
@@ -3917,27 +3917,14 @@
           <a:p>
             <a:r>
               <a:rPr lang="en-US" sz="2800" dirty="0" smtClean="0"/>
-              <a:t>Basic </a:t>
-            </a:r>
+              <a:t>Basic (DI)</a:t>
+            </a:r>
+          </a:p>
+          <a:p>
             <a:r>
               <a:rPr lang="en-US" sz="2800" dirty="0" smtClean="0"/>
-              <a:t>(</a:t>
-            </a:r>
-            <a:r>
-              <a:rPr lang="en-US" sz="2800" dirty="0" smtClean="0"/>
-              <a:t>DI)</a:t>
-            </a:r>
-          </a:p>
-          <a:p>
-            <a:r>
-              <a:rPr lang="en-US" sz="2800" dirty="0" smtClean="0"/>
-              <a:t>Interfaces and </a:t>
-            </a:r>
-            <a:r>
-              <a:rPr lang="en-US" sz="2800" dirty="0" smtClean="0"/>
-              <a:t>classes</a:t>
-            </a:r>
-            <a:endParaRPr lang="en-US" sz="2800" dirty="0" smtClean="0"/>
+              <a:t>Interfaces and classes</a:t>
+            </a:r>
           </a:p>
           <a:p>
             <a:r>
@@ -3954,11 +3941,7 @@
           <a:p>
             <a:r>
               <a:rPr lang="en-US" sz="2800" dirty="0" smtClean="0"/>
-              <a:t>Deployment </a:t>
-            </a:r>
-            <a:r>
-              <a:rPr lang="en-US" sz="2800" dirty="0" smtClean="0"/>
-              <a:t>exceptions</a:t>
+              <a:t>Deployment exceptions</a:t>
             </a:r>
           </a:p>
           <a:p>
@@ -3966,7 +3949,6 @@
               <a:rPr lang="en-US" sz="2800" dirty="0" smtClean="0"/>
               <a:t>Qualifiers</a:t>
             </a:r>
-            <a:endParaRPr lang="en-US" sz="2800" dirty="0" smtClean="0"/>
           </a:p>
           <a:p>
             <a:endParaRPr lang="en-US" dirty="0" smtClean="0"/>
@@ -7663,7 +7645,6 @@
               <a:rPr lang="en-US" dirty="0" smtClean="0"/>
               <a:t>Live coding…</a:t>
             </a:r>
-            <a:endParaRPr lang="en-US" dirty="0" smtClean="0"/>
           </a:p>
           <a:p>
             <a:endParaRPr lang="en-US" dirty="0"/>
@@ -8955,13 +8936,13 @@
       </p:pic>
       <p:pic>
         <p:nvPicPr>
-          <p:cNvPr id="1031" name="Picture 7"/>
+          <p:cNvPr id="5" name="Picture 2" descr="http://fc03.deviantart.net/fs70/i/2010/267/7/5/duke_from_java_by_reallyn00b-d2zdiy7.png"/>
           <p:cNvPicPr>
             <a:picLocks noChangeAspect="1" noChangeArrowheads="1"/>
           </p:cNvPicPr>
           <p:nvPr/>
         </p:nvPicPr>
-        <p:blipFill>
+        <p:blipFill rotWithShape="1">
           <a:blip r:embed="rId10">
             <a:extLst>
               <a:ext uri="{28A0092B-C50C-407E-A947-70E740481C1C}">
@@ -8969,40 +8950,25 @@
               </a:ext>
             </a:extLst>
           </a:blip>
-          <a:srcRect/>
-          <a:stretch>
-            <a:fillRect/>
-          </a:stretch>
+          <a:srcRect l="17534" r="9169"/>
+          <a:stretch/>
         </p:blipFill>
         <p:spPr bwMode="auto">
           <a:xfrm>
-            <a:off x="586565" y="2612066"/>
-            <a:ext cx="762000" cy="981559"/>
+            <a:off x="578255" y="2514600"/>
+            <a:ext cx="770310" cy="1185790"/>
           </a:xfrm>
           <a:prstGeom prst="rect">
             <a:avLst/>
           </a:prstGeom>
           <a:noFill/>
-          <a:ln>
-            <a:noFill/>
-          </a:ln>
           <a:extLst>
             <a:ext uri="{909E8E84-426E-40DD-AFC4-6F175D3DCCD1}">
               <a14:hiddenFill xmlns:a14="http://schemas.microsoft.com/office/drawing/2010/main">
                 <a:solidFill>
-                  <a:schemeClr val="accent1"/>
+                  <a:srgbClr val="FFFFFF"/>
                 </a:solidFill>
               </a14:hiddenFill>
-            </a:ext>
-            <a:ext uri="{91240B29-F687-4F45-9708-019B960494DF}">
-              <a14:hiddenLine xmlns:a14="http://schemas.microsoft.com/office/drawing/2010/main" w="9525">
-                <a:solidFill>
-                  <a:schemeClr val="tx1"/>
-                </a:solidFill>
-                <a:miter lim="800000"/>
-                <a:headEnd/>
-                <a:tailEnd/>
-              </a14:hiddenLine>
             </a:ext>
           </a:extLst>
         </p:spPr>

</xml_diff>

<commit_message>
cleanup as a result of creating lecture notes
</commit_message>
<xml_diff>
--- a/Presentation.pptx
+++ b/Presentation.pptx
@@ -121,7 +121,7 @@
   </p:defaultTextStyle>
   <p:extLst>
     <p:ext uri="{EFAFB233-063F-42B5-8137-9DF3F51BA10A}">
-      <p15:sldGuideLst xmlns:p15="http://schemas.microsoft.com/office/powerpoint/2012/main" xmlns="">
+      <p15:sldGuideLst xmlns:p15="http://schemas.microsoft.com/office/powerpoint/2012/main">
         <p15:guide id="1" orient="horz" pos="2160">
           <p15:clr>
             <a:srgbClr val="A4A3A4"/>
@@ -220,7 +220,7 @@
           <a:p>
             <a:fld id="{50C997D9-49C9-4558-8AB1-F20238619037}" type="datetimeFigureOut">
               <a:rPr lang="en-US" smtClean="0"/>
-              <a:t>11/10/2015</a:t>
+              <a:t>11/11/2015</a:t>
             </a:fld>
             <a:endParaRPr lang="en-US"/>
           </a:p>
@@ -753,7 +753,7 @@
           <a:p>
             <a:fld id="{40565BA0-CA72-496A-94A4-036ADC11FC7E}" type="datetimeFigureOut">
               <a:rPr lang="en-US" smtClean="0"/>
-              <a:t>11/10/2015</a:t>
+              <a:t>11/11/2015</a:t>
             </a:fld>
             <a:endParaRPr lang="en-US"/>
           </a:p>
@@ -923,7 +923,7 @@
           <a:p>
             <a:fld id="{40565BA0-CA72-496A-94A4-036ADC11FC7E}" type="datetimeFigureOut">
               <a:rPr lang="en-US" smtClean="0"/>
-              <a:t>11/10/2015</a:t>
+              <a:t>11/11/2015</a:t>
             </a:fld>
             <a:endParaRPr lang="en-US"/>
           </a:p>
@@ -1103,7 +1103,7 @@
           <a:p>
             <a:fld id="{40565BA0-CA72-496A-94A4-036ADC11FC7E}" type="datetimeFigureOut">
               <a:rPr lang="en-US" smtClean="0"/>
-              <a:t>11/10/2015</a:t>
+              <a:t>11/11/2015</a:t>
             </a:fld>
             <a:endParaRPr lang="en-US"/>
           </a:p>
@@ -1273,7 +1273,7 @@
           <a:p>
             <a:fld id="{40565BA0-CA72-496A-94A4-036ADC11FC7E}" type="datetimeFigureOut">
               <a:rPr lang="en-US" smtClean="0"/>
-              <a:t>11/10/2015</a:t>
+              <a:t>11/11/2015</a:t>
             </a:fld>
             <a:endParaRPr lang="en-US"/>
           </a:p>
@@ -1519,7 +1519,7 @@
           <a:p>
             <a:fld id="{40565BA0-CA72-496A-94A4-036ADC11FC7E}" type="datetimeFigureOut">
               <a:rPr lang="en-US" smtClean="0"/>
-              <a:t>11/10/2015</a:t>
+              <a:t>11/11/2015</a:t>
             </a:fld>
             <a:endParaRPr lang="en-US"/>
           </a:p>
@@ -1807,7 +1807,7 @@
           <a:p>
             <a:fld id="{40565BA0-CA72-496A-94A4-036ADC11FC7E}" type="datetimeFigureOut">
               <a:rPr lang="en-US" smtClean="0"/>
-              <a:t>11/10/2015</a:t>
+              <a:t>11/11/2015</a:t>
             </a:fld>
             <a:endParaRPr lang="en-US"/>
           </a:p>
@@ -2229,7 +2229,7 @@
           <a:p>
             <a:fld id="{40565BA0-CA72-496A-94A4-036ADC11FC7E}" type="datetimeFigureOut">
               <a:rPr lang="en-US" smtClean="0"/>
-              <a:t>11/10/2015</a:t>
+              <a:t>11/11/2015</a:t>
             </a:fld>
             <a:endParaRPr lang="en-US"/>
           </a:p>
@@ -2347,7 +2347,7 @@
           <a:p>
             <a:fld id="{40565BA0-CA72-496A-94A4-036ADC11FC7E}" type="datetimeFigureOut">
               <a:rPr lang="en-US" smtClean="0"/>
-              <a:t>11/10/2015</a:t>
+              <a:t>11/11/2015</a:t>
             </a:fld>
             <a:endParaRPr lang="en-US"/>
           </a:p>
@@ -2442,7 +2442,7 @@
           <a:p>
             <a:fld id="{40565BA0-CA72-496A-94A4-036ADC11FC7E}" type="datetimeFigureOut">
               <a:rPr lang="en-US" smtClean="0"/>
-              <a:t>11/10/2015</a:t>
+              <a:t>11/11/2015</a:t>
             </a:fld>
             <a:endParaRPr lang="en-US"/>
           </a:p>
@@ -2719,7 +2719,7 @@
           <a:p>
             <a:fld id="{40565BA0-CA72-496A-94A4-036ADC11FC7E}" type="datetimeFigureOut">
               <a:rPr lang="en-US" smtClean="0"/>
-              <a:t>11/10/2015</a:t>
+              <a:t>11/11/2015</a:t>
             </a:fld>
             <a:endParaRPr lang="en-US"/>
           </a:p>
@@ -2972,7 +2972,7 @@
           <a:p>
             <a:fld id="{40565BA0-CA72-496A-94A4-036ADC11FC7E}" type="datetimeFigureOut">
               <a:rPr lang="en-US" smtClean="0"/>
-              <a:t>11/10/2015</a:t>
+              <a:t>11/11/2015</a:t>
             </a:fld>
             <a:endParaRPr lang="en-US"/>
           </a:p>
@@ -3185,7 +3185,7 @@
           <a:p>
             <a:fld id="{40565BA0-CA72-496A-94A4-036ADC11FC7E}" type="datetimeFigureOut">
               <a:rPr lang="en-US" smtClean="0"/>
-              <a:t>11/10/2015</a:t>
+              <a:t>11/11/2015</a:t>
             </a:fld>
             <a:endParaRPr lang="en-US"/>
           </a:p>
@@ -3911,7 +3911,15 @@
           <a:p>
             <a:r>
               <a:rPr lang="en-US" sz="2800" dirty="0" smtClean="0"/>
-              <a:t>Start container in Java SE</a:t>
+              <a:t>Start </a:t>
+            </a:r>
+            <a:r>
+              <a:rPr lang="en-US" sz="2800" dirty="0" smtClean="0"/>
+              <a:t>CDI </a:t>
+            </a:r>
+            <a:r>
+              <a:rPr lang="en-US" sz="2800" dirty="0" smtClean="0"/>
+              <a:t>in Java SE</a:t>
             </a:r>
           </a:p>
           <a:p>
@@ -4542,7 +4550,6 @@
               <a:rPr lang="en-US" sz="2800" dirty="0" smtClean="0"/>
               <a:t>Producer/Disposer</a:t>
             </a:r>
-            <a:endParaRPr lang="en-US" sz="2800" dirty="0" smtClean="0"/>
           </a:p>
           <a:p>
             <a:r>
@@ -4727,8 +4734,8 @@
               <a:t>Deployment time </a:t>
             </a:r>
             <a:r>
-              <a:rPr lang="en-US" dirty="0" err="1" smtClean="0"/>
-              <a:t>overrride</a:t>
+              <a:rPr lang="en-US" dirty="0" smtClean="0"/>
+              <a:t>override</a:t>
             </a:r>
             <a:endParaRPr lang="en-US" dirty="0" smtClean="0"/>
           </a:p>
@@ -5353,11 +5360,7 @@
             <a:pPr lvl="1"/>
             <a:r>
               <a:rPr lang="en-US" sz="2500" dirty="0" smtClean="0"/>
-              <a:t>Bind to transaction </a:t>
-            </a:r>
-            <a:r>
-              <a:rPr lang="en-US" sz="2500" dirty="0" smtClean="0"/>
-              <a:t>phases</a:t>
+              <a:t>Bind to transaction phases</a:t>
             </a:r>
           </a:p>
           <a:p>
@@ -5371,7 +5374,6 @@
               <a:rPr lang="en-US" sz="2500" dirty="0" smtClean="0"/>
               <a:t>Instance&lt;&gt;</a:t>
             </a:r>
-            <a:endParaRPr lang="en-US" sz="2500" dirty="0" smtClean="0"/>
           </a:p>
           <a:p>
             <a:r>
@@ -6002,7 +6004,7 @@
         <p:spPr/>
         <p:txBody>
           <a:bodyPr>
-            <a:normAutofit fontScale="92500" lnSpcReduction="20000"/>
+            <a:normAutofit lnSpcReduction="10000"/>
           </a:bodyPr>
           <a:lstStyle/>
           <a:p>
@@ -6014,7 +6016,7 @@
           <a:p>
             <a:pPr lvl="1"/>
             <a:r>
-              <a:rPr lang="en-US" dirty="0" smtClean="0"/>
+              <a:rPr lang="en-US" b="1" dirty="0" smtClean="0"/>
               <a:t>*Producer</a:t>
             </a:r>
           </a:p>
@@ -6066,13 +6068,9 @@
             </a:r>
           </a:p>
           <a:p>
-            <a:pPr lvl="1"/>
-            <a:r>
-              <a:rPr lang="en-US" dirty="0" smtClean="0"/>
-              <a:t>Interface</a:t>
-            </a:r>
-          </a:p>
-          <a:p>
+            <a:pPr marL="0" indent="0">
+              <a:buNone/>
+            </a:pPr>
             <a:endParaRPr lang="en-US" dirty="0"/>
           </a:p>
           <a:p>
@@ -8296,7 +8294,11 @@
             </a:pPr>
             <a:r>
               <a:rPr lang="en-US" sz="2000" b="1" dirty="0" smtClean="0"/>
-              <a:t>EE 7 Tutorial</a:t>
+              <a:t>EE 7 </a:t>
+            </a:r>
+            <a:r>
+              <a:rPr lang="en-US" sz="2000" b="1" dirty="0" smtClean="0"/>
+              <a:t>Tutorial (2013)</a:t>
             </a:r>
             <a:endParaRPr lang="en-US" sz="2000" b="1" dirty="0"/>
           </a:p>
@@ -11030,33 +11032,43 @@
               <a:t>GlassFish</a:t>
             </a:r>
             <a:r>
-              <a:rPr lang="en-US" dirty="0"/>
+              <a:rPr lang="en-US" dirty="0" smtClean="0"/>
               <a:t>, </a:t>
             </a:r>
             <a:r>
-              <a:rPr lang="en-US" dirty="0">
+              <a:rPr lang="en-US" dirty="0" err="1" smtClean="0">
                 <a:hlinkClick r:id="rId7"/>
               </a:rPr>
-              <a:t>Oracle WebLogic Server</a:t>
-            </a:r>
-            <a:r>
-              <a:rPr lang="en-US" dirty="0"/>
+              <a:t>Payara</a:t>
+            </a:r>
+            <a:r>
+              <a:rPr lang="en-US" dirty="0" smtClean="0"/>
               <a:t>, </a:t>
             </a:r>
             <a:r>
               <a:rPr lang="en-US" dirty="0">
                 <a:hlinkClick r:id="rId8"/>
               </a:rPr>
-              <a:t>WebSphere Application Server</a:t>
+              <a:t>Oracle WebLogic Server</a:t>
             </a:r>
             <a:r>
               <a:rPr lang="en-US" dirty="0"/>
-              <a:t> and others. Weld can also be used in a </a:t>
+              <a:t>, </a:t>
             </a:r>
             <a:r>
               <a:rPr lang="en-US" dirty="0">
                 <a:hlinkClick r:id="rId9"/>
               </a:rPr>
+              <a:t>WebSphere Application Server</a:t>
+            </a:r>
+            <a:r>
+              <a:rPr lang="en-US" dirty="0"/>
+              <a:t> and others. Weld can also be used in a </a:t>
+            </a:r>
+            <a:r>
+              <a:rPr lang="en-US" dirty="0">
+                <a:hlinkClick r:id="rId10"/>
+              </a:rPr>
               <a:t>Servlet-only environment (Tomcat, Jetty)</a:t>
             </a:r>
             <a:r>
@@ -11065,7 +11077,7 @@
             </a:r>
             <a:r>
               <a:rPr lang="en-US" dirty="0">
-                <a:hlinkClick r:id="rId10"/>
+                <a:hlinkClick r:id="rId11"/>
               </a:rPr>
               <a:t>Java SE environment.</a:t>
             </a:r>

</xml_diff>